<commit_message>
Rétablissement de la version private des module 1 et 2
</commit_message>
<xml_diff>
--- a/Mod-1_introduction-aux-microservices/Mod-1_introduction-to-microservices.pptx
+++ b/Mod-1_introduction-aux-microservices/Mod-1_introduction-to-microservices.pptx
@@ -5,7 +5,7 @@
     <p:sldMasterId id="2147483648" r:id="rId1"/>
   </p:sldMasterIdLst>
   <p:notesMasterIdLst>
-    <p:notesMasterId r:id="rId17"/>
+    <p:notesMasterId r:id="rId24"/>
   </p:notesMasterIdLst>
   <p:sldIdLst>
     <p:sldId id="256" r:id="rId2"/>
@@ -23,11 +23,18 @@
     <p:sldId id="276" r:id="rId14"/>
     <p:sldId id="262" r:id="rId15"/>
     <p:sldId id="273" r:id="rId16"/>
+    <p:sldId id="277" r:id="rId17"/>
+    <p:sldId id="278" r:id="rId18"/>
+    <p:sldId id="279" r:id="rId19"/>
+    <p:sldId id="280" r:id="rId20"/>
+    <p:sldId id="281" r:id="rId21"/>
+    <p:sldId id="282" r:id="rId22"/>
+    <p:sldId id="283" r:id="rId23"/>
   </p:sldIdLst>
   <p:sldSz cx="12192000" cy="6858000"/>
   <p:notesSz cx="6858000" cy="9144000"/>
   <p:custDataLst>
-    <p:tags r:id="rId18"/>
+    <p:tags r:id="rId25"/>
   </p:custDataLst>
   <p:defaultTextStyle>
     <a:defPPr>
@@ -125,6 +132,40 @@
     </a:lvl9pPr>
   </p:defaultTextStyle>
   <p:extLst>
+    <p:ext uri="{521415D9-36F7-43E2-AB2F-B90AF26B5E84}">
+      <p14:sectionLst xmlns:p14="http://schemas.microsoft.com/office/powerpoint/2010/main">
+        <p14:section name="Section par défaut" id="{16DB63D4-9480-4952-A39C-2632C12D71C5}">
+          <p14:sldIdLst>
+            <p14:sldId id="256"/>
+            <p14:sldId id="260"/>
+            <p14:sldId id="258"/>
+            <p14:sldId id="264"/>
+            <p14:sldId id="265"/>
+            <p14:sldId id="266"/>
+            <p14:sldId id="269"/>
+            <p14:sldId id="267"/>
+            <p14:sldId id="268"/>
+            <p14:sldId id="270"/>
+            <p14:sldId id="272"/>
+            <p14:sldId id="274"/>
+            <p14:sldId id="276"/>
+            <p14:sldId id="262"/>
+          </p14:sldIdLst>
+        </p14:section>
+        <p14:section name="Quizz" id="{D2935ECB-BA50-4E3E-A99F-46D080B75FEB}">
+          <p14:sldIdLst>
+            <p14:sldId id="273"/>
+            <p14:sldId id="277"/>
+            <p14:sldId id="278"/>
+            <p14:sldId id="279"/>
+            <p14:sldId id="280"/>
+            <p14:sldId id="281"/>
+            <p14:sldId id="282"/>
+            <p14:sldId id="283"/>
+          </p14:sldIdLst>
+        </p14:section>
+      </p14:sectionLst>
+    </p:ext>
     <p:ext uri="{EFAFB233-063F-42B5-8137-9DF3F51BA10A}">
       <p15:sldGuideLst xmlns:p15="http://schemas.microsoft.com/office/powerpoint/2012/main"/>
     </p:ext>
@@ -7098,7 +7139,7 @@
                 </a:solidFill>
                 <a:latin typeface="Lora" pitchFamily="2" charset="0"/>
               </a:rPr>
-              <a:t>Fin du module</a:t>
+              <a:t>Contrôle de connaissances</a:t>
             </a:r>
           </a:p>
         </p:txBody>
@@ -7113,6 +7154,2211 @@
   <p:clrMapOvr>
     <a:masterClrMapping/>
   </p:clrMapOvr>
+</p:sld>
+</file>
+
+<file path=ppt/slides/slide16.xml><?xml version="1.0" encoding="utf-8"?>
+<p:sld xmlns:a="http://schemas.openxmlformats.org/drawingml/2006/main" xmlns:r="http://schemas.openxmlformats.org/officeDocument/2006/relationships" xmlns:p="http://schemas.openxmlformats.org/presentationml/2006/main" showMasterSp="0">
+  <p:cSld>
+    <p:bg>
+      <p:bgPr>
+        <a:solidFill>
+          <a:srgbClr val="FFFFFF"/>
+        </a:solidFill>
+        <a:effectLst/>
+      </p:bgPr>
+    </p:bg>
+    <p:spTree>
+      <p:nvGrpSpPr>
+        <p:cNvPr id="1" name=""/>
+        <p:cNvGrpSpPr/>
+        <p:nvPr/>
+      </p:nvGrpSpPr>
+      <p:grpSpPr>
+        <a:xfrm>
+          <a:off x="0" y="0"/>
+          <a:ext cx="0" cy="0"/>
+          <a:chOff x="0" y="0"/>
+          <a:chExt cx="0" cy="0"/>
+        </a:xfrm>
+      </p:grpSpPr>
+      <p:sp>
+        <p:nvSpPr>
+          <p:cNvPr id="2" name="Rectangle : coins arrondis 1">
+            <a:extLst>
+              <a:ext uri="{FF2B5EF4-FFF2-40B4-BE49-F238E27FC236}">
+                <a16:creationId xmlns:a16="http://schemas.microsoft.com/office/drawing/2014/main" id="{55E80379-2E09-7FAA-8736-AA1ABD8BF189}"/>
+              </a:ext>
+            </a:extLst>
+          </p:cNvPr>
+          <p:cNvSpPr/>
+          <p:nvPr>
+            <p:custDataLst>
+              <p:tags r:id="rId2"/>
+            </p:custDataLst>
+          </p:nvPr>
+        </p:nvSpPr>
+        <p:spPr>
+          <a:xfrm>
+            <a:off x="6286500" y="430530"/>
+            <a:ext cx="5524500" cy="891540"/>
+          </a:xfrm>
+          <a:prstGeom prst="roundRect">
+            <a:avLst/>
+          </a:prstGeom>
+          <a:solidFill>
+            <a:srgbClr val="F4F4F4"/>
+          </a:solidFill>
+          <a:ln w="19050" cap="flat" cmpd="sng" algn="ctr">
+            <a:noFill/>
+            <a:prstDash val="solid"/>
+            <a:miter lim="800000"/>
+          </a:ln>
+          <a:effectLst/>
+          <a:extLst>
+            <a:ext uri="{91240B29-F687-4F45-9708-019B960494DF}">
+              <a14:hiddenLine xmlns:a14="http://schemas.microsoft.com/office/drawing/2010/main" w="19050" cap="flat" cmpd="sng" algn="ctr">
+                <a:solidFill>
+                  <a:schemeClr val="accent1">
+                    <a:shade val="15000"/>
+                  </a:schemeClr>
+                </a:solidFill>
+                <a:prstDash val="solid"/>
+                <a:miter lim="800000"/>
+              </a14:hiddenLine>
+            </a:ext>
+          </a:extLst>
+        </p:spPr>
+        <p:style>
+          <a:lnRef idx="2">
+            <a:schemeClr val="accent1">
+              <a:shade val="15000"/>
+            </a:schemeClr>
+          </a:lnRef>
+          <a:fillRef idx="1">
+            <a:schemeClr val="accent1"/>
+          </a:fillRef>
+          <a:effectRef idx="0">
+            <a:schemeClr val="accent1"/>
+          </a:effectRef>
+          <a:fontRef idx="minor">
+            <a:schemeClr val="lt1"/>
+          </a:fontRef>
+        </p:style>
+        <p:txBody>
+          <a:bodyPr lIns="317500" rIns="1143000" rtlCol="0" anchor="ctr">
+            <a:normAutofit/>
+          </a:bodyPr>
+          <a:lstStyle/>
+          <a:p>
+            <a:r>
+              <a:rPr lang="en-US" sz="2000">
+                <a:solidFill>
+                  <a:srgbClr val="5B5B5B"/>
+                </a:solidFill>
+              </a:rPr>
+              <a:t>Please download and install the Slido app on all computers you use</a:t>
+            </a:r>
+            <a:endParaRPr lang="fr-FR" sz="2000">
+              <a:solidFill>
+                <a:srgbClr val="5B5B5B"/>
+              </a:solidFill>
+            </a:endParaRPr>
+          </a:p>
+        </p:txBody>
+      </p:sp>
+      <p:pic>
+        <p:nvPicPr>
+          <p:cNvPr id="4" name="Graphique 3">
+            <a:extLst>
+              <a:ext uri="{FF2B5EF4-FFF2-40B4-BE49-F238E27FC236}">
+                <a16:creationId xmlns:a16="http://schemas.microsoft.com/office/drawing/2014/main" id="{8D60B06F-B207-D6FA-574B-339015E96825}"/>
+              </a:ext>
+            </a:extLst>
+          </p:cNvPr>
+          <p:cNvPicPr>
+            <a:picLocks/>
+          </p:cNvPicPr>
+          <p:nvPr>
+            <p:custDataLst>
+              <p:tags r:id="rId3"/>
+            </p:custDataLst>
+          </p:nvPr>
+        </p:nvPicPr>
+        <p:blipFill>
+          <a:blip r:embed="rId9">
+            <a:extLst>
+              <a:ext uri="{96DAC541-7B7A-43D3-8B79-37D633B846F1}">
+                <asvg:svgBlip xmlns:asvg="http://schemas.microsoft.com/office/drawing/2016/SVG/main" r:embed="rId10"/>
+              </a:ext>
+            </a:extLst>
+          </a:blip>
+          <a:stretch>
+            <a:fillRect/>
+          </a:stretch>
+        </p:blipFill>
+        <p:spPr>
+          <a:xfrm>
+            <a:off x="10826048" y="577634"/>
+            <a:ext cx="597332" cy="597332"/>
+          </a:xfrm>
+          <a:prstGeom prst="rect">
+            <a:avLst/>
+          </a:prstGeom>
+        </p:spPr>
+      </p:pic>
+      <p:pic>
+        <p:nvPicPr>
+          <p:cNvPr id="6" name="Graphique 5">
+            <a:extLst>
+              <a:ext uri="{FF2B5EF4-FFF2-40B4-BE49-F238E27FC236}">
+                <a16:creationId xmlns:a16="http://schemas.microsoft.com/office/drawing/2014/main" id="{F054CD78-8E82-CF60-E727-B5CEABE62C1B}"/>
+              </a:ext>
+            </a:extLst>
+          </p:cNvPr>
+          <p:cNvPicPr>
+            <a:picLocks/>
+          </p:cNvPicPr>
+          <p:nvPr>
+            <p:custDataLst>
+              <p:tags r:id="rId4"/>
+            </p:custDataLst>
+          </p:nvPr>
+        </p:nvPicPr>
+        <p:blipFill>
+          <a:blip r:embed="rId11">
+            <a:extLst>
+              <a:ext uri="{96DAC541-7B7A-43D3-8B79-37D633B846F1}">
+                <asvg:svgBlip xmlns:asvg="http://schemas.microsoft.com/office/drawing/2016/SVG/main" r:embed="rId12"/>
+              </a:ext>
+            </a:extLst>
+          </a:blip>
+          <a:stretch>
+            <a:fillRect/>
+          </a:stretch>
+        </p:blipFill>
+        <p:spPr>
+          <a:xfrm>
+            <a:off x="3901440" y="617220"/>
+            <a:ext cx="1036320" cy="518160"/>
+          </a:xfrm>
+          <a:prstGeom prst="rect">
+            <a:avLst/>
+          </a:prstGeom>
+        </p:spPr>
+      </p:pic>
+      <p:pic>
+        <p:nvPicPr>
+          <p:cNvPr id="8" name="Graphique 7">
+            <a:extLst>
+              <a:ext uri="{FF2B5EF4-FFF2-40B4-BE49-F238E27FC236}">
+                <a16:creationId xmlns:a16="http://schemas.microsoft.com/office/drawing/2014/main" id="{8F88B9EF-87DC-5DC5-5A4D-2F90A442FD98}"/>
+              </a:ext>
+            </a:extLst>
+          </p:cNvPr>
+          <p:cNvPicPr>
+            <a:picLocks/>
+          </p:cNvPicPr>
+          <p:nvPr>
+            <p:custDataLst>
+              <p:tags r:id="rId5"/>
+            </p:custDataLst>
+          </p:nvPr>
+        </p:nvPicPr>
+        <p:blipFill>
+          <a:blip r:embed="rId13">
+            <a:extLst>
+              <a:ext uri="{96DAC541-7B7A-43D3-8B79-37D633B846F1}">
+                <asvg:svgBlip xmlns:asvg="http://schemas.microsoft.com/office/drawing/2016/SVG/main" r:embed="rId14"/>
+              </a:ext>
+            </a:extLst>
+          </a:blip>
+          <a:stretch>
+            <a:fillRect/>
+          </a:stretch>
+        </p:blipFill>
+        <p:spPr>
+          <a:xfrm>
+            <a:off x="1158240" y="2270760"/>
+            <a:ext cx="2316480" cy="2316480"/>
+          </a:xfrm>
+          <a:prstGeom prst="rect">
+            <a:avLst/>
+          </a:prstGeom>
+        </p:spPr>
+      </p:pic>
+      <p:sp>
+        <p:nvSpPr>
+          <p:cNvPr id="9" name="Rectangle 8">
+            <a:extLst>
+              <a:ext uri="{FF2B5EF4-FFF2-40B4-BE49-F238E27FC236}">
+                <a16:creationId xmlns:a16="http://schemas.microsoft.com/office/drawing/2014/main" id="{DA279A65-5983-CF67-FD1B-E27B58841A18}"/>
+              </a:ext>
+            </a:extLst>
+          </p:cNvPr>
+          <p:cNvSpPr/>
+          <p:nvPr>
+            <p:custDataLst>
+              <p:tags r:id="rId6"/>
+            </p:custDataLst>
+          </p:nvPr>
+        </p:nvSpPr>
+        <p:spPr>
+          <a:xfrm>
+            <a:off x="3901440" y="2571750"/>
+            <a:ext cx="7315199" cy="1714500"/>
+          </a:xfrm>
+          <a:prstGeom prst="rect">
+            <a:avLst/>
+          </a:prstGeom>
+          <a:noFill/>
+          <a:ln w="19050" cap="flat" cmpd="sng" algn="ctr">
+            <a:solidFill>
+              <a:srgbClr val="FFFFFF"/>
+            </a:solidFill>
+            <a:prstDash val="solid"/>
+            <a:miter lim="800000"/>
+          </a:ln>
+          <a:effectLst/>
+          <a:extLst>
+            <a:ext uri="{909E8E84-426E-40DD-AFC4-6F175D3DCCD1}">
+              <a14:hiddenFill xmlns:a14="http://schemas.microsoft.com/office/drawing/2010/main">
+                <a:solidFill>
+                  <a:schemeClr val="accent1"/>
+                </a:solidFill>
+              </a14:hiddenFill>
+            </a:ext>
+          </a:extLst>
+        </p:spPr>
+        <p:style>
+          <a:lnRef idx="2">
+            <a:schemeClr val="accent1">
+              <a:shade val="15000"/>
+            </a:schemeClr>
+          </a:lnRef>
+          <a:fillRef idx="1">
+            <a:schemeClr val="accent1"/>
+          </a:fillRef>
+          <a:effectRef idx="0">
+            <a:schemeClr val="accent1"/>
+          </a:effectRef>
+          <a:fontRef idx="minor">
+            <a:schemeClr val="lt1"/>
+          </a:fontRef>
+        </p:style>
+        <p:txBody>
+          <a:bodyPr rtlCol="0" anchor="ctr"/>
+          <a:lstStyle/>
+          <a:p>
+            <a:r>
+              <a:rPr lang="fr-FR" sz="4000" b="1">
+                <a:solidFill>
+                  <a:srgbClr val="5B5B5B"/>
+                </a:solidFill>
+              </a:rPr>
+              <a:t>Qu'est-ce qu'un système monolithique ?</a:t>
+            </a:r>
+          </a:p>
+        </p:txBody>
+      </p:sp>
+      <p:sp>
+        <p:nvSpPr>
+          <p:cNvPr id="10" name="Rectangle 9">
+            <a:extLst>
+              <a:ext uri="{FF2B5EF4-FFF2-40B4-BE49-F238E27FC236}">
+                <a16:creationId xmlns:a16="http://schemas.microsoft.com/office/drawing/2014/main" id="{B32F0001-831F-5175-DFDC-ECD9C37FF4E2}"/>
+              </a:ext>
+            </a:extLst>
+          </p:cNvPr>
+          <p:cNvSpPr/>
+          <p:nvPr>
+            <p:custDataLst>
+              <p:tags r:id="rId7"/>
+            </p:custDataLst>
+          </p:nvPr>
+        </p:nvSpPr>
+        <p:spPr>
+          <a:xfrm>
+            <a:off x="3901440" y="6032500"/>
+            <a:ext cx="7315199" cy="518160"/>
+          </a:xfrm>
+          <a:prstGeom prst="rect">
+            <a:avLst/>
+          </a:prstGeom>
+          <a:noFill/>
+          <a:ln w="19050" cap="flat" cmpd="sng" algn="ctr">
+            <a:noFill/>
+            <a:prstDash val="solid"/>
+            <a:miter lim="800000"/>
+          </a:ln>
+          <a:effectLst/>
+          <a:extLst>
+            <a:ext uri="{909E8E84-426E-40DD-AFC4-6F175D3DCCD1}">
+              <a14:hiddenFill xmlns:a14="http://schemas.microsoft.com/office/drawing/2010/main">
+                <a:solidFill>
+                  <a:schemeClr val="accent1"/>
+                </a:solidFill>
+              </a14:hiddenFill>
+            </a:ext>
+            <a:ext uri="{91240B29-F687-4F45-9708-019B960494DF}">
+              <a14:hiddenLine xmlns:a14="http://schemas.microsoft.com/office/drawing/2010/main" w="19050" cap="flat" cmpd="sng" algn="ctr">
+                <a:solidFill>
+                  <a:schemeClr val="accent1">
+                    <a:shade val="15000"/>
+                  </a:schemeClr>
+                </a:solidFill>
+                <a:prstDash val="solid"/>
+                <a:miter lim="800000"/>
+              </a14:hiddenLine>
+            </a:ext>
+          </a:extLst>
+        </p:spPr>
+        <p:style>
+          <a:lnRef idx="2">
+            <a:schemeClr val="accent1">
+              <a:shade val="15000"/>
+            </a:schemeClr>
+          </a:lnRef>
+          <a:fillRef idx="1">
+            <a:schemeClr val="accent1"/>
+          </a:fillRef>
+          <a:effectRef idx="0">
+            <a:schemeClr val="accent1"/>
+          </a:effectRef>
+          <a:fontRef idx="minor">
+            <a:schemeClr val="lt1"/>
+          </a:fontRef>
+        </p:style>
+        <p:txBody>
+          <a:bodyPr rtlCol="0" anchor="ctr">
+            <a:normAutofit/>
+          </a:bodyPr>
+          <a:lstStyle/>
+          <a:p>
+            <a:r>
+              <a:rPr lang="en-US" sz="2200" b="1">
+                <a:solidFill>
+                  <a:srgbClr val="5B5B5B"/>
+                </a:solidFill>
+              </a:rPr>
+              <a:t>ⓘ</a:t>
+            </a:r>
+            <a:r>
+              <a:rPr lang="en-US" sz="2000">
+                <a:solidFill>
+                  <a:srgbClr val="5B5B5B"/>
+                </a:solidFill>
+              </a:rPr>
+              <a:t> Start presenting to display the poll results on this slide.</a:t>
+            </a:r>
+            <a:endParaRPr lang="fr-FR" sz="2000">
+              <a:solidFill>
+                <a:srgbClr val="5B5B5B"/>
+              </a:solidFill>
+            </a:endParaRPr>
+          </a:p>
+        </p:txBody>
+      </p:sp>
+    </p:spTree>
+    <p:custDataLst>
+      <p:tags r:id="rId1"/>
+    </p:custDataLst>
+    <p:extLst>
+      <p:ext uri="{BB962C8B-B14F-4D97-AF65-F5344CB8AC3E}">
+        <p14:creationId xmlns:p14="http://schemas.microsoft.com/office/powerpoint/2010/main" val="1022290880"/>
+      </p:ext>
+    </p:extLst>
+  </p:cSld>
+  <p:clrMapOvr>
+    <a:masterClrMapping/>
+  </p:clrMapOvr>
+  <p:timing>
+    <p:tnLst>
+      <p:par>
+        <p:cTn id="1" dur="indefinite" restart="never" nodeType="tmRoot">
+          <p:childTnLst>
+            <p:seq concurrent="1" nextAc="seek">
+              <p:cTn id="2" dur="indefinite" nodeType="mainSeq">
+                <p:childTnLst>
+                  <p:par>
+                    <p:cTn id="3" fill="hold">
+                      <p:stCondLst>
+                        <p:cond delay="indefinite"/>
+                      </p:stCondLst>
+                      <p:childTnLst>
+                        <p:par>
+                          <p:cTn id="4" fill="hold">
+                            <p:stCondLst>
+                              <p:cond delay="0"/>
+                            </p:stCondLst>
+                            <p:childTnLst>
+                              <p:par>
+                                <p:cTn id="5" presetID="26" presetClass="emph" presetSubtype="0" fill="hold" grpId="0" nodeType="clickEffect">
+                                  <p:stCondLst>
+                                    <p:cond delay="0"/>
+                                  </p:stCondLst>
+                                  <p:childTnLst>
+                                    <p:animEffect transition="out" filter="fade">
+                                      <p:cBhvr>
+                                        <p:cTn id="6" dur="50" tmFilter="0, 0; .2, .5; .8, .5; 1, 0"/>
+                                        <p:tgtEl>
+                                          <p:spTgt spid="9"/>
+                                        </p:tgtEl>
+                                      </p:cBhvr>
+                                    </p:animEffect>
+                                    <p:animScale>
+                                      <p:cBhvr>
+                                        <p:cTn id="7" dur="25" autoRev="1" fill="hold"/>
+                                        <p:tgtEl>
+                                          <p:spTgt spid="9"/>
+                                        </p:tgtEl>
+                                      </p:cBhvr>
+                                      <p:by x="105000" y="105000"/>
+                                    </p:animScale>
+                                  </p:childTnLst>
+                                </p:cTn>
+                              </p:par>
+                            </p:childTnLst>
+                          </p:cTn>
+                        </p:par>
+                      </p:childTnLst>
+                    </p:cTn>
+                  </p:par>
+                  <p:par>
+                    <p:cTn id="8" fill="hold">
+                      <p:stCondLst>
+                        <p:cond delay="indefinite"/>
+                      </p:stCondLst>
+                      <p:childTnLst>
+                        <p:par>
+                          <p:cTn id="9" fill="hold">
+                            <p:stCondLst>
+                              <p:cond delay="0"/>
+                            </p:stCondLst>
+                            <p:childTnLst>
+                              <p:par>
+                                <p:cTn id="10" presetID="26" presetClass="emph" presetSubtype="0" fill="hold" grpId="1" nodeType="clickEffect">
+                                  <p:stCondLst>
+                                    <p:cond delay="0"/>
+                                  </p:stCondLst>
+                                  <p:childTnLst>
+                                    <p:animEffect transition="out" filter="fade">
+                                      <p:cBhvr>
+                                        <p:cTn id="11" dur="50" tmFilter="0, 0; .2, .5; .8, .5; 1, 0"/>
+                                        <p:tgtEl>
+                                          <p:spTgt spid="9"/>
+                                        </p:tgtEl>
+                                      </p:cBhvr>
+                                    </p:animEffect>
+                                    <p:animScale>
+                                      <p:cBhvr>
+                                        <p:cTn id="12" dur="25" autoRev="1" fill="hold"/>
+                                        <p:tgtEl>
+                                          <p:spTgt spid="9"/>
+                                        </p:tgtEl>
+                                      </p:cBhvr>
+                                      <p:by x="105000" y="105000"/>
+                                    </p:animScale>
+                                  </p:childTnLst>
+                                </p:cTn>
+                              </p:par>
+                            </p:childTnLst>
+                          </p:cTn>
+                        </p:par>
+                      </p:childTnLst>
+                    </p:cTn>
+                  </p:par>
+                  <p:par>
+                    <p:cTn id="13" fill="hold">
+                      <p:stCondLst>
+                        <p:cond delay="indefinite"/>
+                      </p:stCondLst>
+                      <p:childTnLst>
+                        <p:par>
+                          <p:cTn id="14" fill="hold">
+                            <p:stCondLst>
+                              <p:cond delay="0"/>
+                            </p:stCondLst>
+                            <p:childTnLst>
+                              <p:par>
+                                <p:cTn id="15" presetID="26" presetClass="emph" presetSubtype="0" fill="hold" grpId="2" nodeType="clickEffect">
+                                  <p:stCondLst>
+                                    <p:cond delay="0"/>
+                                  </p:stCondLst>
+                                  <p:childTnLst>
+                                    <p:animEffect transition="out" filter="fade">
+                                      <p:cBhvr>
+                                        <p:cTn id="16" dur="50" tmFilter="0, 0; .2, .5; .8, .5; 1, 0"/>
+                                        <p:tgtEl>
+                                          <p:spTgt spid="9"/>
+                                        </p:tgtEl>
+                                      </p:cBhvr>
+                                    </p:animEffect>
+                                    <p:animScale>
+                                      <p:cBhvr>
+                                        <p:cTn id="17" dur="25" autoRev="1" fill="hold"/>
+                                        <p:tgtEl>
+                                          <p:spTgt spid="9"/>
+                                        </p:tgtEl>
+                                      </p:cBhvr>
+                                      <p:by x="105000" y="105000"/>
+                                    </p:animScale>
+                                  </p:childTnLst>
+                                </p:cTn>
+                              </p:par>
+                            </p:childTnLst>
+                          </p:cTn>
+                        </p:par>
+                      </p:childTnLst>
+                    </p:cTn>
+                  </p:par>
+                </p:childTnLst>
+              </p:cTn>
+              <p:prevCondLst>
+                <p:cond evt="onPrev" delay="0">
+                  <p:tgtEl>
+                    <p:sldTgt/>
+                  </p:tgtEl>
+                </p:cond>
+              </p:prevCondLst>
+              <p:nextCondLst>
+                <p:cond evt="onNext" delay="0">
+                  <p:tgtEl>
+                    <p:sldTgt/>
+                  </p:tgtEl>
+                </p:cond>
+              </p:nextCondLst>
+            </p:seq>
+          </p:childTnLst>
+        </p:cTn>
+      </p:par>
+    </p:tnLst>
+    <p:bldLst>
+      <p:bldP spid="9" grpId="0" animBg="1"/>
+      <p:bldP spid="9" grpId="1" animBg="1"/>
+      <p:bldP spid="9" grpId="2" animBg="1"/>
+    </p:bldLst>
+  </p:timing>
+</p:sld>
+</file>
+
+<file path=ppt/slides/slide17.xml><?xml version="1.0" encoding="utf-8"?>
+<p:sld xmlns:a="http://schemas.openxmlformats.org/drawingml/2006/main" xmlns:r="http://schemas.openxmlformats.org/officeDocument/2006/relationships" xmlns:p="http://schemas.openxmlformats.org/presentationml/2006/main" showMasterSp="0">
+  <p:cSld>
+    <p:bg>
+      <p:bgPr>
+        <a:solidFill>
+          <a:srgbClr val="FFFFFF"/>
+        </a:solidFill>
+        <a:effectLst/>
+      </p:bgPr>
+    </p:bg>
+    <p:spTree>
+      <p:nvGrpSpPr>
+        <p:cNvPr id="1" name=""/>
+        <p:cNvGrpSpPr/>
+        <p:nvPr/>
+      </p:nvGrpSpPr>
+      <p:grpSpPr>
+        <a:xfrm>
+          <a:off x="0" y="0"/>
+          <a:ext cx="0" cy="0"/>
+          <a:chOff x="0" y="0"/>
+          <a:chExt cx="0" cy="0"/>
+        </a:xfrm>
+      </p:grpSpPr>
+      <p:sp>
+        <p:nvSpPr>
+          <p:cNvPr id="2" name="Rectangle : coins arrondis 1">
+            <a:extLst>
+              <a:ext uri="{FF2B5EF4-FFF2-40B4-BE49-F238E27FC236}">
+                <a16:creationId xmlns:a16="http://schemas.microsoft.com/office/drawing/2014/main" id="{5C385425-05D3-4269-85D8-2839DFEEEF44}"/>
+              </a:ext>
+            </a:extLst>
+          </p:cNvPr>
+          <p:cNvSpPr/>
+          <p:nvPr>
+            <p:custDataLst>
+              <p:tags r:id="rId2"/>
+            </p:custDataLst>
+          </p:nvPr>
+        </p:nvSpPr>
+        <p:spPr>
+          <a:xfrm>
+            <a:off x="6286500" y="430530"/>
+            <a:ext cx="5524500" cy="891540"/>
+          </a:xfrm>
+          <a:prstGeom prst="roundRect">
+            <a:avLst/>
+          </a:prstGeom>
+          <a:solidFill>
+            <a:srgbClr val="F4F4F4"/>
+          </a:solidFill>
+          <a:ln w="19050" cap="flat" cmpd="sng" algn="ctr">
+            <a:noFill/>
+            <a:prstDash val="solid"/>
+            <a:miter lim="800000"/>
+          </a:ln>
+          <a:effectLst/>
+          <a:extLst>
+            <a:ext uri="{91240B29-F687-4F45-9708-019B960494DF}">
+              <a14:hiddenLine xmlns:a14="http://schemas.microsoft.com/office/drawing/2010/main" w="19050" cap="flat" cmpd="sng" algn="ctr">
+                <a:solidFill>
+                  <a:schemeClr val="accent1">
+                    <a:shade val="15000"/>
+                  </a:schemeClr>
+                </a:solidFill>
+                <a:prstDash val="solid"/>
+                <a:miter lim="800000"/>
+              </a14:hiddenLine>
+            </a:ext>
+          </a:extLst>
+        </p:spPr>
+        <p:style>
+          <a:lnRef idx="2">
+            <a:schemeClr val="accent1">
+              <a:shade val="15000"/>
+            </a:schemeClr>
+          </a:lnRef>
+          <a:fillRef idx="1">
+            <a:schemeClr val="accent1"/>
+          </a:fillRef>
+          <a:effectRef idx="0">
+            <a:schemeClr val="accent1"/>
+          </a:effectRef>
+          <a:fontRef idx="minor">
+            <a:schemeClr val="lt1"/>
+          </a:fontRef>
+        </p:style>
+        <p:txBody>
+          <a:bodyPr lIns="317500" rIns="1143000" rtlCol="0" anchor="ctr">
+            <a:normAutofit/>
+          </a:bodyPr>
+          <a:lstStyle/>
+          <a:p>
+            <a:r>
+              <a:rPr lang="en-US" sz="2000">
+                <a:solidFill>
+                  <a:srgbClr val="5B5B5B"/>
+                </a:solidFill>
+              </a:rPr>
+              <a:t>Please download and install the Slido app on all computers you use</a:t>
+            </a:r>
+            <a:endParaRPr lang="fr-FR" sz="2000">
+              <a:solidFill>
+                <a:srgbClr val="5B5B5B"/>
+              </a:solidFill>
+            </a:endParaRPr>
+          </a:p>
+        </p:txBody>
+      </p:sp>
+      <p:pic>
+        <p:nvPicPr>
+          <p:cNvPr id="4" name="Graphique 3">
+            <a:extLst>
+              <a:ext uri="{FF2B5EF4-FFF2-40B4-BE49-F238E27FC236}">
+                <a16:creationId xmlns:a16="http://schemas.microsoft.com/office/drawing/2014/main" id="{77CF413B-4ED5-3846-101E-398A6101B1BD}"/>
+              </a:ext>
+            </a:extLst>
+          </p:cNvPr>
+          <p:cNvPicPr>
+            <a:picLocks/>
+          </p:cNvPicPr>
+          <p:nvPr>
+            <p:custDataLst>
+              <p:tags r:id="rId3"/>
+            </p:custDataLst>
+          </p:nvPr>
+        </p:nvPicPr>
+        <p:blipFill>
+          <a:blip r:embed="rId9">
+            <a:extLst>
+              <a:ext uri="{96DAC541-7B7A-43D3-8B79-37D633B846F1}">
+                <asvg:svgBlip xmlns:asvg="http://schemas.microsoft.com/office/drawing/2016/SVG/main" r:embed="rId10"/>
+              </a:ext>
+            </a:extLst>
+          </a:blip>
+          <a:stretch>
+            <a:fillRect/>
+          </a:stretch>
+        </p:blipFill>
+        <p:spPr>
+          <a:xfrm>
+            <a:off x="10826048" y="577634"/>
+            <a:ext cx="597332" cy="597332"/>
+          </a:xfrm>
+          <a:prstGeom prst="rect">
+            <a:avLst/>
+          </a:prstGeom>
+        </p:spPr>
+      </p:pic>
+      <p:pic>
+        <p:nvPicPr>
+          <p:cNvPr id="6" name="Graphique 5">
+            <a:extLst>
+              <a:ext uri="{FF2B5EF4-FFF2-40B4-BE49-F238E27FC236}">
+                <a16:creationId xmlns:a16="http://schemas.microsoft.com/office/drawing/2014/main" id="{B5BD16D9-81B0-555B-38CF-6BA4CC6F46BD}"/>
+              </a:ext>
+            </a:extLst>
+          </p:cNvPr>
+          <p:cNvPicPr>
+            <a:picLocks/>
+          </p:cNvPicPr>
+          <p:nvPr>
+            <p:custDataLst>
+              <p:tags r:id="rId4"/>
+            </p:custDataLst>
+          </p:nvPr>
+        </p:nvPicPr>
+        <p:blipFill>
+          <a:blip r:embed="rId11">
+            <a:extLst>
+              <a:ext uri="{96DAC541-7B7A-43D3-8B79-37D633B846F1}">
+                <asvg:svgBlip xmlns:asvg="http://schemas.microsoft.com/office/drawing/2016/SVG/main" r:embed="rId12"/>
+              </a:ext>
+            </a:extLst>
+          </a:blip>
+          <a:stretch>
+            <a:fillRect/>
+          </a:stretch>
+        </p:blipFill>
+        <p:spPr>
+          <a:xfrm>
+            <a:off x="3901440" y="617220"/>
+            <a:ext cx="1036320" cy="518160"/>
+          </a:xfrm>
+          <a:prstGeom prst="rect">
+            <a:avLst/>
+          </a:prstGeom>
+        </p:spPr>
+      </p:pic>
+      <p:pic>
+        <p:nvPicPr>
+          <p:cNvPr id="8" name="Graphique 7">
+            <a:extLst>
+              <a:ext uri="{FF2B5EF4-FFF2-40B4-BE49-F238E27FC236}">
+                <a16:creationId xmlns:a16="http://schemas.microsoft.com/office/drawing/2014/main" id="{1C998F70-3E48-C1AC-E7CB-EE233F949602}"/>
+              </a:ext>
+            </a:extLst>
+          </p:cNvPr>
+          <p:cNvPicPr>
+            <a:picLocks/>
+          </p:cNvPicPr>
+          <p:nvPr>
+            <p:custDataLst>
+              <p:tags r:id="rId5"/>
+            </p:custDataLst>
+          </p:nvPr>
+        </p:nvPicPr>
+        <p:blipFill>
+          <a:blip r:embed="rId13">
+            <a:extLst>
+              <a:ext uri="{96DAC541-7B7A-43D3-8B79-37D633B846F1}">
+                <asvg:svgBlip xmlns:asvg="http://schemas.microsoft.com/office/drawing/2016/SVG/main" r:embed="rId14"/>
+              </a:ext>
+            </a:extLst>
+          </a:blip>
+          <a:stretch>
+            <a:fillRect/>
+          </a:stretch>
+        </p:blipFill>
+        <p:spPr>
+          <a:xfrm>
+            <a:off x="1158240" y="2270760"/>
+            <a:ext cx="2316480" cy="2316480"/>
+          </a:xfrm>
+          <a:prstGeom prst="rect">
+            <a:avLst/>
+          </a:prstGeom>
+        </p:spPr>
+      </p:pic>
+      <p:sp>
+        <p:nvSpPr>
+          <p:cNvPr id="9" name="Rectangle 8">
+            <a:extLst>
+              <a:ext uri="{FF2B5EF4-FFF2-40B4-BE49-F238E27FC236}">
+                <a16:creationId xmlns:a16="http://schemas.microsoft.com/office/drawing/2014/main" id="{73557CE5-01F7-2C29-F5BC-A36EBB092163}"/>
+              </a:ext>
+            </a:extLst>
+          </p:cNvPr>
+          <p:cNvSpPr/>
+          <p:nvPr>
+            <p:custDataLst>
+              <p:tags r:id="rId6"/>
+            </p:custDataLst>
+          </p:nvPr>
+        </p:nvSpPr>
+        <p:spPr>
+          <a:xfrm>
+            <a:off x="3901440" y="2571750"/>
+            <a:ext cx="7315199" cy="1714500"/>
+          </a:xfrm>
+          <a:prstGeom prst="rect">
+            <a:avLst/>
+          </a:prstGeom>
+          <a:noFill/>
+          <a:ln w="19050" cap="flat" cmpd="sng" algn="ctr">
+            <a:solidFill>
+              <a:srgbClr val="FFFFFF"/>
+            </a:solidFill>
+            <a:prstDash val="solid"/>
+            <a:miter lim="800000"/>
+          </a:ln>
+          <a:effectLst/>
+          <a:extLst>
+            <a:ext uri="{909E8E84-426E-40DD-AFC4-6F175D3DCCD1}">
+              <a14:hiddenFill xmlns:a14="http://schemas.microsoft.com/office/drawing/2010/main">
+                <a:solidFill>
+                  <a:schemeClr val="accent1"/>
+                </a:solidFill>
+              </a14:hiddenFill>
+            </a:ext>
+          </a:extLst>
+        </p:spPr>
+        <p:style>
+          <a:lnRef idx="2">
+            <a:schemeClr val="accent1">
+              <a:shade val="15000"/>
+            </a:schemeClr>
+          </a:lnRef>
+          <a:fillRef idx="1">
+            <a:schemeClr val="accent1"/>
+          </a:fillRef>
+          <a:effectRef idx="0">
+            <a:schemeClr val="accent1"/>
+          </a:effectRef>
+          <a:fontRef idx="minor">
+            <a:schemeClr val="lt1"/>
+          </a:fontRef>
+        </p:style>
+        <p:txBody>
+          <a:bodyPr rtlCol="0" anchor="ctr"/>
+          <a:lstStyle/>
+          <a:p>
+            <a:r>
+              <a:rPr lang="fr-FR" sz="4000" b="1">
+                <a:solidFill>
+                  <a:srgbClr val="5B5B5B"/>
+                </a:solidFill>
+              </a:rPr>
+              <a:t>Dans une architecture de microservices, chaque service :</a:t>
+            </a:r>
+          </a:p>
+        </p:txBody>
+      </p:sp>
+      <p:sp>
+        <p:nvSpPr>
+          <p:cNvPr id="10" name="Rectangle 9">
+            <a:extLst>
+              <a:ext uri="{FF2B5EF4-FFF2-40B4-BE49-F238E27FC236}">
+                <a16:creationId xmlns:a16="http://schemas.microsoft.com/office/drawing/2014/main" id="{71E1B555-A395-28BF-3F91-B23324C4FB96}"/>
+              </a:ext>
+            </a:extLst>
+          </p:cNvPr>
+          <p:cNvSpPr/>
+          <p:nvPr>
+            <p:custDataLst>
+              <p:tags r:id="rId7"/>
+            </p:custDataLst>
+          </p:nvPr>
+        </p:nvSpPr>
+        <p:spPr>
+          <a:xfrm>
+            <a:off x="3901440" y="6032500"/>
+            <a:ext cx="7315199" cy="518160"/>
+          </a:xfrm>
+          <a:prstGeom prst="rect">
+            <a:avLst/>
+          </a:prstGeom>
+          <a:noFill/>
+          <a:ln w="19050" cap="flat" cmpd="sng" algn="ctr">
+            <a:noFill/>
+            <a:prstDash val="solid"/>
+            <a:miter lim="800000"/>
+          </a:ln>
+          <a:effectLst/>
+          <a:extLst>
+            <a:ext uri="{909E8E84-426E-40DD-AFC4-6F175D3DCCD1}">
+              <a14:hiddenFill xmlns:a14="http://schemas.microsoft.com/office/drawing/2010/main">
+                <a:solidFill>
+                  <a:schemeClr val="accent1"/>
+                </a:solidFill>
+              </a14:hiddenFill>
+            </a:ext>
+            <a:ext uri="{91240B29-F687-4F45-9708-019B960494DF}">
+              <a14:hiddenLine xmlns:a14="http://schemas.microsoft.com/office/drawing/2010/main" w="19050" cap="flat" cmpd="sng" algn="ctr">
+                <a:solidFill>
+                  <a:schemeClr val="accent1">
+                    <a:shade val="15000"/>
+                  </a:schemeClr>
+                </a:solidFill>
+                <a:prstDash val="solid"/>
+                <a:miter lim="800000"/>
+              </a14:hiddenLine>
+            </a:ext>
+          </a:extLst>
+        </p:spPr>
+        <p:style>
+          <a:lnRef idx="2">
+            <a:schemeClr val="accent1">
+              <a:shade val="15000"/>
+            </a:schemeClr>
+          </a:lnRef>
+          <a:fillRef idx="1">
+            <a:schemeClr val="accent1"/>
+          </a:fillRef>
+          <a:effectRef idx="0">
+            <a:schemeClr val="accent1"/>
+          </a:effectRef>
+          <a:fontRef idx="minor">
+            <a:schemeClr val="lt1"/>
+          </a:fontRef>
+        </p:style>
+        <p:txBody>
+          <a:bodyPr rtlCol="0" anchor="ctr">
+            <a:normAutofit/>
+          </a:bodyPr>
+          <a:lstStyle/>
+          <a:p>
+            <a:r>
+              <a:rPr lang="en-US" sz="2200" b="1">
+                <a:solidFill>
+                  <a:srgbClr val="5B5B5B"/>
+                </a:solidFill>
+              </a:rPr>
+              <a:t>ⓘ</a:t>
+            </a:r>
+            <a:r>
+              <a:rPr lang="en-US" sz="2000">
+                <a:solidFill>
+                  <a:srgbClr val="5B5B5B"/>
+                </a:solidFill>
+              </a:rPr>
+              <a:t> Start presenting to display the poll results on this slide.</a:t>
+            </a:r>
+            <a:endParaRPr lang="fr-FR" sz="2000">
+              <a:solidFill>
+                <a:srgbClr val="5B5B5B"/>
+              </a:solidFill>
+            </a:endParaRPr>
+          </a:p>
+        </p:txBody>
+      </p:sp>
+    </p:spTree>
+    <p:custDataLst>
+      <p:tags r:id="rId1"/>
+    </p:custDataLst>
+    <p:extLst>
+      <p:ext uri="{BB962C8B-B14F-4D97-AF65-F5344CB8AC3E}">
+        <p14:creationId xmlns:p14="http://schemas.microsoft.com/office/powerpoint/2010/main" val="3109318683"/>
+      </p:ext>
+    </p:extLst>
+  </p:cSld>
+  <p:clrMapOvr>
+    <a:masterClrMapping/>
+  </p:clrMapOvr>
+  <p:timing>
+    <p:tnLst>
+      <p:par>
+        <p:cTn id="1" dur="indefinite" restart="never" nodeType="tmRoot">
+          <p:childTnLst>
+            <p:seq concurrent="1" nextAc="seek">
+              <p:cTn id="2" dur="indefinite" nodeType="mainSeq">
+                <p:childTnLst>
+                  <p:par>
+                    <p:cTn id="3" fill="hold">
+                      <p:stCondLst>
+                        <p:cond delay="indefinite"/>
+                      </p:stCondLst>
+                      <p:childTnLst>
+                        <p:par>
+                          <p:cTn id="4" fill="hold">
+                            <p:stCondLst>
+                              <p:cond delay="0"/>
+                            </p:stCondLst>
+                            <p:childTnLst>
+                              <p:par>
+                                <p:cTn id="5" presetID="26" presetClass="emph" presetSubtype="0" fill="hold" grpId="0" nodeType="clickEffect">
+                                  <p:stCondLst>
+                                    <p:cond delay="0"/>
+                                  </p:stCondLst>
+                                  <p:childTnLst>
+                                    <p:animEffect transition="out" filter="fade">
+                                      <p:cBhvr>
+                                        <p:cTn id="6" dur="50" tmFilter="0, 0; .2, .5; .8, .5; 1, 0"/>
+                                        <p:tgtEl>
+                                          <p:spTgt spid="9"/>
+                                        </p:tgtEl>
+                                      </p:cBhvr>
+                                    </p:animEffect>
+                                    <p:animScale>
+                                      <p:cBhvr>
+                                        <p:cTn id="7" dur="25" autoRev="1" fill="hold"/>
+                                        <p:tgtEl>
+                                          <p:spTgt spid="9"/>
+                                        </p:tgtEl>
+                                      </p:cBhvr>
+                                      <p:by x="105000" y="105000"/>
+                                    </p:animScale>
+                                  </p:childTnLst>
+                                </p:cTn>
+                              </p:par>
+                            </p:childTnLst>
+                          </p:cTn>
+                        </p:par>
+                      </p:childTnLst>
+                    </p:cTn>
+                  </p:par>
+                  <p:par>
+                    <p:cTn id="8" fill="hold">
+                      <p:stCondLst>
+                        <p:cond delay="indefinite"/>
+                      </p:stCondLst>
+                      <p:childTnLst>
+                        <p:par>
+                          <p:cTn id="9" fill="hold">
+                            <p:stCondLst>
+                              <p:cond delay="0"/>
+                            </p:stCondLst>
+                            <p:childTnLst>
+                              <p:par>
+                                <p:cTn id="10" presetID="26" presetClass="emph" presetSubtype="0" fill="hold" grpId="1" nodeType="clickEffect">
+                                  <p:stCondLst>
+                                    <p:cond delay="0"/>
+                                  </p:stCondLst>
+                                  <p:childTnLst>
+                                    <p:animEffect transition="out" filter="fade">
+                                      <p:cBhvr>
+                                        <p:cTn id="11" dur="50" tmFilter="0, 0; .2, .5; .8, .5; 1, 0"/>
+                                        <p:tgtEl>
+                                          <p:spTgt spid="9"/>
+                                        </p:tgtEl>
+                                      </p:cBhvr>
+                                    </p:animEffect>
+                                    <p:animScale>
+                                      <p:cBhvr>
+                                        <p:cTn id="12" dur="25" autoRev="1" fill="hold"/>
+                                        <p:tgtEl>
+                                          <p:spTgt spid="9"/>
+                                        </p:tgtEl>
+                                      </p:cBhvr>
+                                      <p:by x="105000" y="105000"/>
+                                    </p:animScale>
+                                  </p:childTnLst>
+                                </p:cTn>
+                              </p:par>
+                            </p:childTnLst>
+                          </p:cTn>
+                        </p:par>
+                      </p:childTnLst>
+                    </p:cTn>
+                  </p:par>
+                </p:childTnLst>
+              </p:cTn>
+              <p:prevCondLst>
+                <p:cond evt="onPrev" delay="0">
+                  <p:tgtEl>
+                    <p:sldTgt/>
+                  </p:tgtEl>
+                </p:cond>
+              </p:prevCondLst>
+              <p:nextCondLst>
+                <p:cond evt="onNext" delay="0">
+                  <p:tgtEl>
+                    <p:sldTgt/>
+                  </p:tgtEl>
+                </p:cond>
+              </p:nextCondLst>
+            </p:seq>
+          </p:childTnLst>
+        </p:cTn>
+      </p:par>
+    </p:tnLst>
+    <p:bldLst>
+      <p:bldP spid="9" grpId="0" animBg="1"/>
+      <p:bldP spid="9" grpId="1" animBg="1"/>
+    </p:bldLst>
+  </p:timing>
+</p:sld>
+</file>
+
+<file path=ppt/slides/slide18.xml><?xml version="1.0" encoding="utf-8"?>
+<p:sld xmlns:a="http://schemas.openxmlformats.org/drawingml/2006/main" xmlns:r="http://schemas.openxmlformats.org/officeDocument/2006/relationships" xmlns:p="http://schemas.openxmlformats.org/presentationml/2006/main" showMasterSp="0">
+  <p:cSld>
+    <p:bg>
+      <p:bgPr>
+        <a:solidFill>
+          <a:srgbClr val="FFFFFF"/>
+        </a:solidFill>
+        <a:effectLst/>
+      </p:bgPr>
+    </p:bg>
+    <p:spTree>
+      <p:nvGrpSpPr>
+        <p:cNvPr id="1" name=""/>
+        <p:cNvGrpSpPr/>
+        <p:nvPr/>
+      </p:nvGrpSpPr>
+      <p:grpSpPr>
+        <a:xfrm>
+          <a:off x="0" y="0"/>
+          <a:ext cx="0" cy="0"/>
+          <a:chOff x="0" y="0"/>
+          <a:chExt cx="0" cy="0"/>
+        </a:xfrm>
+      </p:grpSpPr>
+      <p:sp>
+        <p:nvSpPr>
+          <p:cNvPr id="2" name="Rectangle : coins arrondis 1">
+            <a:extLst>
+              <a:ext uri="{FF2B5EF4-FFF2-40B4-BE49-F238E27FC236}">
+                <a16:creationId xmlns:a16="http://schemas.microsoft.com/office/drawing/2014/main" id="{37D71FE4-7AD7-4095-0FA7-C3167E6AF95B}"/>
+              </a:ext>
+            </a:extLst>
+          </p:cNvPr>
+          <p:cNvSpPr/>
+          <p:nvPr>
+            <p:custDataLst>
+              <p:tags r:id="rId2"/>
+            </p:custDataLst>
+          </p:nvPr>
+        </p:nvSpPr>
+        <p:spPr>
+          <a:xfrm>
+            <a:off x="6286500" y="430530"/>
+            <a:ext cx="5524500" cy="891540"/>
+          </a:xfrm>
+          <a:prstGeom prst="roundRect">
+            <a:avLst/>
+          </a:prstGeom>
+          <a:solidFill>
+            <a:srgbClr val="F4F4F4"/>
+          </a:solidFill>
+          <a:ln w="19050" cap="flat" cmpd="sng" algn="ctr">
+            <a:noFill/>
+            <a:prstDash val="solid"/>
+            <a:miter lim="800000"/>
+          </a:ln>
+          <a:effectLst/>
+          <a:extLst>
+            <a:ext uri="{91240B29-F687-4F45-9708-019B960494DF}">
+              <a14:hiddenLine xmlns:a14="http://schemas.microsoft.com/office/drawing/2010/main" w="19050" cap="flat" cmpd="sng" algn="ctr">
+                <a:solidFill>
+                  <a:schemeClr val="accent1">
+                    <a:shade val="15000"/>
+                  </a:schemeClr>
+                </a:solidFill>
+                <a:prstDash val="solid"/>
+                <a:miter lim="800000"/>
+              </a14:hiddenLine>
+            </a:ext>
+          </a:extLst>
+        </p:spPr>
+        <p:style>
+          <a:lnRef idx="2">
+            <a:schemeClr val="accent1">
+              <a:shade val="15000"/>
+            </a:schemeClr>
+          </a:lnRef>
+          <a:fillRef idx="1">
+            <a:schemeClr val="accent1"/>
+          </a:fillRef>
+          <a:effectRef idx="0">
+            <a:schemeClr val="accent1"/>
+          </a:effectRef>
+          <a:fontRef idx="minor">
+            <a:schemeClr val="lt1"/>
+          </a:fontRef>
+        </p:style>
+        <p:txBody>
+          <a:bodyPr lIns="317500" rIns="1143000" rtlCol="0" anchor="ctr">
+            <a:normAutofit/>
+          </a:bodyPr>
+          <a:lstStyle/>
+          <a:p>
+            <a:r>
+              <a:rPr lang="en-US" sz="2000">
+                <a:solidFill>
+                  <a:srgbClr val="5B5B5B"/>
+                </a:solidFill>
+              </a:rPr>
+              <a:t>Please download and install the Slido app on all computers you use</a:t>
+            </a:r>
+            <a:endParaRPr lang="fr-FR" sz="2000">
+              <a:solidFill>
+                <a:srgbClr val="5B5B5B"/>
+              </a:solidFill>
+            </a:endParaRPr>
+          </a:p>
+        </p:txBody>
+      </p:sp>
+      <p:pic>
+        <p:nvPicPr>
+          <p:cNvPr id="4" name="Graphique 3">
+            <a:extLst>
+              <a:ext uri="{FF2B5EF4-FFF2-40B4-BE49-F238E27FC236}">
+                <a16:creationId xmlns:a16="http://schemas.microsoft.com/office/drawing/2014/main" id="{90C78809-7264-3ABD-1F82-5C90A6C6635C}"/>
+              </a:ext>
+            </a:extLst>
+          </p:cNvPr>
+          <p:cNvPicPr>
+            <a:picLocks/>
+          </p:cNvPicPr>
+          <p:nvPr>
+            <p:custDataLst>
+              <p:tags r:id="rId3"/>
+            </p:custDataLst>
+          </p:nvPr>
+        </p:nvPicPr>
+        <p:blipFill>
+          <a:blip r:embed="rId9">
+            <a:extLst>
+              <a:ext uri="{96DAC541-7B7A-43D3-8B79-37D633B846F1}">
+                <asvg:svgBlip xmlns:asvg="http://schemas.microsoft.com/office/drawing/2016/SVG/main" r:embed="rId10"/>
+              </a:ext>
+            </a:extLst>
+          </a:blip>
+          <a:stretch>
+            <a:fillRect/>
+          </a:stretch>
+        </p:blipFill>
+        <p:spPr>
+          <a:xfrm>
+            <a:off x="10826048" y="577634"/>
+            <a:ext cx="597332" cy="597332"/>
+          </a:xfrm>
+          <a:prstGeom prst="rect">
+            <a:avLst/>
+          </a:prstGeom>
+        </p:spPr>
+      </p:pic>
+      <p:pic>
+        <p:nvPicPr>
+          <p:cNvPr id="6" name="Graphique 5">
+            <a:extLst>
+              <a:ext uri="{FF2B5EF4-FFF2-40B4-BE49-F238E27FC236}">
+                <a16:creationId xmlns:a16="http://schemas.microsoft.com/office/drawing/2014/main" id="{E5B98E9D-BCDA-B281-9C8F-7C5BECB65C81}"/>
+              </a:ext>
+            </a:extLst>
+          </p:cNvPr>
+          <p:cNvPicPr>
+            <a:picLocks/>
+          </p:cNvPicPr>
+          <p:nvPr>
+            <p:custDataLst>
+              <p:tags r:id="rId4"/>
+            </p:custDataLst>
+          </p:nvPr>
+        </p:nvPicPr>
+        <p:blipFill>
+          <a:blip r:embed="rId11">
+            <a:extLst>
+              <a:ext uri="{96DAC541-7B7A-43D3-8B79-37D633B846F1}">
+                <asvg:svgBlip xmlns:asvg="http://schemas.microsoft.com/office/drawing/2016/SVG/main" r:embed="rId12"/>
+              </a:ext>
+            </a:extLst>
+          </a:blip>
+          <a:stretch>
+            <a:fillRect/>
+          </a:stretch>
+        </p:blipFill>
+        <p:spPr>
+          <a:xfrm>
+            <a:off x="3901440" y="617220"/>
+            <a:ext cx="1036320" cy="518160"/>
+          </a:xfrm>
+          <a:prstGeom prst="rect">
+            <a:avLst/>
+          </a:prstGeom>
+        </p:spPr>
+      </p:pic>
+      <p:pic>
+        <p:nvPicPr>
+          <p:cNvPr id="8" name="Graphique 7">
+            <a:extLst>
+              <a:ext uri="{FF2B5EF4-FFF2-40B4-BE49-F238E27FC236}">
+                <a16:creationId xmlns:a16="http://schemas.microsoft.com/office/drawing/2014/main" id="{7E3EC559-FC3F-01AB-8060-8B5A71534505}"/>
+              </a:ext>
+            </a:extLst>
+          </p:cNvPr>
+          <p:cNvPicPr>
+            <a:picLocks/>
+          </p:cNvPicPr>
+          <p:nvPr>
+            <p:custDataLst>
+              <p:tags r:id="rId5"/>
+            </p:custDataLst>
+          </p:nvPr>
+        </p:nvPicPr>
+        <p:blipFill>
+          <a:blip r:embed="rId13">
+            <a:extLst>
+              <a:ext uri="{96DAC541-7B7A-43D3-8B79-37D633B846F1}">
+                <asvg:svgBlip xmlns:asvg="http://schemas.microsoft.com/office/drawing/2016/SVG/main" r:embed="rId14"/>
+              </a:ext>
+            </a:extLst>
+          </a:blip>
+          <a:stretch>
+            <a:fillRect/>
+          </a:stretch>
+        </p:blipFill>
+        <p:spPr>
+          <a:xfrm>
+            <a:off x="1158240" y="2270760"/>
+            <a:ext cx="2316480" cy="2316480"/>
+          </a:xfrm>
+          <a:prstGeom prst="rect">
+            <a:avLst/>
+          </a:prstGeom>
+        </p:spPr>
+      </p:pic>
+      <p:sp>
+        <p:nvSpPr>
+          <p:cNvPr id="9" name="Rectangle 8">
+            <a:extLst>
+              <a:ext uri="{FF2B5EF4-FFF2-40B4-BE49-F238E27FC236}">
+                <a16:creationId xmlns:a16="http://schemas.microsoft.com/office/drawing/2014/main" id="{C6F2EEF4-B60C-8BD5-FF92-99A1FA74BA53}"/>
+              </a:ext>
+            </a:extLst>
+          </p:cNvPr>
+          <p:cNvSpPr/>
+          <p:nvPr>
+            <p:custDataLst>
+              <p:tags r:id="rId6"/>
+            </p:custDataLst>
+          </p:nvPr>
+        </p:nvSpPr>
+        <p:spPr>
+          <a:xfrm>
+            <a:off x="3901440" y="2571750"/>
+            <a:ext cx="7315199" cy="1714500"/>
+          </a:xfrm>
+          <a:prstGeom prst="rect">
+            <a:avLst/>
+          </a:prstGeom>
+          <a:noFill/>
+          <a:ln w="19050" cap="flat" cmpd="sng" algn="ctr">
+            <a:solidFill>
+              <a:srgbClr val="FFFFFF"/>
+            </a:solidFill>
+            <a:prstDash val="solid"/>
+            <a:miter lim="800000"/>
+          </a:ln>
+          <a:effectLst/>
+          <a:extLst>
+            <a:ext uri="{909E8E84-426E-40DD-AFC4-6F175D3DCCD1}">
+              <a14:hiddenFill xmlns:a14="http://schemas.microsoft.com/office/drawing/2010/main">
+                <a:solidFill>
+                  <a:schemeClr val="accent1"/>
+                </a:solidFill>
+              </a14:hiddenFill>
+            </a:ext>
+          </a:extLst>
+        </p:spPr>
+        <p:style>
+          <a:lnRef idx="2">
+            <a:schemeClr val="accent1">
+              <a:shade val="15000"/>
+            </a:schemeClr>
+          </a:lnRef>
+          <a:fillRef idx="1">
+            <a:schemeClr val="accent1"/>
+          </a:fillRef>
+          <a:effectRef idx="0">
+            <a:schemeClr val="accent1"/>
+          </a:effectRef>
+          <a:fontRef idx="minor">
+            <a:schemeClr val="lt1"/>
+          </a:fontRef>
+        </p:style>
+        <p:txBody>
+          <a:bodyPr rtlCol="0" anchor="ctr"/>
+          <a:lstStyle/>
+          <a:p>
+            <a:r>
+              <a:rPr lang="fr-FR" sz="2800" b="1">
+                <a:solidFill>
+                  <a:srgbClr val="5B5B5B"/>
+                </a:solidFill>
+              </a:rPr>
+              <a:t>Pourquoi une architecture microservices facilite-t-elle le développement par des équipes indépendantes ?</a:t>
+            </a:r>
+          </a:p>
+        </p:txBody>
+      </p:sp>
+      <p:sp>
+        <p:nvSpPr>
+          <p:cNvPr id="10" name="Rectangle 9">
+            <a:extLst>
+              <a:ext uri="{FF2B5EF4-FFF2-40B4-BE49-F238E27FC236}">
+                <a16:creationId xmlns:a16="http://schemas.microsoft.com/office/drawing/2014/main" id="{7BE14ADD-FC53-CEF1-587E-6B6C6672DD0F}"/>
+              </a:ext>
+            </a:extLst>
+          </p:cNvPr>
+          <p:cNvSpPr/>
+          <p:nvPr>
+            <p:custDataLst>
+              <p:tags r:id="rId7"/>
+            </p:custDataLst>
+          </p:nvPr>
+        </p:nvSpPr>
+        <p:spPr>
+          <a:xfrm>
+            <a:off x="3901440" y="6032500"/>
+            <a:ext cx="7315199" cy="518160"/>
+          </a:xfrm>
+          <a:prstGeom prst="rect">
+            <a:avLst/>
+          </a:prstGeom>
+          <a:noFill/>
+          <a:ln w="19050" cap="flat" cmpd="sng" algn="ctr">
+            <a:noFill/>
+            <a:prstDash val="solid"/>
+            <a:miter lim="800000"/>
+          </a:ln>
+          <a:effectLst/>
+          <a:extLst>
+            <a:ext uri="{909E8E84-426E-40DD-AFC4-6F175D3DCCD1}">
+              <a14:hiddenFill xmlns:a14="http://schemas.microsoft.com/office/drawing/2010/main">
+                <a:solidFill>
+                  <a:schemeClr val="accent1"/>
+                </a:solidFill>
+              </a14:hiddenFill>
+            </a:ext>
+            <a:ext uri="{91240B29-F687-4F45-9708-019B960494DF}">
+              <a14:hiddenLine xmlns:a14="http://schemas.microsoft.com/office/drawing/2010/main" w="19050" cap="flat" cmpd="sng" algn="ctr">
+                <a:solidFill>
+                  <a:schemeClr val="accent1">
+                    <a:shade val="15000"/>
+                  </a:schemeClr>
+                </a:solidFill>
+                <a:prstDash val="solid"/>
+                <a:miter lim="800000"/>
+              </a14:hiddenLine>
+            </a:ext>
+          </a:extLst>
+        </p:spPr>
+        <p:style>
+          <a:lnRef idx="2">
+            <a:schemeClr val="accent1">
+              <a:shade val="15000"/>
+            </a:schemeClr>
+          </a:lnRef>
+          <a:fillRef idx="1">
+            <a:schemeClr val="accent1"/>
+          </a:fillRef>
+          <a:effectRef idx="0">
+            <a:schemeClr val="accent1"/>
+          </a:effectRef>
+          <a:fontRef idx="minor">
+            <a:schemeClr val="lt1"/>
+          </a:fontRef>
+        </p:style>
+        <p:txBody>
+          <a:bodyPr rtlCol="0" anchor="ctr">
+            <a:normAutofit/>
+          </a:bodyPr>
+          <a:lstStyle/>
+          <a:p>
+            <a:r>
+              <a:rPr lang="en-US" sz="2200" b="1">
+                <a:solidFill>
+                  <a:srgbClr val="5B5B5B"/>
+                </a:solidFill>
+              </a:rPr>
+              <a:t>ⓘ</a:t>
+            </a:r>
+            <a:r>
+              <a:rPr lang="en-US" sz="2000">
+                <a:solidFill>
+                  <a:srgbClr val="5B5B5B"/>
+                </a:solidFill>
+              </a:rPr>
+              <a:t> Start presenting to display the poll results on this slide.</a:t>
+            </a:r>
+            <a:endParaRPr lang="fr-FR" sz="2000">
+              <a:solidFill>
+                <a:srgbClr val="5B5B5B"/>
+              </a:solidFill>
+            </a:endParaRPr>
+          </a:p>
+        </p:txBody>
+      </p:sp>
+    </p:spTree>
+    <p:custDataLst>
+      <p:tags r:id="rId1"/>
+    </p:custDataLst>
+    <p:extLst>
+      <p:ext uri="{BB962C8B-B14F-4D97-AF65-F5344CB8AC3E}">
+        <p14:creationId xmlns:p14="http://schemas.microsoft.com/office/powerpoint/2010/main" val="1906666927"/>
+      </p:ext>
+    </p:extLst>
+  </p:cSld>
+  <p:clrMapOvr>
+    <a:masterClrMapping/>
+  </p:clrMapOvr>
+  <p:timing>
+    <p:tnLst>
+      <p:par>
+        <p:cTn id="1" dur="indefinite" restart="never" nodeType="tmRoot">
+          <p:childTnLst>
+            <p:seq concurrent="1" nextAc="seek">
+              <p:cTn id="2" dur="indefinite" nodeType="mainSeq">
+                <p:childTnLst>
+                  <p:par>
+                    <p:cTn id="3" fill="hold">
+                      <p:stCondLst>
+                        <p:cond delay="indefinite"/>
+                      </p:stCondLst>
+                      <p:childTnLst>
+                        <p:par>
+                          <p:cTn id="4" fill="hold">
+                            <p:stCondLst>
+                              <p:cond delay="0"/>
+                            </p:stCondLst>
+                            <p:childTnLst>
+                              <p:par>
+                                <p:cTn id="5" presetID="26" presetClass="emph" presetSubtype="0" fill="hold" grpId="0" nodeType="clickEffect">
+                                  <p:stCondLst>
+                                    <p:cond delay="0"/>
+                                  </p:stCondLst>
+                                  <p:childTnLst>
+                                    <p:animEffect transition="out" filter="fade">
+                                      <p:cBhvr>
+                                        <p:cTn id="6" dur="50" tmFilter="0, 0; .2, .5; .8, .5; 1, 0"/>
+                                        <p:tgtEl>
+                                          <p:spTgt spid="9"/>
+                                        </p:tgtEl>
+                                      </p:cBhvr>
+                                    </p:animEffect>
+                                    <p:animScale>
+                                      <p:cBhvr>
+                                        <p:cTn id="7" dur="25" autoRev="1" fill="hold"/>
+                                        <p:tgtEl>
+                                          <p:spTgt spid="9"/>
+                                        </p:tgtEl>
+                                      </p:cBhvr>
+                                      <p:by x="105000" y="105000"/>
+                                    </p:animScale>
+                                  </p:childTnLst>
+                                </p:cTn>
+                              </p:par>
+                            </p:childTnLst>
+                          </p:cTn>
+                        </p:par>
+                      </p:childTnLst>
+                    </p:cTn>
+                  </p:par>
+                  <p:par>
+                    <p:cTn id="8" fill="hold">
+                      <p:stCondLst>
+                        <p:cond delay="indefinite"/>
+                      </p:stCondLst>
+                      <p:childTnLst>
+                        <p:par>
+                          <p:cTn id="9" fill="hold">
+                            <p:stCondLst>
+                              <p:cond delay="0"/>
+                            </p:stCondLst>
+                            <p:childTnLst>
+                              <p:par>
+                                <p:cTn id="10" presetID="26" presetClass="emph" presetSubtype="0" fill="hold" grpId="1" nodeType="clickEffect">
+                                  <p:stCondLst>
+                                    <p:cond delay="0"/>
+                                  </p:stCondLst>
+                                  <p:childTnLst>
+                                    <p:animEffect transition="out" filter="fade">
+                                      <p:cBhvr>
+                                        <p:cTn id="11" dur="50" tmFilter="0, 0; .2, .5; .8, .5; 1, 0"/>
+                                        <p:tgtEl>
+                                          <p:spTgt spid="9"/>
+                                        </p:tgtEl>
+                                      </p:cBhvr>
+                                    </p:animEffect>
+                                    <p:animScale>
+                                      <p:cBhvr>
+                                        <p:cTn id="12" dur="25" autoRev="1" fill="hold"/>
+                                        <p:tgtEl>
+                                          <p:spTgt spid="9"/>
+                                        </p:tgtEl>
+                                      </p:cBhvr>
+                                      <p:by x="105000" y="105000"/>
+                                    </p:animScale>
+                                  </p:childTnLst>
+                                </p:cTn>
+                              </p:par>
+                            </p:childTnLst>
+                          </p:cTn>
+                        </p:par>
+                      </p:childTnLst>
+                    </p:cTn>
+                  </p:par>
+                </p:childTnLst>
+              </p:cTn>
+              <p:prevCondLst>
+                <p:cond evt="onPrev" delay="0">
+                  <p:tgtEl>
+                    <p:sldTgt/>
+                  </p:tgtEl>
+                </p:cond>
+              </p:prevCondLst>
+              <p:nextCondLst>
+                <p:cond evt="onNext" delay="0">
+                  <p:tgtEl>
+                    <p:sldTgt/>
+                  </p:tgtEl>
+                </p:cond>
+              </p:nextCondLst>
+            </p:seq>
+          </p:childTnLst>
+        </p:cTn>
+      </p:par>
+    </p:tnLst>
+    <p:bldLst>
+      <p:bldP spid="9" grpId="0" animBg="1"/>
+      <p:bldP spid="9" grpId="1" animBg="1"/>
+    </p:bldLst>
+  </p:timing>
+</p:sld>
+</file>
+
+<file path=ppt/slides/slide19.xml><?xml version="1.0" encoding="utf-8"?>
+<p:sld xmlns:a="http://schemas.openxmlformats.org/drawingml/2006/main" xmlns:r="http://schemas.openxmlformats.org/officeDocument/2006/relationships" xmlns:p="http://schemas.openxmlformats.org/presentationml/2006/main" showMasterSp="0">
+  <p:cSld>
+    <p:bg>
+      <p:bgPr>
+        <a:solidFill>
+          <a:srgbClr val="FFFFFF"/>
+        </a:solidFill>
+        <a:effectLst/>
+      </p:bgPr>
+    </p:bg>
+    <p:spTree>
+      <p:nvGrpSpPr>
+        <p:cNvPr id="1" name=""/>
+        <p:cNvGrpSpPr/>
+        <p:nvPr/>
+      </p:nvGrpSpPr>
+      <p:grpSpPr>
+        <a:xfrm>
+          <a:off x="0" y="0"/>
+          <a:ext cx="0" cy="0"/>
+          <a:chOff x="0" y="0"/>
+          <a:chExt cx="0" cy="0"/>
+        </a:xfrm>
+      </p:grpSpPr>
+      <p:sp>
+        <p:nvSpPr>
+          <p:cNvPr id="2" name="Rectangle : coins arrondis 1">
+            <a:extLst>
+              <a:ext uri="{FF2B5EF4-FFF2-40B4-BE49-F238E27FC236}">
+                <a16:creationId xmlns:a16="http://schemas.microsoft.com/office/drawing/2014/main" id="{862192BB-0912-1C42-59AE-674173CEAB59}"/>
+              </a:ext>
+            </a:extLst>
+          </p:cNvPr>
+          <p:cNvSpPr/>
+          <p:nvPr>
+            <p:custDataLst>
+              <p:tags r:id="rId2"/>
+            </p:custDataLst>
+          </p:nvPr>
+        </p:nvSpPr>
+        <p:spPr>
+          <a:xfrm>
+            <a:off x="6286500" y="430530"/>
+            <a:ext cx="5524500" cy="891540"/>
+          </a:xfrm>
+          <a:prstGeom prst="roundRect">
+            <a:avLst/>
+          </a:prstGeom>
+          <a:solidFill>
+            <a:srgbClr val="F4F4F4"/>
+          </a:solidFill>
+          <a:ln w="19050" cap="flat" cmpd="sng" algn="ctr">
+            <a:noFill/>
+            <a:prstDash val="solid"/>
+            <a:miter lim="800000"/>
+          </a:ln>
+          <a:effectLst/>
+          <a:extLst>
+            <a:ext uri="{91240B29-F687-4F45-9708-019B960494DF}">
+              <a14:hiddenLine xmlns:a14="http://schemas.microsoft.com/office/drawing/2010/main" w="19050" cap="flat" cmpd="sng" algn="ctr">
+                <a:solidFill>
+                  <a:schemeClr val="accent1">
+                    <a:shade val="15000"/>
+                  </a:schemeClr>
+                </a:solidFill>
+                <a:prstDash val="solid"/>
+                <a:miter lim="800000"/>
+              </a14:hiddenLine>
+            </a:ext>
+          </a:extLst>
+        </p:spPr>
+        <p:style>
+          <a:lnRef idx="2">
+            <a:schemeClr val="accent1">
+              <a:shade val="15000"/>
+            </a:schemeClr>
+          </a:lnRef>
+          <a:fillRef idx="1">
+            <a:schemeClr val="accent1"/>
+          </a:fillRef>
+          <a:effectRef idx="0">
+            <a:schemeClr val="accent1"/>
+          </a:effectRef>
+          <a:fontRef idx="minor">
+            <a:schemeClr val="lt1"/>
+          </a:fontRef>
+        </p:style>
+        <p:txBody>
+          <a:bodyPr lIns="317500" rIns="1143000" rtlCol="0" anchor="ctr">
+            <a:normAutofit/>
+          </a:bodyPr>
+          <a:lstStyle/>
+          <a:p>
+            <a:r>
+              <a:rPr lang="en-US" sz="2000">
+                <a:solidFill>
+                  <a:srgbClr val="5B5B5B"/>
+                </a:solidFill>
+              </a:rPr>
+              <a:t>Please download and install the Slido app on all computers you use</a:t>
+            </a:r>
+            <a:endParaRPr lang="fr-FR" sz="2000">
+              <a:solidFill>
+                <a:srgbClr val="5B5B5B"/>
+              </a:solidFill>
+            </a:endParaRPr>
+          </a:p>
+        </p:txBody>
+      </p:sp>
+      <p:pic>
+        <p:nvPicPr>
+          <p:cNvPr id="4" name="Graphique 3">
+            <a:extLst>
+              <a:ext uri="{FF2B5EF4-FFF2-40B4-BE49-F238E27FC236}">
+                <a16:creationId xmlns:a16="http://schemas.microsoft.com/office/drawing/2014/main" id="{08A34083-555A-DD2E-32C9-307BC0E39BB2}"/>
+              </a:ext>
+            </a:extLst>
+          </p:cNvPr>
+          <p:cNvPicPr>
+            <a:picLocks/>
+          </p:cNvPicPr>
+          <p:nvPr>
+            <p:custDataLst>
+              <p:tags r:id="rId3"/>
+            </p:custDataLst>
+          </p:nvPr>
+        </p:nvPicPr>
+        <p:blipFill>
+          <a:blip r:embed="rId9">
+            <a:extLst>
+              <a:ext uri="{96DAC541-7B7A-43D3-8B79-37D633B846F1}">
+                <asvg:svgBlip xmlns:asvg="http://schemas.microsoft.com/office/drawing/2016/SVG/main" r:embed="rId10"/>
+              </a:ext>
+            </a:extLst>
+          </a:blip>
+          <a:stretch>
+            <a:fillRect/>
+          </a:stretch>
+        </p:blipFill>
+        <p:spPr>
+          <a:xfrm>
+            <a:off x="10826048" y="577634"/>
+            <a:ext cx="597332" cy="597332"/>
+          </a:xfrm>
+          <a:prstGeom prst="rect">
+            <a:avLst/>
+          </a:prstGeom>
+        </p:spPr>
+      </p:pic>
+      <p:pic>
+        <p:nvPicPr>
+          <p:cNvPr id="6" name="Graphique 5">
+            <a:extLst>
+              <a:ext uri="{FF2B5EF4-FFF2-40B4-BE49-F238E27FC236}">
+                <a16:creationId xmlns:a16="http://schemas.microsoft.com/office/drawing/2014/main" id="{F382B455-A915-6191-1215-0EC5C9B7C95F}"/>
+              </a:ext>
+            </a:extLst>
+          </p:cNvPr>
+          <p:cNvPicPr>
+            <a:picLocks/>
+          </p:cNvPicPr>
+          <p:nvPr>
+            <p:custDataLst>
+              <p:tags r:id="rId4"/>
+            </p:custDataLst>
+          </p:nvPr>
+        </p:nvPicPr>
+        <p:blipFill>
+          <a:blip r:embed="rId11">
+            <a:extLst>
+              <a:ext uri="{96DAC541-7B7A-43D3-8B79-37D633B846F1}">
+                <asvg:svgBlip xmlns:asvg="http://schemas.microsoft.com/office/drawing/2016/SVG/main" r:embed="rId12"/>
+              </a:ext>
+            </a:extLst>
+          </a:blip>
+          <a:stretch>
+            <a:fillRect/>
+          </a:stretch>
+        </p:blipFill>
+        <p:spPr>
+          <a:xfrm>
+            <a:off x="3901440" y="617220"/>
+            <a:ext cx="1036320" cy="518160"/>
+          </a:xfrm>
+          <a:prstGeom prst="rect">
+            <a:avLst/>
+          </a:prstGeom>
+        </p:spPr>
+      </p:pic>
+      <p:pic>
+        <p:nvPicPr>
+          <p:cNvPr id="8" name="Graphique 7">
+            <a:extLst>
+              <a:ext uri="{FF2B5EF4-FFF2-40B4-BE49-F238E27FC236}">
+                <a16:creationId xmlns:a16="http://schemas.microsoft.com/office/drawing/2014/main" id="{43BD2ED6-4FA1-3D3A-E1B2-4AE744499268}"/>
+              </a:ext>
+            </a:extLst>
+          </p:cNvPr>
+          <p:cNvPicPr>
+            <a:picLocks/>
+          </p:cNvPicPr>
+          <p:nvPr>
+            <p:custDataLst>
+              <p:tags r:id="rId5"/>
+            </p:custDataLst>
+          </p:nvPr>
+        </p:nvPicPr>
+        <p:blipFill>
+          <a:blip r:embed="rId13">
+            <a:extLst>
+              <a:ext uri="{96DAC541-7B7A-43D3-8B79-37D633B846F1}">
+                <asvg:svgBlip xmlns:asvg="http://schemas.microsoft.com/office/drawing/2016/SVG/main" r:embed="rId14"/>
+              </a:ext>
+            </a:extLst>
+          </a:blip>
+          <a:stretch>
+            <a:fillRect/>
+          </a:stretch>
+        </p:blipFill>
+        <p:spPr>
+          <a:xfrm>
+            <a:off x="1158240" y="2270760"/>
+            <a:ext cx="2316480" cy="2316480"/>
+          </a:xfrm>
+          <a:prstGeom prst="rect">
+            <a:avLst/>
+          </a:prstGeom>
+        </p:spPr>
+      </p:pic>
+      <p:sp>
+        <p:nvSpPr>
+          <p:cNvPr id="9" name="Rectangle 8">
+            <a:extLst>
+              <a:ext uri="{FF2B5EF4-FFF2-40B4-BE49-F238E27FC236}">
+                <a16:creationId xmlns:a16="http://schemas.microsoft.com/office/drawing/2014/main" id="{65476B53-05F1-3013-22B2-7E1BAB4504A3}"/>
+              </a:ext>
+            </a:extLst>
+          </p:cNvPr>
+          <p:cNvSpPr/>
+          <p:nvPr>
+            <p:custDataLst>
+              <p:tags r:id="rId6"/>
+            </p:custDataLst>
+          </p:nvPr>
+        </p:nvSpPr>
+        <p:spPr>
+          <a:xfrm>
+            <a:off x="3901440" y="2571750"/>
+            <a:ext cx="7315199" cy="1714500"/>
+          </a:xfrm>
+          <a:prstGeom prst="rect">
+            <a:avLst/>
+          </a:prstGeom>
+          <a:noFill/>
+          <a:ln w="19050" cap="flat" cmpd="sng" algn="ctr">
+            <a:solidFill>
+              <a:srgbClr val="FFFFFF"/>
+            </a:solidFill>
+            <a:prstDash val="solid"/>
+            <a:miter lim="800000"/>
+          </a:ln>
+          <a:effectLst/>
+          <a:extLst>
+            <a:ext uri="{909E8E84-426E-40DD-AFC4-6F175D3DCCD1}">
+              <a14:hiddenFill xmlns:a14="http://schemas.microsoft.com/office/drawing/2010/main">
+                <a:solidFill>
+                  <a:schemeClr val="accent1"/>
+                </a:solidFill>
+              </a14:hiddenFill>
+            </a:ext>
+          </a:extLst>
+        </p:spPr>
+        <p:style>
+          <a:lnRef idx="2">
+            <a:schemeClr val="accent1">
+              <a:shade val="15000"/>
+            </a:schemeClr>
+          </a:lnRef>
+          <a:fillRef idx="1">
+            <a:schemeClr val="accent1"/>
+          </a:fillRef>
+          <a:effectRef idx="0">
+            <a:schemeClr val="accent1"/>
+          </a:effectRef>
+          <a:fontRef idx="minor">
+            <a:schemeClr val="lt1"/>
+          </a:fontRef>
+        </p:style>
+        <p:txBody>
+          <a:bodyPr rtlCol="0" anchor="ctr"/>
+          <a:lstStyle/>
+          <a:p>
+            <a:r>
+              <a:rPr lang="fr-FR" sz="2800" b="1">
+                <a:solidFill>
+                  <a:srgbClr val="5B5B5B"/>
+                </a:solidFill>
+              </a:rPr>
+              <a:t>Quel est un avantage clé d'une architecture microservices par rapport à une architecture monolithique ?</a:t>
+            </a:r>
+          </a:p>
+        </p:txBody>
+      </p:sp>
+      <p:sp>
+        <p:nvSpPr>
+          <p:cNvPr id="10" name="Rectangle 9">
+            <a:extLst>
+              <a:ext uri="{FF2B5EF4-FFF2-40B4-BE49-F238E27FC236}">
+                <a16:creationId xmlns:a16="http://schemas.microsoft.com/office/drawing/2014/main" id="{C6A5F45C-8DAB-C2B0-BF00-CA92E24972AA}"/>
+              </a:ext>
+            </a:extLst>
+          </p:cNvPr>
+          <p:cNvSpPr/>
+          <p:nvPr>
+            <p:custDataLst>
+              <p:tags r:id="rId7"/>
+            </p:custDataLst>
+          </p:nvPr>
+        </p:nvSpPr>
+        <p:spPr>
+          <a:xfrm>
+            <a:off x="3901440" y="6032500"/>
+            <a:ext cx="7315199" cy="518160"/>
+          </a:xfrm>
+          <a:prstGeom prst="rect">
+            <a:avLst/>
+          </a:prstGeom>
+          <a:noFill/>
+          <a:ln w="19050" cap="flat" cmpd="sng" algn="ctr">
+            <a:noFill/>
+            <a:prstDash val="solid"/>
+            <a:miter lim="800000"/>
+          </a:ln>
+          <a:effectLst/>
+          <a:extLst>
+            <a:ext uri="{909E8E84-426E-40DD-AFC4-6F175D3DCCD1}">
+              <a14:hiddenFill xmlns:a14="http://schemas.microsoft.com/office/drawing/2010/main">
+                <a:solidFill>
+                  <a:schemeClr val="accent1"/>
+                </a:solidFill>
+              </a14:hiddenFill>
+            </a:ext>
+            <a:ext uri="{91240B29-F687-4F45-9708-019B960494DF}">
+              <a14:hiddenLine xmlns:a14="http://schemas.microsoft.com/office/drawing/2010/main" w="19050" cap="flat" cmpd="sng" algn="ctr">
+                <a:solidFill>
+                  <a:schemeClr val="accent1">
+                    <a:shade val="15000"/>
+                  </a:schemeClr>
+                </a:solidFill>
+                <a:prstDash val="solid"/>
+                <a:miter lim="800000"/>
+              </a14:hiddenLine>
+            </a:ext>
+          </a:extLst>
+        </p:spPr>
+        <p:style>
+          <a:lnRef idx="2">
+            <a:schemeClr val="accent1">
+              <a:shade val="15000"/>
+            </a:schemeClr>
+          </a:lnRef>
+          <a:fillRef idx="1">
+            <a:schemeClr val="accent1"/>
+          </a:fillRef>
+          <a:effectRef idx="0">
+            <a:schemeClr val="accent1"/>
+          </a:effectRef>
+          <a:fontRef idx="minor">
+            <a:schemeClr val="lt1"/>
+          </a:fontRef>
+        </p:style>
+        <p:txBody>
+          <a:bodyPr rtlCol="0" anchor="ctr">
+            <a:normAutofit/>
+          </a:bodyPr>
+          <a:lstStyle/>
+          <a:p>
+            <a:r>
+              <a:rPr lang="en-US" sz="2200" b="1">
+                <a:solidFill>
+                  <a:srgbClr val="5B5B5B"/>
+                </a:solidFill>
+              </a:rPr>
+              <a:t>ⓘ</a:t>
+            </a:r>
+            <a:r>
+              <a:rPr lang="en-US" sz="2000">
+                <a:solidFill>
+                  <a:srgbClr val="5B5B5B"/>
+                </a:solidFill>
+              </a:rPr>
+              <a:t> Start presenting to display the poll results on this slide.</a:t>
+            </a:r>
+            <a:endParaRPr lang="fr-FR" sz="2000">
+              <a:solidFill>
+                <a:srgbClr val="5B5B5B"/>
+              </a:solidFill>
+            </a:endParaRPr>
+          </a:p>
+        </p:txBody>
+      </p:sp>
+    </p:spTree>
+    <p:custDataLst>
+      <p:tags r:id="rId1"/>
+    </p:custDataLst>
+    <p:extLst>
+      <p:ext uri="{BB962C8B-B14F-4D97-AF65-F5344CB8AC3E}">
+        <p14:creationId xmlns:p14="http://schemas.microsoft.com/office/powerpoint/2010/main" val="3821386077"/>
+      </p:ext>
+    </p:extLst>
+  </p:cSld>
+  <p:clrMapOvr>
+    <a:masterClrMapping/>
+  </p:clrMapOvr>
+  <p:timing>
+    <p:tnLst>
+      <p:par>
+        <p:cTn id="1" dur="indefinite" restart="never" nodeType="tmRoot">
+          <p:childTnLst>
+            <p:seq concurrent="1" nextAc="seek">
+              <p:cTn id="2" dur="indefinite" nodeType="mainSeq">
+                <p:childTnLst>
+                  <p:par>
+                    <p:cTn id="3" fill="hold">
+                      <p:stCondLst>
+                        <p:cond delay="indefinite"/>
+                      </p:stCondLst>
+                      <p:childTnLst>
+                        <p:par>
+                          <p:cTn id="4" fill="hold">
+                            <p:stCondLst>
+                              <p:cond delay="0"/>
+                            </p:stCondLst>
+                            <p:childTnLst>
+                              <p:par>
+                                <p:cTn id="5" presetID="26" presetClass="emph" presetSubtype="0" fill="hold" grpId="0" nodeType="clickEffect">
+                                  <p:stCondLst>
+                                    <p:cond delay="0"/>
+                                  </p:stCondLst>
+                                  <p:childTnLst>
+                                    <p:animEffect transition="out" filter="fade">
+                                      <p:cBhvr>
+                                        <p:cTn id="6" dur="50" tmFilter="0, 0; .2, .5; .8, .5; 1, 0"/>
+                                        <p:tgtEl>
+                                          <p:spTgt spid="9"/>
+                                        </p:tgtEl>
+                                      </p:cBhvr>
+                                    </p:animEffect>
+                                    <p:animScale>
+                                      <p:cBhvr>
+                                        <p:cTn id="7" dur="25" autoRev="1" fill="hold"/>
+                                        <p:tgtEl>
+                                          <p:spTgt spid="9"/>
+                                        </p:tgtEl>
+                                      </p:cBhvr>
+                                      <p:by x="105000" y="105000"/>
+                                    </p:animScale>
+                                  </p:childTnLst>
+                                </p:cTn>
+                              </p:par>
+                            </p:childTnLst>
+                          </p:cTn>
+                        </p:par>
+                      </p:childTnLst>
+                    </p:cTn>
+                  </p:par>
+                  <p:par>
+                    <p:cTn id="8" fill="hold">
+                      <p:stCondLst>
+                        <p:cond delay="indefinite"/>
+                      </p:stCondLst>
+                      <p:childTnLst>
+                        <p:par>
+                          <p:cTn id="9" fill="hold">
+                            <p:stCondLst>
+                              <p:cond delay="0"/>
+                            </p:stCondLst>
+                            <p:childTnLst>
+                              <p:par>
+                                <p:cTn id="10" presetID="26" presetClass="emph" presetSubtype="0" fill="hold" grpId="1" nodeType="clickEffect">
+                                  <p:stCondLst>
+                                    <p:cond delay="0"/>
+                                  </p:stCondLst>
+                                  <p:childTnLst>
+                                    <p:animEffect transition="out" filter="fade">
+                                      <p:cBhvr>
+                                        <p:cTn id="11" dur="50" tmFilter="0, 0; .2, .5; .8, .5; 1, 0"/>
+                                        <p:tgtEl>
+                                          <p:spTgt spid="9"/>
+                                        </p:tgtEl>
+                                      </p:cBhvr>
+                                    </p:animEffect>
+                                    <p:animScale>
+                                      <p:cBhvr>
+                                        <p:cTn id="12" dur="25" autoRev="1" fill="hold"/>
+                                        <p:tgtEl>
+                                          <p:spTgt spid="9"/>
+                                        </p:tgtEl>
+                                      </p:cBhvr>
+                                      <p:by x="105000" y="105000"/>
+                                    </p:animScale>
+                                  </p:childTnLst>
+                                </p:cTn>
+                              </p:par>
+                            </p:childTnLst>
+                          </p:cTn>
+                        </p:par>
+                      </p:childTnLst>
+                    </p:cTn>
+                  </p:par>
+                </p:childTnLst>
+              </p:cTn>
+              <p:prevCondLst>
+                <p:cond evt="onPrev" delay="0">
+                  <p:tgtEl>
+                    <p:sldTgt/>
+                  </p:tgtEl>
+                </p:cond>
+              </p:prevCondLst>
+              <p:nextCondLst>
+                <p:cond evt="onNext" delay="0">
+                  <p:tgtEl>
+                    <p:sldTgt/>
+                  </p:tgtEl>
+                </p:cond>
+              </p:nextCondLst>
+            </p:seq>
+          </p:childTnLst>
+        </p:cTn>
+      </p:par>
+    </p:tnLst>
+    <p:bldLst>
+      <p:bldP spid="9" grpId="0" animBg="1"/>
+      <p:bldP spid="9" grpId="1" animBg="1"/>
+    </p:bldLst>
+  </p:timing>
 </p:sld>
 </file>
 
@@ -7565,6 +9811,1671 @@
   <p:clrMapOvr>
     <a:masterClrMapping/>
   </p:clrMapOvr>
+</p:sld>
+</file>
+
+<file path=ppt/slides/slide20.xml><?xml version="1.0" encoding="utf-8"?>
+<p:sld xmlns:a="http://schemas.openxmlformats.org/drawingml/2006/main" xmlns:r="http://schemas.openxmlformats.org/officeDocument/2006/relationships" xmlns:p="http://schemas.openxmlformats.org/presentationml/2006/main" showMasterSp="0">
+  <p:cSld>
+    <p:bg>
+      <p:bgPr>
+        <a:solidFill>
+          <a:srgbClr val="FFFFFF"/>
+        </a:solidFill>
+        <a:effectLst/>
+      </p:bgPr>
+    </p:bg>
+    <p:spTree>
+      <p:nvGrpSpPr>
+        <p:cNvPr id="1" name=""/>
+        <p:cNvGrpSpPr/>
+        <p:nvPr/>
+      </p:nvGrpSpPr>
+      <p:grpSpPr>
+        <a:xfrm>
+          <a:off x="0" y="0"/>
+          <a:ext cx="0" cy="0"/>
+          <a:chOff x="0" y="0"/>
+          <a:chExt cx="0" cy="0"/>
+        </a:xfrm>
+      </p:grpSpPr>
+      <p:sp>
+        <p:nvSpPr>
+          <p:cNvPr id="2" name="Rectangle : coins arrondis 1">
+            <a:extLst>
+              <a:ext uri="{FF2B5EF4-FFF2-40B4-BE49-F238E27FC236}">
+                <a16:creationId xmlns:a16="http://schemas.microsoft.com/office/drawing/2014/main" id="{0F56B461-EF92-DBF7-2CAE-BDD5146700F3}"/>
+              </a:ext>
+            </a:extLst>
+          </p:cNvPr>
+          <p:cNvSpPr/>
+          <p:nvPr>
+            <p:custDataLst>
+              <p:tags r:id="rId2"/>
+            </p:custDataLst>
+          </p:nvPr>
+        </p:nvSpPr>
+        <p:spPr>
+          <a:xfrm>
+            <a:off x="6286500" y="430530"/>
+            <a:ext cx="5524500" cy="891540"/>
+          </a:xfrm>
+          <a:prstGeom prst="roundRect">
+            <a:avLst/>
+          </a:prstGeom>
+          <a:solidFill>
+            <a:srgbClr val="F4F4F4"/>
+          </a:solidFill>
+          <a:ln w="19050" cap="flat" cmpd="sng" algn="ctr">
+            <a:noFill/>
+            <a:prstDash val="solid"/>
+            <a:miter lim="800000"/>
+          </a:ln>
+          <a:effectLst/>
+          <a:extLst>
+            <a:ext uri="{91240B29-F687-4F45-9708-019B960494DF}">
+              <a14:hiddenLine xmlns:a14="http://schemas.microsoft.com/office/drawing/2010/main" w="19050" cap="flat" cmpd="sng" algn="ctr">
+                <a:solidFill>
+                  <a:schemeClr val="accent1">
+                    <a:shade val="15000"/>
+                  </a:schemeClr>
+                </a:solidFill>
+                <a:prstDash val="solid"/>
+                <a:miter lim="800000"/>
+              </a14:hiddenLine>
+            </a:ext>
+          </a:extLst>
+        </p:spPr>
+        <p:style>
+          <a:lnRef idx="2">
+            <a:schemeClr val="accent1">
+              <a:shade val="15000"/>
+            </a:schemeClr>
+          </a:lnRef>
+          <a:fillRef idx="1">
+            <a:schemeClr val="accent1"/>
+          </a:fillRef>
+          <a:effectRef idx="0">
+            <a:schemeClr val="accent1"/>
+          </a:effectRef>
+          <a:fontRef idx="minor">
+            <a:schemeClr val="lt1"/>
+          </a:fontRef>
+        </p:style>
+        <p:txBody>
+          <a:bodyPr lIns="317500" rIns="1143000" rtlCol="0" anchor="ctr">
+            <a:normAutofit/>
+          </a:bodyPr>
+          <a:lstStyle/>
+          <a:p>
+            <a:r>
+              <a:rPr lang="en-US" sz="2000">
+                <a:solidFill>
+                  <a:srgbClr val="5B5B5B"/>
+                </a:solidFill>
+              </a:rPr>
+              <a:t>Please download and install the Slido app on all computers you use</a:t>
+            </a:r>
+            <a:endParaRPr lang="fr-FR" sz="2000">
+              <a:solidFill>
+                <a:srgbClr val="5B5B5B"/>
+              </a:solidFill>
+            </a:endParaRPr>
+          </a:p>
+        </p:txBody>
+      </p:sp>
+      <p:pic>
+        <p:nvPicPr>
+          <p:cNvPr id="4" name="Graphique 3">
+            <a:extLst>
+              <a:ext uri="{FF2B5EF4-FFF2-40B4-BE49-F238E27FC236}">
+                <a16:creationId xmlns:a16="http://schemas.microsoft.com/office/drawing/2014/main" id="{C365F798-66C5-FC5B-A600-5FA2692F9589}"/>
+              </a:ext>
+            </a:extLst>
+          </p:cNvPr>
+          <p:cNvPicPr>
+            <a:picLocks/>
+          </p:cNvPicPr>
+          <p:nvPr>
+            <p:custDataLst>
+              <p:tags r:id="rId3"/>
+            </p:custDataLst>
+          </p:nvPr>
+        </p:nvPicPr>
+        <p:blipFill>
+          <a:blip r:embed="rId9">
+            <a:extLst>
+              <a:ext uri="{96DAC541-7B7A-43D3-8B79-37D633B846F1}">
+                <asvg:svgBlip xmlns:asvg="http://schemas.microsoft.com/office/drawing/2016/SVG/main" r:embed="rId10"/>
+              </a:ext>
+            </a:extLst>
+          </a:blip>
+          <a:stretch>
+            <a:fillRect/>
+          </a:stretch>
+        </p:blipFill>
+        <p:spPr>
+          <a:xfrm>
+            <a:off x="10826048" y="577634"/>
+            <a:ext cx="597332" cy="597332"/>
+          </a:xfrm>
+          <a:prstGeom prst="rect">
+            <a:avLst/>
+          </a:prstGeom>
+        </p:spPr>
+      </p:pic>
+      <p:pic>
+        <p:nvPicPr>
+          <p:cNvPr id="6" name="Graphique 5">
+            <a:extLst>
+              <a:ext uri="{FF2B5EF4-FFF2-40B4-BE49-F238E27FC236}">
+                <a16:creationId xmlns:a16="http://schemas.microsoft.com/office/drawing/2014/main" id="{A5214245-D544-AFC7-E8FA-F482CF0FF762}"/>
+              </a:ext>
+            </a:extLst>
+          </p:cNvPr>
+          <p:cNvPicPr>
+            <a:picLocks/>
+          </p:cNvPicPr>
+          <p:nvPr>
+            <p:custDataLst>
+              <p:tags r:id="rId4"/>
+            </p:custDataLst>
+          </p:nvPr>
+        </p:nvPicPr>
+        <p:blipFill>
+          <a:blip r:embed="rId11">
+            <a:extLst>
+              <a:ext uri="{96DAC541-7B7A-43D3-8B79-37D633B846F1}">
+                <asvg:svgBlip xmlns:asvg="http://schemas.microsoft.com/office/drawing/2016/SVG/main" r:embed="rId12"/>
+              </a:ext>
+            </a:extLst>
+          </a:blip>
+          <a:stretch>
+            <a:fillRect/>
+          </a:stretch>
+        </p:blipFill>
+        <p:spPr>
+          <a:xfrm>
+            <a:off x="3901440" y="617220"/>
+            <a:ext cx="1036320" cy="518160"/>
+          </a:xfrm>
+          <a:prstGeom prst="rect">
+            <a:avLst/>
+          </a:prstGeom>
+        </p:spPr>
+      </p:pic>
+      <p:pic>
+        <p:nvPicPr>
+          <p:cNvPr id="8" name="Graphique 7">
+            <a:extLst>
+              <a:ext uri="{FF2B5EF4-FFF2-40B4-BE49-F238E27FC236}">
+                <a16:creationId xmlns:a16="http://schemas.microsoft.com/office/drawing/2014/main" id="{C98B43EF-2CE6-1D57-5E90-EE7CD736C19F}"/>
+              </a:ext>
+            </a:extLst>
+          </p:cNvPr>
+          <p:cNvPicPr>
+            <a:picLocks/>
+          </p:cNvPicPr>
+          <p:nvPr>
+            <p:custDataLst>
+              <p:tags r:id="rId5"/>
+            </p:custDataLst>
+          </p:nvPr>
+        </p:nvPicPr>
+        <p:blipFill>
+          <a:blip r:embed="rId13">
+            <a:extLst>
+              <a:ext uri="{96DAC541-7B7A-43D3-8B79-37D633B846F1}">
+                <asvg:svgBlip xmlns:asvg="http://schemas.microsoft.com/office/drawing/2016/SVG/main" r:embed="rId14"/>
+              </a:ext>
+            </a:extLst>
+          </a:blip>
+          <a:stretch>
+            <a:fillRect/>
+          </a:stretch>
+        </p:blipFill>
+        <p:spPr>
+          <a:xfrm>
+            <a:off x="1158240" y="2270760"/>
+            <a:ext cx="2316480" cy="2316480"/>
+          </a:xfrm>
+          <a:prstGeom prst="rect">
+            <a:avLst/>
+          </a:prstGeom>
+        </p:spPr>
+      </p:pic>
+      <p:sp>
+        <p:nvSpPr>
+          <p:cNvPr id="9" name="Rectangle 8">
+            <a:extLst>
+              <a:ext uri="{FF2B5EF4-FFF2-40B4-BE49-F238E27FC236}">
+                <a16:creationId xmlns:a16="http://schemas.microsoft.com/office/drawing/2014/main" id="{8CB080A3-7D0C-32CE-AE74-8ED573016878}"/>
+              </a:ext>
+            </a:extLst>
+          </p:cNvPr>
+          <p:cNvSpPr/>
+          <p:nvPr>
+            <p:custDataLst>
+              <p:tags r:id="rId6"/>
+            </p:custDataLst>
+          </p:nvPr>
+        </p:nvSpPr>
+        <p:spPr>
+          <a:xfrm>
+            <a:off x="3901440" y="2571750"/>
+            <a:ext cx="7315199" cy="1714500"/>
+          </a:xfrm>
+          <a:prstGeom prst="rect">
+            <a:avLst/>
+          </a:prstGeom>
+          <a:noFill/>
+          <a:ln w="19050" cap="flat" cmpd="sng" algn="ctr">
+            <a:solidFill>
+              <a:srgbClr val="FFFFFF"/>
+            </a:solidFill>
+            <a:prstDash val="solid"/>
+            <a:miter lim="800000"/>
+          </a:ln>
+          <a:effectLst/>
+          <a:extLst>
+            <a:ext uri="{909E8E84-426E-40DD-AFC4-6F175D3DCCD1}">
+              <a14:hiddenFill xmlns:a14="http://schemas.microsoft.com/office/drawing/2010/main">
+                <a:solidFill>
+                  <a:schemeClr val="accent1"/>
+                </a:solidFill>
+              </a14:hiddenFill>
+            </a:ext>
+          </a:extLst>
+        </p:spPr>
+        <p:style>
+          <a:lnRef idx="2">
+            <a:schemeClr val="accent1">
+              <a:shade val="15000"/>
+            </a:schemeClr>
+          </a:lnRef>
+          <a:fillRef idx="1">
+            <a:schemeClr val="accent1"/>
+          </a:fillRef>
+          <a:effectRef idx="0">
+            <a:schemeClr val="accent1"/>
+          </a:effectRef>
+          <a:fontRef idx="minor">
+            <a:schemeClr val="lt1"/>
+          </a:fontRef>
+        </p:style>
+        <p:txBody>
+          <a:bodyPr rtlCol="0" anchor="ctr"/>
+          <a:lstStyle/>
+          <a:p>
+            <a:r>
+              <a:rPr lang="fr-FR" sz="4000" b="1">
+                <a:solidFill>
+                  <a:srgbClr val="5B5B5B"/>
+                </a:solidFill>
+              </a:rPr>
+              <a:t>Quel est un défi courant associé aux microservices ?</a:t>
+            </a:r>
+          </a:p>
+        </p:txBody>
+      </p:sp>
+      <p:sp>
+        <p:nvSpPr>
+          <p:cNvPr id="10" name="Rectangle 9">
+            <a:extLst>
+              <a:ext uri="{FF2B5EF4-FFF2-40B4-BE49-F238E27FC236}">
+                <a16:creationId xmlns:a16="http://schemas.microsoft.com/office/drawing/2014/main" id="{BE0F0721-4F9E-4805-5E71-73CCD0AD511E}"/>
+              </a:ext>
+            </a:extLst>
+          </p:cNvPr>
+          <p:cNvSpPr/>
+          <p:nvPr>
+            <p:custDataLst>
+              <p:tags r:id="rId7"/>
+            </p:custDataLst>
+          </p:nvPr>
+        </p:nvSpPr>
+        <p:spPr>
+          <a:xfrm>
+            <a:off x="3901440" y="6032500"/>
+            <a:ext cx="7315199" cy="518160"/>
+          </a:xfrm>
+          <a:prstGeom prst="rect">
+            <a:avLst/>
+          </a:prstGeom>
+          <a:noFill/>
+          <a:ln w="19050" cap="flat" cmpd="sng" algn="ctr">
+            <a:noFill/>
+            <a:prstDash val="solid"/>
+            <a:miter lim="800000"/>
+          </a:ln>
+          <a:effectLst/>
+          <a:extLst>
+            <a:ext uri="{909E8E84-426E-40DD-AFC4-6F175D3DCCD1}">
+              <a14:hiddenFill xmlns:a14="http://schemas.microsoft.com/office/drawing/2010/main">
+                <a:solidFill>
+                  <a:schemeClr val="accent1"/>
+                </a:solidFill>
+              </a14:hiddenFill>
+            </a:ext>
+            <a:ext uri="{91240B29-F687-4F45-9708-019B960494DF}">
+              <a14:hiddenLine xmlns:a14="http://schemas.microsoft.com/office/drawing/2010/main" w="19050" cap="flat" cmpd="sng" algn="ctr">
+                <a:solidFill>
+                  <a:schemeClr val="accent1">
+                    <a:shade val="15000"/>
+                  </a:schemeClr>
+                </a:solidFill>
+                <a:prstDash val="solid"/>
+                <a:miter lim="800000"/>
+              </a14:hiddenLine>
+            </a:ext>
+          </a:extLst>
+        </p:spPr>
+        <p:style>
+          <a:lnRef idx="2">
+            <a:schemeClr val="accent1">
+              <a:shade val="15000"/>
+            </a:schemeClr>
+          </a:lnRef>
+          <a:fillRef idx="1">
+            <a:schemeClr val="accent1"/>
+          </a:fillRef>
+          <a:effectRef idx="0">
+            <a:schemeClr val="accent1"/>
+          </a:effectRef>
+          <a:fontRef idx="minor">
+            <a:schemeClr val="lt1"/>
+          </a:fontRef>
+        </p:style>
+        <p:txBody>
+          <a:bodyPr rtlCol="0" anchor="ctr">
+            <a:normAutofit/>
+          </a:bodyPr>
+          <a:lstStyle/>
+          <a:p>
+            <a:r>
+              <a:rPr lang="en-US" sz="2200" b="1">
+                <a:solidFill>
+                  <a:srgbClr val="5B5B5B"/>
+                </a:solidFill>
+              </a:rPr>
+              <a:t>ⓘ</a:t>
+            </a:r>
+            <a:r>
+              <a:rPr lang="en-US" sz="2000">
+                <a:solidFill>
+                  <a:srgbClr val="5B5B5B"/>
+                </a:solidFill>
+              </a:rPr>
+              <a:t> Start presenting to display the poll results on this slide.</a:t>
+            </a:r>
+            <a:endParaRPr lang="fr-FR" sz="2000">
+              <a:solidFill>
+                <a:srgbClr val="5B5B5B"/>
+              </a:solidFill>
+            </a:endParaRPr>
+          </a:p>
+        </p:txBody>
+      </p:sp>
+    </p:spTree>
+    <p:custDataLst>
+      <p:tags r:id="rId1"/>
+    </p:custDataLst>
+    <p:extLst>
+      <p:ext uri="{BB962C8B-B14F-4D97-AF65-F5344CB8AC3E}">
+        <p14:creationId xmlns:p14="http://schemas.microsoft.com/office/powerpoint/2010/main" val="731310828"/>
+      </p:ext>
+    </p:extLst>
+  </p:cSld>
+  <p:clrMapOvr>
+    <a:masterClrMapping/>
+  </p:clrMapOvr>
+  <p:timing>
+    <p:tnLst>
+      <p:par>
+        <p:cTn id="1" dur="indefinite" restart="never" nodeType="tmRoot">
+          <p:childTnLst>
+            <p:seq concurrent="1" nextAc="seek">
+              <p:cTn id="2" dur="indefinite" nodeType="mainSeq">
+                <p:childTnLst>
+                  <p:par>
+                    <p:cTn id="3" fill="hold">
+                      <p:stCondLst>
+                        <p:cond delay="indefinite"/>
+                      </p:stCondLst>
+                      <p:childTnLst>
+                        <p:par>
+                          <p:cTn id="4" fill="hold">
+                            <p:stCondLst>
+                              <p:cond delay="0"/>
+                            </p:stCondLst>
+                            <p:childTnLst>
+                              <p:par>
+                                <p:cTn id="5" presetID="26" presetClass="emph" presetSubtype="0" fill="hold" grpId="0" nodeType="clickEffect">
+                                  <p:stCondLst>
+                                    <p:cond delay="0"/>
+                                  </p:stCondLst>
+                                  <p:childTnLst>
+                                    <p:animEffect transition="out" filter="fade">
+                                      <p:cBhvr>
+                                        <p:cTn id="6" dur="50" tmFilter="0, 0; .2, .5; .8, .5; 1, 0"/>
+                                        <p:tgtEl>
+                                          <p:spTgt spid="9"/>
+                                        </p:tgtEl>
+                                      </p:cBhvr>
+                                    </p:animEffect>
+                                    <p:animScale>
+                                      <p:cBhvr>
+                                        <p:cTn id="7" dur="25" autoRev="1" fill="hold"/>
+                                        <p:tgtEl>
+                                          <p:spTgt spid="9"/>
+                                        </p:tgtEl>
+                                      </p:cBhvr>
+                                      <p:by x="105000" y="105000"/>
+                                    </p:animScale>
+                                  </p:childTnLst>
+                                </p:cTn>
+                              </p:par>
+                            </p:childTnLst>
+                          </p:cTn>
+                        </p:par>
+                      </p:childTnLst>
+                    </p:cTn>
+                  </p:par>
+                  <p:par>
+                    <p:cTn id="8" fill="hold">
+                      <p:stCondLst>
+                        <p:cond delay="indefinite"/>
+                      </p:stCondLst>
+                      <p:childTnLst>
+                        <p:par>
+                          <p:cTn id="9" fill="hold">
+                            <p:stCondLst>
+                              <p:cond delay="0"/>
+                            </p:stCondLst>
+                            <p:childTnLst>
+                              <p:par>
+                                <p:cTn id="10" presetID="26" presetClass="emph" presetSubtype="0" fill="hold" grpId="1" nodeType="clickEffect">
+                                  <p:stCondLst>
+                                    <p:cond delay="0"/>
+                                  </p:stCondLst>
+                                  <p:childTnLst>
+                                    <p:animEffect transition="out" filter="fade">
+                                      <p:cBhvr>
+                                        <p:cTn id="11" dur="50" tmFilter="0, 0; .2, .5; .8, .5; 1, 0"/>
+                                        <p:tgtEl>
+                                          <p:spTgt spid="9"/>
+                                        </p:tgtEl>
+                                      </p:cBhvr>
+                                    </p:animEffect>
+                                    <p:animScale>
+                                      <p:cBhvr>
+                                        <p:cTn id="12" dur="25" autoRev="1" fill="hold"/>
+                                        <p:tgtEl>
+                                          <p:spTgt spid="9"/>
+                                        </p:tgtEl>
+                                      </p:cBhvr>
+                                      <p:by x="105000" y="105000"/>
+                                    </p:animScale>
+                                  </p:childTnLst>
+                                </p:cTn>
+                              </p:par>
+                            </p:childTnLst>
+                          </p:cTn>
+                        </p:par>
+                      </p:childTnLst>
+                    </p:cTn>
+                  </p:par>
+                </p:childTnLst>
+              </p:cTn>
+              <p:prevCondLst>
+                <p:cond evt="onPrev" delay="0">
+                  <p:tgtEl>
+                    <p:sldTgt/>
+                  </p:tgtEl>
+                </p:cond>
+              </p:prevCondLst>
+              <p:nextCondLst>
+                <p:cond evt="onNext" delay="0">
+                  <p:tgtEl>
+                    <p:sldTgt/>
+                  </p:tgtEl>
+                </p:cond>
+              </p:nextCondLst>
+            </p:seq>
+          </p:childTnLst>
+        </p:cTn>
+      </p:par>
+    </p:tnLst>
+    <p:bldLst>
+      <p:bldP spid="9" grpId="0" animBg="1"/>
+      <p:bldP spid="9" grpId="1" animBg="1"/>
+    </p:bldLst>
+  </p:timing>
+</p:sld>
+</file>
+
+<file path=ppt/slides/slide21.xml><?xml version="1.0" encoding="utf-8"?>
+<p:sld xmlns:a="http://schemas.openxmlformats.org/drawingml/2006/main" xmlns:r="http://schemas.openxmlformats.org/officeDocument/2006/relationships" xmlns:p="http://schemas.openxmlformats.org/presentationml/2006/main" showMasterSp="0">
+  <p:cSld>
+    <p:bg>
+      <p:bgPr>
+        <a:solidFill>
+          <a:srgbClr val="FFFFFF"/>
+        </a:solidFill>
+        <a:effectLst/>
+      </p:bgPr>
+    </p:bg>
+    <p:spTree>
+      <p:nvGrpSpPr>
+        <p:cNvPr id="1" name=""/>
+        <p:cNvGrpSpPr/>
+        <p:nvPr/>
+      </p:nvGrpSpPr>
+      <p:grpSpPr>
+        <a:xfrm>
+          <a:off x="0" y="0"/>
+          <a:ext cx="0" cy="0"/>
+          <a:chOff x="0" y="0"/>
+          <a:chExt cx="0" cy="0"/>
+        </a:xfrm>
+      </p:grpSpPr>
+      <p:sp>
+        <p:nvSpPr>
+          <p:cNvPr id="2" name="Rectangle : coins arrondis 1">
+            <a:extLst>
+              <a:ext uri="{FF2B5EF4-FFF2-40B4-BE49-F238E27FC236}">
+                <a16:creationId xmlns:a16="http://schemas.microsoft.com/office/drawing/2014/main" id="{3BFB745B-E9BC-F3BE-0F27-A9D8A6B802BB}"/>
+              </a:ext>
+            </a:extLst>
+          </p:cNvPr>
+          <p:cNvSpPr/>
+          <p:nvPr>
+            <p:custDataLst>
+              <p:tags r:id="rId2"/>
+            </p:custDataLst>
+          </p:nvPr>
+        </p:nvSpPr>
+        <p:spPr>
+          <a:xfrm>
+            <a:off x="6286500" y="430530"/>
+            <a:ext cx="5524500" cy="891540"/>
+          </a:xfrm>
+          <a:prstGeom prst="roundRect">
+            <a:avLst/>
+          </a:prstGeom>
+          <a:solidFill>
+            <a:srgbClr val="F4F4F4"/>
+          </a:solidFill>
+          <a:ln w="19050" cap="flat" cmpd="sng" algn="ctr">
+            <a:noFill/>
+            <a:prstDash val="solid"/>
+            <a:miter lim="800000"/>
+          </a:ln>
+          <a:effectLst/>
+          <a:extLst>
+            <a:ext uri="{91240B29-F687-4F45-9708-019B960494DF}">
+              <a14:hiddenLine xmlns:a14="http://schemas.microsoft.com/office/drawing/2010/main" w="19050" cap="flat" cmpd="sng" algn="ctr">
+                <a:solidFill>
+                  <a:schemeClr val="accent1">
+                    <a:shade val="15000"/>
+                  </a:schemeClr>
+                </a:solidFill>
+                <a:prstDash val="solid"/>
+                <a:miter lim="800000"/>
+              </a14:hiddenLine>
+            </a:ext>
+          </a:extLst>
+        </p:spPr>
+        <p:style>
+          <a:lnRef idx="2">
+            <a:schemeClr val="accent1">
+              <a:shade val="15000"/>
+            </a:schemeClr>
+          </a:lnRef>
+          <a:fillRef idx="1">
+            <a:schemeClr val="accent1"/>
+          </a:fillRef>
+          <a:effectRef idx="0">
+            <a:schemeClr val="accent1"/>
+          </a:effectRef>
+          <a:fontRef idx="minor">
+            <a:schemeClr val="lt1"/>
+          </a:fontRef>
+        </p:style>
+        <p:txBody>
+          <a:bodyPr lIns="317500" rIns="1143000" rtlCol="0" anchor="ctr">
+            <a:normAutofit/>
+          </a:bodyPr>
+          <a:lstStyle/>
+          <a:p>
+            <a:r>
+              <a:rPr lang="en-US" sz="2000">
+                <a:solidFill>
+                  <a:srgbClr val="5B5B5B"/>
+                </a:solidFill>
+              </a:rPr>
+              <a:t>Please download and install the Slido app on all computers you use</a:t>
+            </a:r>
+            <a:endParaRPr lang="fr-FR" sz="2000">
+              <a:solidFill>
+                <a:srgbClr val="5B5B5B"/>
+              </a:solidFill>
+            </a:endParaRPr>
+          </a:p>
+        </p:txBody>
+      </p:sp>
+      <p:pic>
+        <p:nvPicPr>
+          <p:cNvPr id="4" name="Graphique 3">
+            <a:extLst>
+              <a:ext uri="{FF2B5EF4-FFF2-40B4-BE49-F238E27FC236}">
+                <a16:creationId xmlns:a16="http://schemas.microsoft.com/office/drawing/2014/main" id="{A8A56D6D-D504-EB65-CA62-A0FCF4E60E31}"/>
+              </a:ext>
+            </a:extLst>
+          </p:cNvPr>
+          <p:cNvPicPr>
+            <a:picLocks/>
+          </p:cNvPicPr>
+          <p:nvPr>
+            <p:custDataLst>
+              <p:tags r:id="rId3"/>
+            </p:custDataLst>
+          </p:nvPr>
+        </p:nvPicPr>
+        <p:blipFill>
+          <a:blip r:embed="rId9">
+            <a:extLst>
+              <a:ext uri="{96DAC541-7B7A-43D3-8B79-37D633B846F1}">
+                <asvg:svgBlip xmlns:asvg="http://schemas.microsoft.com/office/drawing/2016/SVG/main" r:embed="rId10"/>
+              </a:ext>
+            </a:extLst>
+          </a:blip>
+          <a:stretch>
+            <a:fillRect/>
+          </a:stretch>
+        </p:blipFill>
+        <p:spPr>
+          <a:xfrm>
+            <a:off x="10826048" y="577634"/>
+            <a:ext cx="597332" cy="597332"/>
+          </a:xfrm>
+          <a:prstGeom prst="rect">
+            <a:avLst/>
+          </a:prstGeom>
+        </p:spPr>
+      </p:pic>
+      <p:pic>
+        <p:nvPicPr>
+          <p:cNvPr id="6" name="Graphique 5">
+            <a:extLst>
+              <a:ext uri="{FF2B5EF4-FFF2-40B4-BE49-F238E27FC236}">
+                <a16:creationId xmlns:a16="http://schemas.microsoft.com/office/drawing/2014/main" id="{E35FD33A-C994-B62A-95A5-72F37D4CF0B4}"/>
+              </a:ext>
+            </a:extLst>
+          </p:cNvPr>
+          <p:cNvPicPr>
+            <a:picLocks/>
+          </p:cNvPicPr>
+          <p:nvPr>
+            <p:custDataLst>
+              <p:tags r:id="rId4"/>
+            </p:custDataLst>
+          </p:nvPr>
+        </p:nvPicPr>
+        <p:blipFill>
+          <a:blip r:embed="rId11">
+            <a:extLst>
+              <a:ext uri="{96DAC541-7B7A-43D3-8B79-37D633B846F1}">
+                <asvg:svgBlip xmlns:asvg="http://schemas.microsoft.com/office/drawing/2016/SVG/main" r:embed="rId12"/>
+              </a:ext>
+            </a:extLst>
+          </a:blip>
+          <a:stretch>
+            <a:fillRect/>
+          </a:stretch>
+        </p:blipFill>
+        <p:spPr>
+          <a:xfrm>
+            <a:off x="3901440" y="617220"/>
+            <a:ext cx="1036320" cy="518160"/>
+          </a:xfrm>
+          <a:prstGeom prst="rect">
+            <a:avLst/>
+          </a:prstGeom>
+        </p:spPr>
+      </p:pic>
+      <p:pic>
+        <p:nvPicPr>
+          <p:cNvPr id="8" name="Graphique 7">
+            <a:extLst>
+              <a:ext uri="{FF2B5EF4-FFF2-40B4-BE49-F238E27FC236}">
+                <a16:creationId xmlns:a16="http://schemas.microsoft.com/office/drawing/2014/main" id="{E4F6F153-F8E6-3F3C-B9C1-B60ABBC2327F}"/>
+              </a:ext>
+            </a:extLst>
+          </p:cNvPr>
+          <p:cNvPicPr>
+            <a:picLocks/>
+          </p:cNvPicPr>
+          <p:nvPr>
+            <p:custDataLst>
+              <p:tags r:id="rId5"/>
+            </p:custDataLst>
+          </p:nvPr>
+        </p:nvPicPr>
+        <p:blipFill>
+          <a:blip r:embed="rId13">
+            <a:extLst>
+              <a:ext uri="{96DAC541-7B7A-43D3-8B79-37D633B846F1}">
+                <asvg:svgBlip xmlns:asvg="http://schemas.microsoft.com/office/drawing/2016/SVG/main" r:embed="rId14"/>
+              </a:ext>
+            </a:extLst>
+          </a:blip>
+          <a:stretch>
+            <a:fillRect/>
+          </a:stretch>
+        </p:blipFill>
+        <p:spPr>
+          <a:xfrm>
+            <a:off x="1158240" y="2270760"/>
+            <a:ext cx="2316480" cy="2316480"/>
+          </a:xfrm>
+          <a:prstGeom prst="rect">
+            <a:avLst/>
+          </a:prstGeom>
+        </p:spPr>
+      </p:pic>
+      <p:sp>
+        <p:nvSpPr>
+          <p:cNvPr id="9" name="Rectangle 8">
+            <a:extLst>
+              <a:ext uri="{FF2B5EF4-FFF2-40B4-BE49-F238E27FC236}">
+                <a16:creationId xmlns:a16="http://schemas.microsoft.com/office/drawing/2014/main" id="{5590E8CF-8AD0-CEBF-96EE-FF41011A5684}"/>
+              </a:ext>
+            </a:extLst>
+          </p:cNvPr>
+          <p:cNvSpPr/>
+          <p:nvPr>
+            <p:custDataLst>
+              <p:tags r:id="rId6"/>
+            </p:custDataLst>
+          </p:nvPr>
+        </p:nvSpPr>
+        <p:spPr>
+          <a:xfrm>
+            <a:off x="3901440" y="2571750"/>
+            <a:ext cx="7315199" cy="1714500"/>
+          </a:xfrm>
+          <a:prstGeom prst="rect">
+            <a:avLst/>
+          </a:prstGeom>
+          <a:noFill/>
+          <a:ln w="19050" cap="flat" cmpd="sng" algn="ctr">
+            <a:solidFill>
+              <a:srgbClr val="FFFFFF"/>
+            </a:solidFill>
+            <a:prstDash val="solid"/>
+            <a:miter lim="800000"/>
+          </a:ln>
+          <a:effectLst/>
+          <a:extLst>
+            <a:ext uri="{909E8E84-426E-40DD-AFC4-6F175D3DCCD1}">
+              <a14:hiddenFill xmlns:a14="http://schemas.microsoft.com/office/drawing/2010/main">
+                <a:solidFill>
+                  <a:schemeClr val="accent1"/>
+                </a:solidFill>
+              </a14:hiddenFill>
+            </a:ext>
+          </a:extLst>
+        </p:spPr>
+        <p:style>
+          <a:lnRef idx="2">
+            <a:schemeClr val="accent1">
+              <a:shade val="15000"/>
+            </a:schemeClr>
+          </a:lnRef>
+          <a:fillRef idx="1">
+            <a:schemeClr val="accent1"/>
+          </a:fillRef>
+          <a:effectRef idx="0">
+            <a:schemeClr val="accent1"/>
+          </a:effectRef>
+          <a:fontRef idx="minor">
+            <a:schemeClr val="lt1"/>
+          </a:fontRef>
+        </p:style>
+        <p:txBody>
+          <a:bodyPr rtlCol="0" anchor="ctr"/>
+          <a:lstStyle/>
+          <a:p>
+            <a:r>
+              <a:rPr lang="fr-FR" sz="2400" b="1">
+                <a:solidFill>
+                  <a:srgbClr val="5B5B5B"/>
+                </a:solidFill>
+              </a:rPr>
+              <a:t>Quels avantages principaux offrent les microservices par rapport à une architecture monolithique ? (SELECTIONNER DEUX PROPOSITIONS)</a:t>
+            </a:r>
+          </a:p>
+        </p:txBody>
+      </p:sp>
+      <p:sp>
+        <p:nvSpPr>
+          <p:cNvPr id="10" name="Rectangle 9">
+            <a:extLst>
+              <a:ext uri="{FF2B5EF4-FFF2-40B4-BE49-F238E27FC236}">
+                <a16:creationId xmlns:a16="http://schemas.microsoft.com/office/drawing/2014/main" id="{C82842B8-D58C-F33B-FB22-6D0CF2BD18BE}"/>
+              </a:ext>
+            </a:extLst>
+          </p:cNvPr>
+          <p:cNvSpPr/>
+          <p:nvPr>
+            <p:custDataLst>
+              <p:tags r:id="rId7"/>
+            </p:custDataLst>
+          </p:nvPr>
+        </p:nvSpPr>
+        <p:spPr>
+          <a:xfrm>
+            <a:off x="3901440" y="6032500"/>
+            <a:ext cx="7315199" cy="518160"/>
+          </a:xfrm>
+          <a:prstGeom prst="rect">
+            <a:avLst/>
+          </a:prstGeom>
+          <a:noFill/>
+          <a:ln w="19050" cap="flat" cmpd="sng" algn="ctr">
+            <a:noFill/>
+            <a:prstDash val="solid"/>
+            <a:miter lim="800000"/>
+          </a:ln>
+          <a:effectLst/>
+          <a:extLst>
+            <a:ext uri="{909E8E84-426E-40DD-AFC4-6F175D3DCCD1}">
+              <a14:hiddenFill xmlns:a14="http://schemas.microsoft.com/office/drawing/2010/main">
+                <a:solidFill>
+                  <a:schemeClr val="accent1"/>
+                </a:solidFill>
+              </a14:hiddenFill>
+            </a:ext>
+            <a:ext uri="{91240B29-F687-4F45-9708-019B960494DF}">
+              <a14:hiddenLine xmlns:a14="http://schemas.microsoft.com/office/drawing/2010/main" w="19050" cap="flat" cmpd="sng" algn="ctr">
+                <a:solidFill>
+                  <a:schemeClr val="accent1">
+                    <a:shade val="15000"/>
+                  </a:schemeClr>
+                </a:solidFill>
+                <a:prstDash val="solid"/>
+                <a:miter lim="800000"/>
+              </a14:hiddenLine>
+            </a:ext>
+          </a:extLst>
+        </p:spPr>
+        <p:style>
+          <a:lnRef idx="2">
+            <a:schemeClr val="accent1">
+              <a:shade val="15000"/>
+            </a:schemeClr>
+          </a:lnRef>
+          <a:fillRef idx="1">
+            <a:schemeClr val="accent1"/>
+          </a:fillRef>
+          <a:effectRef idx="0">
+            <a:schemeClr val="accent1"/>
+          </a:effectRef>
+          <a:fontRef idx="minor">
+            <a:schemeClr val="lt1"/>
+          </a:fontRef>
+        </p:style>
+        <p:txBody>
+          <a:bodyPr rtlCol="0" anchor="ctr">
+            <a:normAutofit/>
+          </a:bodyPr>
+          <a:lstStyle/>
+          <a:p>
+            <a:r>
+              <a:rPr lang="en-US" sz="2200" b="1">
+                <a:solidFill>
+                  <a:srgbClr val="5B5B5B"/>
+                </a:solidFill>
+              </a:rPr>
+              <a:t>ⓘ</a:t>
+            </a:r>
+            <a:r>
+              <a:rPr lang="en-US" sz="2000">
+                <a:solidFill>
+                  <a:srgbClr val="5B5B5B"/>
+                </a:solidFill>
+              </a:rPr>
+              <a:t> Start presenting to display the poll results on this slide.</a:t>
+            </a:r>
+            <a:endParaRPr lang="fr-FR" sz="2000">
+              <a:solidFill>
+                <a:srgbClr val="5B5B5B"/>
+              </a:solidFill>
+            </a:endParaRPr>
+          </a:p>
+        </p:txBody>
+      </p:sp>
+    </p:spTree>
+    <p:custDataLst>
+      <p:tags r:id="rId1"/>
+    </p:custDataLst>
+    <p:extLst>
+      <p:ext uri="{BB962C8B-B14F-4D97-AF65-F5344CB8AC3E}">
+        <p14:creationId xmlns:p14="http://schemas.microsoft.com/office/powerpoint/2010/main" val="3675024210"/>
+      </p:ext>
+    </p:extLst>
+  </p:cSld>
+  <p:clrMapOvr>
+    <a:masterClrMapping/>
+  </p:clrMapOvr>
+  <p:timing>
+    <p:tnLst>
+      <p:par>
+        <p:cTn id="1" dur="indefinite" restart="never" nodeType="tmRoot">
+          <p:childTnLst>
+            <p:seq concurrent="1" nextAc="seek">
+              <p:cTn id="2" dur="indefinite" nodeType="mainSeq">
+                <p:childTnLst>
+                  <p:par>
+                    <p:cTn id="3" fill="hold">
+                      <p:stCondLst>
+                        <p:cond delay="indefinite"/>
+                      </p:stCondLst>
+                      <p:childTnLst>
+                        <p:par>
+                          <p:cTn id="4" fill="hold">
+                            <p:stCondLst>
+                              <p:cond delay="0"/>
+                            </p:stCondLst>
+                            <p:childTnLst>
+                              <p:par>
+                                <p:cTn id="5" presetID="26" presetClass="emph" presetSubtype="0" fill="hold" grpId="0" nodeType="clickEffect">
+                                  <p:stCondLst>
+                                    <p:cond delay="0"/>
+                                  </p:stCondLst>
+                                  <p:childTnLst>
+                                    <p:animEffect transition="out" filter="fade">
+                                      <p:cBhvr>
+                                        <p:cTn id="6" dur="50" tmFilter="0, 0; .2, .5; .8, .5; 1, 0"/>
+                                        <p:tgtEl>
+                                          <p:spTgt spid="9"/>
+                                        </p:tgtEl>
+                                      </p:cBhvr>
+                                    </p:animEffect>
+                                    <p:animScale>
+                                      <p:cBhvr>
+                                        <p:cTn id="7" dur="25" autoRev="1" fill="hold"/>
+                                        <p:tgtEl>
+                                          <p:spTgt spid="9"/>
+                                        </p:tgtEl>
+                                      </p:cBhvr>
+                                      <p:by x="105000" y="105000"/>
+                                    </p:animScale>
+                                  </p:childTnLst>
+                                </p:cTn>
+                              </p:par>
+                            </p:childTnLst>
+                          </p:cTn>
+                        </p:par>
+                      </p:childTnLst>
+                    </p:cTn>
+                  </p:par>
+                  <p:par>
+                    <p:cTn id="8" fill="hold">
+                      <p:stCondLst>
+                        <p:cond delay="indefinite"/>
+                      </p:stCondLst>
+                      <p:childTnLst>
+                        <p:par>
+                          <p:cTn id="9" fill="hold">
+                            <p:stCondLst>
+                              <p:cond delay="0"/>
+                            </p:stCondLst>
+                            <p:childTnLst>
+                              <p:par>
+                                <p:cTn id="10" presetID="26" presetClass="emph" presetSubtype="0" fill="hold" grpId="1" nodeType="clickEffect">
+                                  <p:stCondLst>
+                                    <p:cond delay="0"/>
+                                  </p:stCondLst>
+                                  <p:childTnLst>
+                                    <p:animEffect transition="out" filter="fade">
+                                      <p:cBhvr>
+                                        <p:cTn id="11" dur="50" tmFilter="0, 0; .2, .5; .8, .5; 1, 0"/>
+                                        <p:tgtEl>
+                                          <p:spTgt spid="9"/>
+                                        </p:tgtEl>
+                                      </p:cBhvr>
+                                    </p:animEffect>
+                                    <p:animScale>
+                                      <p:cBhvr>
+                                        <p:cTn id="12" dur="25" autoRev="1" fill="hold"/>
+                                        <p:tgtEl>
+                                          <p:spTgt spid="9"/>
+                                        </p:tgtEl>
+                                      </p:cBhvr>
+                                      <p:by x="105000" y="105000"/>
+                                    </p:animScale>
+                                  </p:childTnLst>
+                                </p:cTn>
+                              </p:par>
+                            </p:childTnLst>
+                          </p:cTn>
+                        </p:par>
+                      </p:childTnLst>
+                    </p:cTn>
+                  </p:par>
+                </p:childTnLst>
+              </p:cTn>
+              <p:prevCondLst>
+                <p:cond evt="onPrev" delay="0">
+                  <p:tgtEl>
+                    <p:sldTgt/>
+                  </p:tgtEl>
+                </p:cond>
+              </p:prevCondLst>
+              <p:nextCondLst>
+                <p:cond evt="onNext" delay="0">
+                  <p:tgtEl>
+                    <p:sldTgt/>
+                  </p:tgtEl>
+                </p:cond>
+              </p:nextCondLst>
+            </p:seq>
+          </p:childTnLst>
+        </p:cTn>
+      </p:par>
+    </p:tnLst>
+    <p:bldLst>
+      <p:bldP spid="9" grpId="0" animBg="1"/>
+      <p:bldP spid="9" grpId="1" animBg="1"/>
+    </p:bldLst>
+  </p:timing>
+</p:sld>
+</file>
+
+<file path=ppt/slides/slide22.xml><?xml version="1.0" encoding="utf-8"?>
+<p:sld xmlns:a="http://schemas.openxmlformats.org/drawingml/2006/main" xmlns:r="http://schemas.openxmlformats.org/officeDocument/2006/relationships" xmlns:p="http://schemas.openxmlformats.org/presentationml/2006/main" showMasterSp="0">
+  <p:cSld>
+    <p:bg>
+      <p:bgPr>
+        <a:solidFill>
+          <a:srgbClr val="FFFFFF"/>
+        </a:solidFill>
+        <a:effectLst/>
+      </p:bgPr>
+    </p:bg>
+    <p:spTree>
+      <p:nvGrpSpPr>
+        <p:cNvPr id="1" name=""/>
+        <p:cNvGrpSpPr/>
+        <p:nvPr/>
+      </p:nvGrpSpPr>
+      <p:grpSpPr>
+        <a:xfrm>
+          <a:off x="0" y="0"/>
+          <a:ext cx="0" cy="0"/>
+          <a:chOff x="0" y="0"/>
+          <a:chExt cx="0" cy="0"/>
+        </a:xfrm>
+      </p:grpSpPr>
+      <p:sp>
+        <p:nvSpPr>
+          <p:cNvPr id="2" name="Rectangle : coins arrondis 1">
+            <a:extLst>
+              <a:ext uri="{FF2B5EF4-FFF2-40B4-BE49-F238E27FC236}">
+                <a16:creationId xmlns:a16="http://schemas.microsoft.com/office/drawing/2014/main" id="{21A51E34-4545-B6A8-F49A-3514F676E867}"/>
+              </a:ext>
+            </a:extLst>
+          </p:cNvPr>
+          <p:cNvSpPr/>
+          <p:nvPr>
+            <p:custDataLst>
+              <p:tags r:id="rId2"/>
+            </p:custDataLst>
+          </p:nvPr>
+        </p:nvSpPr>
+        <p:spPr>
+          <a:xfrm>
+            <a:off x="6286500" y="430530"/>
+            <a:ext cx="5524500" cy="891540"/>
+          </a:xfrm>
+          <a:prstGeom prst="roundRect">
+            <a:avLst/>
+          </a:prstGeom>
+          <a:solidFill>
+            <a:srgbClr val="F4F4F4"/>
+          </a:solidFill>
+          <a:ln w="19050" cap="flat" cmpd="sng" algn="ctr">
+            <a:noFill/>
+            <a:prstDash val="solid"/>
+            <a:miter lim="800000"/>
+          </a:ln>
+          <a:effectLst/>
+          <a:extLst>
+            <a:ext uri="{91240B29-F687-4F45-9708-019B960494DF}">
+              <a14:hiddenLine xmlns:a14="http://schemas.microsoft.com/office/drawing/2010/main" w="19050" cap="flat" cmpd="sng" algn="ctr">
+                <a:solidFill>
+                  <a:schemeClr val="accent1">
+                    <a:shade val="15000"/>
+                  </a:schemeClr>
+                </a:solidFill>
+                <a:prstDash val="solid"/>
+                <a:miter lim="800000"/>
+              </a14:hiddenLine>
+            </a:ext>
+          </a:extLst>
+        </p:spPr>
+        <p:style>
+          <a:lnRef idx="2">
+            <a:schemeClr val="accent1">
+              <a:shade val="15000"/>
+            </a:schemeClr>
+          </a:lnRef>
+          <a:fillRef idx="1">
+            <a:schemeClr val="accent1"/>
+          </a:fillRef>
+          <a:effectRef idx="0">
+            <a:schemeClr val="accent1"/>
+          </a:effectRef>
+          <a:fontRef idx="minor">
+            <a:schemeClr val="lt1"/>
+          </a:fontRef>
+        </p:style>
+        <p:txBody>
+          <a:bodyPr lIns="317500" rIns="1143000" rtlCol="0" anchor="ctr">
+            <a:normAutofit/>
+          </a:bodyPr>
+          <a:lstStyle/>
+          <a:p>
+            <a:r>
+              <a:rPr lang="en-US" sz="2000">
+                <a:solidFill>
+                  <a:srgbClr val="5B5B5B"/>
+                </a:solidFill>
+              </a:rPr>
+              <a:t>Please download and install the Slido app on all computers you use</a:t>
+            </a:r>
+            <a:endParaRPr lang="fr-FR" sz="2000">
+              <a:solidFill>
+                <a:srgbClr val="5B5B5B"/>
+              </a:solidFill>
+            </a:endParaRPr>
+          </a:p>
+        </p:txBody>
+      </p:sp>
+      <p:pic>
+        <p:nvPicPr>
+          <p:cNvPr id="4" name="Graphique 3">
+            <a:extLst>
+              <a:ext uri="{FF2B5EF4-FFF2-40B4-BE49-F238E27FC236}">
+                <a16:creationId xmlns:a16="http://schemas.microsoft.com/office/drawing/2014/main" id="{62A581A2-3113-376B-81F3-8BE82732F1CD}"/>
+              </a:ext>
+            </a:extLst>
+          </p:cNvPr>
+          <p:cNvPicPr>
+            <a:picLocks/>
+          </p:cNvPicPr>
+          <p:nvPr>
+            <p:custDataLst>
+              <p:tags r:id="rId3"/>
+            </p:custDataLst>
+          </p:nvPr>
+        </p:nvPicPr>
+        <p:blipFill>
+          <a:blip r:embed="rId9">
+            <a:extLst>
+              <a:ext uri="{96DAC541-7B7A-43D3-8B79-37D633B846F1}">
+                <asvg:svgBlip xmlns:asvg="http://schemas.microsoft.com/office/drawing/2016/SVG/main" r:embed="rId10"/>
+              </a:ext>
+            </a:extLst>
+          </a:blip>
+          <a:stretch>
+            <a:fillRect/>
+          </a:stretch>
+        </p:blipFill>
+        <p:spPr>
+          <a:xfrm>
+            <a:off x="10826048" y="577634"/>
+            <a:ext cx="597332" cy="597332"/>
+          </a:xfrm>
+          <a:prstGeom prst="rect">
+            <a:avLst/>
+          </a:prstGeom>
+        </p:spPr>
+      </p:pic>
+      <p:pic>
+        <p:nvPicPr>
+          <p:cNvPr id="6" name="Graphique 5">
+            <a:extLst>
+              <a:ext uri="{FF2B5EF4-FFF2-40B4-BE49-F238E27FC236}">
+                <a16:creationId xmlns:a16="http://schemas.microsoft.com/office/drawing/2014/main" id="{D69F0BC3-2537-C3AE-8E5C-B4C2BEF189CC}"/>
+              </a:ext>
+            </a:extLst>
+          </p:cNvPr>
+          <p:cNvPicPr>
+            <a:picLocks/>
+          </p:cNvPicPr>
+          <p:nvPr>
+            <p:custDataLst>
+              <p:tags r:id="rId4"/>
+            </p:custDataLst>
+          </p:nvPr>
+        </p:nvPicPr>
+        <p:blipFill>
+          <a:blip r:embed="rId11">
+            <a:extLst>
+              <a:ext uri="{96DAC541-7B7A-43D3-8B79-37D633B846F1}">
+                <asvg:svgBlip xmlns:asvg="http://schemas.microsoft.com/office/drawing/2016/SVG/main" r:embed="rId12"/>
+              </a:ext>
+            </a:extLst>
+          </a:blip>
+          <a:stretch>
+            <a:fillRect/>
+          </a:stretch>
+        </p:blipFill>
+        <p:spPr>
+          <a:xfrm>
+            <a:off x="3901440" y="617220"/>
+            <a:ext cx="1036320" cy="518160"/>
+          </a:xfrm>
+          <a:prstGeom prst="rect">
+            <a:avLst/>
+          </a:prstGeom>
+        </p:spPr>
+      </p:pic>
+      <p:pic>
+        <p:nvPicPr>
+          <p:cNvPr id="8" name="Graphique 7">
+            <a:extLst>
+              <a:ext uri="{FF2B5EF4-FFF2-40B4-BE49-F238E27FC236}">
+                <a16:creationId xmlns:a16="http://schemas.microsoft.com/office/drawing/2014/main" id="{E4B73133-E906-5F1F-B5B7-F92F0F329998}"/>
+              </a:ext>
+            </a:extLst>
+          </p:cNvPr>
+          <p:cNvPicPr>
+            <a:picLocks/>
+          </p:cNvPicPr>
+          <p:nvPr>
+            <p:custDataLst>
+              <p:tags r:id="rId5"/>
+            </p:custDataLst>
+          </p:nvPr>
+        </p:nvPicPr>
+        <p:blipFill>
+          <a:blip r:embed="rId13">
+            <a:extLst>
+              <a:ext uri="{96DAC541-7B7A-43D3-8B79-37D633B846F1}">
+                <asvg:svgBlip xmlns:asvg="http://schemas.microsoft.com/office/drawing/2016/SVG/main" r:embed="rId14"/>
+              </a:ext>
+            </a:extLst>
+          </a:blip>
+          <a:stretch>
+            <a:fillRect/>
+          </a:stretch>
+        </p:blipFill>
+        <p:spPr>
+          <a:xfrm>
+            <a:off x="1158240" y="2270760"/>
+            <a:ext cx="2316480" cy="2316480"/>
+          </a:xfrm>
+          <a:prstGeom prst="rect">
+            <a:avLst/>
+          </a:prstGeom>
+        </p:spPr>
+      </p:pic>
+      <p:sp>
+        <p:nvSpPr>
+          <p:cNvPr id="9" name="Rectangle 8">
+            <a:extLst>
+              <a:ext uri="{FF2B5EF4-FFF2-40B4-BE49-F238E27FC236}">
+                <a16:creationId xmlns:a16="http://schemas.microsoft.com/office/drawing/2014/main" id="{8954F327-1B28-ED79-7A2E-17853462FF50}"/>
+              </a:ext>
+            </a:extLst>
+          </p:cNvPr>
+          <p:cNvSpPr/>
+          <p:nvPr>
+            <p:custDataLst>
+              <p:tags r:id="rId6"/>
+            </p:custDataLst>
+          </p:nvPr>
+        </p:nvSpPr>
+        <p:spPr>
+          <a:xfrm>
+            <a:off x="3901440" y="2571750"/>
+            <a:ext cx="7315199" cy="1714500"/>
+          </a:xfrm>
+          <a:prstGeom prst="rect">
+            <a:avLst/>
+          </a:prstGeom>
+          <a:noFill/>
+          <a:ln w="19050" cap="flat" cmpd="sng" algn="ctr">
+            <a:solidFill>
+              <a:srgbClr val="FFFFFF"/>
+            </a:solidFill>
+            <a:prstDash val="solid"/>
+            <a:miter lim="800000"/>
+          </a:ln>
+          <a:effectLst/>
+          <a:extLst>
+            <a:ext uri="{909E8E84-426E-40DD-AFC4-6F175D3DCCD1}">
+              <a14:hiddenFill xmlns:a14="http://schemas.microsoft.com/office/drawing/2010/main">
+                <a:solidFill>
+                  <a:schemeClr val="accent1"/>
+                </a:solidFill>
+              </a14:hiddenFill>
+            </a:ext>
+          </a:extLst>
+        </p:spPr>
+        <p:style>
+          <a:lnRef idx="2">
+            <a:schemeClr val="accent1">
+              <a:shade val="15000"/>
+            </a:schemeClr>
+          </a:lnRef>
+          <a:fillRef idx="1">
+            <a:schemeClr val="accent1"/>
+          </a:fillRef>
+          <a:effectRef idx="0">
+            <a:schemeClr val="accent1"/>
+          </a:effectRef>
+          <a:fontRef idx="minor">
+            <a:schemeClr val="lt1"/>
+          </a:fontRef>
+        </p:style>
+        <p:txBody>
+          <a:bodyPr rtlCol="0" anchor="ctr"/>
+          <a:lstStyle/>
+          <a:p>
+            <a:r>
+              <a:rPr lang="fr-FR" sz="4000" b="1">
+                <a:solidFill>
+                  <a:srgbClr val="5B5B5B"/>
+                </a:solidFill>
+              </a:rPr>
+              <a:t>L'architecture microservices est la meilleure au démarrage d'un projet</a:t>
+            </a:r>
+          </a:p>
+        </p:txBody>
+      </p:sp>
+      <p:sp>
+        <p:nvSpPr>
+          <p:cNvPr id="10" name="Rectangle 9">
+            <a:extLst>
+              <a:ext uri="{FF2B5EF4-FFF2-40B4-BE49-F238E27FC236}">
+                <a16:creationId xmlns:a16="http://schemas.microsoft.com/office/drawing/2014/main" id="{0FD9AB17-6F79-A595-0C0C-38CC1F58E1AF}"/>
+              </a:ext>
+            </a:extLst>
+          </p:cNvPr>
+          <p:cNvSpPr/>
+          <p:nvPr>
+            <p:custDataLst>
+              <p:tags r:id="rId7"/>
+            </p:custDataLst>
+          </p:nvPr>
+        </p:nvSpPr>
+        <p:spPr>
+          <a:xfrm>
+            <a:off x="3901440" y="6032500"/>
+            <a:ext cx="7315199" cy="518160"/>
+          </a:xfrm>
+          <a:prstGeom prst="rect">
+            <a:avLst/>
+          </a:prstGeom>
+          <a:noFill/>
+          <a:ln w="19050" cap="flat" cmpd="sng" algn="ctr">
+            <a:noFill/>
+            <a:prstDash val="solid"/>
+            <a:miter lim="800000"/>
+          </a:ln>
+          <a:effectLst/>
+          <a:extLst>
+            <a:ext uri="{909E8E84-426E-40DD-AFC4-6F175D3DCCD1}">
+              <a14:hiddenFill xmlns:a14="http://schemas.microsoft.com/office/drawing/2010/main">
+                <a:solidFill>
+                  <a:schemeClr val="accent1"/>
+                </a:solidFill>
+              </a14:hiddenFill>
+            </a:ext>
+            <a:ext uri="{91240B29-F687-4F45-9708-019B960494DF}">
+              <a14:hiddenLine xmlns:a14="http://schemas.microsoft.com/office/drawing/2010/main" w="19050" cap="flat" cmpd="sng" algn="ctr">
+                <a:solidFill>
+                  <a:schemeClr val="accent1">
+                    <a:shade val="15000"/>
+                  </a:schemeClr>
+                </a:solidFill>
+                <a:prstDash val="solid"/>
+                <a:miter lim="800000"/>
+              </a14:hiddenLine>
+            </a:ext>
+          </a:extLst>
+        </p:spPr>
+        <p:style>
+          <a:lnRef idx="2">
+            <a:schemeClr val="accent1">
+              <a:shade val="15000"/>
+            </a:schemeClr>
+          </a:lnRef>
+          <a:fillRef idx="1">
+            <a:schemeClr val="accent1"/>
+          </a:fillRef>
+          <a:effectRef idx="0">
+            <a:schemeClr val="accent1"/>
+          </a:effectRef>
+          <a:fontRef idx="minor">
+            <a:schemeClr val="lt1"/>
+          </a:fontRef>
+        </p:style>
+        <p:txBody>
+          <a:bodyPr rtlCol="0" anchor="ctr">
+            <a:normAutofit/>
+          </a:bodyPr>
+          <a:lstStyle/>
+          <a:p>
+            <a:r>
+              <a:rPr lang="en-US" sz="2200" b="1">
+                <a:solidFill>
+                  <a:srgbClr val="5B5B5B"/>
+                </a:solidFill>
+              </a:rPr>
+              <a:t>ⓘ</a:t>
+            </a:r>
+            <a:r>
+              <a:rPr lang="en-US" sz="2000">
+                <a:solidFill>
+                  <a:srgbClr val="5B5B5B"/>
+                </a:solidFill>
+              </a:rPr>
+              <a:t> Start presenting to display the poll results on this slide.</a:t>
+            </a:r>
+            <a:endParaRPr lang="fr-FR" sz="2000">
+              <a:solidFill>
+                <a:srgbClr val="5B5B5B"/>
+              </a:solidFill>
+            </a:endParaRPr>
+          </a:p>
+        </p:txBody>
+      </p:sp>
+    </p:spTree>
+    <p:custDataLst>
+      <p:tags r:id="rId1"/>
+    </p:custDataLst>
+    <p:extLst>
+      <p:ext uri="{BB962C8B-B14F-4D97-AF65-F5344CB8AC3E}">
+        <p14:creationId xmlns:p14="http://schemas.microsoft.com/office/powerpoint/2010/main" val="4089003642"/>
+      </p:ext>
+    </p:extLst>
+  </p:cSld>
+  <p:clrMapOvr>
+    <a:masterClrMapping/>
+  </p:clrMapOvr>
+  <p:timing>
+    <p:tnLst>
+      <p:par>
+        <p:cTn id="1" dur="indefinite" restart="never" nodeType="tmRoot">
+          <p:childTnLst>
+            <p:seq concurrent="1" nextAc="seek">
+              <p:cTn id="2" dur="indefinite" nodeType="mainSeq">
+                <p:childTnLst>
+                  <p:par>
+                    <p:cTn id="3" fill="hold">
+                      <p:stCondLst>
+                        <p:cond delay="indefinite"/>
+                      </p:stCondLst>
+                      <p:childTnLst>
+                        <p:par>
+                          <p:cTn id="4" fill="hold">
+                            <p:stCondLst>
+                              <p:cond delay="0"/>
+                            </p:stCondLst>
+                            <p:childTnLst>
+                              <p:par>
+                                <p:cTn id="5" presetID="26" presetClass="emph" presetSubtype="0" fill="hold" grpId="0" nodeType="clickEffect">
+                                  <p:stCondLst>
+                                    <p:cond delay="0"/>
+                                  </p:stCondLst>
+                                  <p:childTnLst>
+                                    <p:animEffect transition="out" filter="fade">
+                                      <p:cBhvr>
+                                        <p:cTn id="6" dur="50" tmFilter="0, 0; .2, .5; .8, .5; 1, 0"/>
+                                        <p:tgtEl>
+                                          <p:spTgt spid="9"/>
+                                        </p:tgtEl>
+                                      </p:cBhvr>
+                                    </p:animEffect>
+                                    <p:animScale>
+                                      <p:cBhvr>
+                                        <p:cTn id="7" dur="25" autoRev="1" fill="hold"/>
+                                        <p:tgtEl>
+                                          <p:spTgt spid="9"/>
+                                        </p:tgtEl>
+                                      </p:cBhvr>
+                                      <p:by x="105000" y="105000"/>
+                                    </p:animScale>
+                                  </p:childTnLst>
+                                </p:cTn>
+                              </p:par>
+                            </p:childTnLst>
+                          </p:cTn>
+                        </p:par>
+                      </p:childTnLst>
+                    </p:cTn>
+                  </p:par>
+                  <p:par>
+                    <p:cTn id="8" fill="hold">
+                      <p:stCondLst>
+                        <p:cond delay="indefinite"/>
+                      </p:stCondLst>
+                      <p:childTnLst>
+                        <p:par>
+                          <p:cTn id="9" fill="hold">
+                            <p:stCondLst>
+                              <p:cond delay="0"/>
+                            </p:stCondLst>
+                            <p:childTnLst>
+                              <p:par>
+                                <p:cTn id="10" presetID="26" presetClass="emph" presetSubtype="0" fill="hold" grpId="1" nodeType="clickEffect">
+                                  <p:stCondLst>
+                                    <p:cond delay="0"/>
+                                  </p:stCondLst>
+                                  <p:childTnLst>
+                                    <p:animEffect transition="out" filter="fade">
+                                      <p:cBhvr>
+                                        <p:cTn id="11" dur="50" tmFilter="0, 0; .2, .5; .8, .5; 1, 0"/>
+                                        <p:tgtEl>
+                                          <p:spTgt spid="9"/>
+                                        </p:tgtEl>
+                                      </p:cBhvr>
+                                    </p:animEffect>
+                                    <p:animScale>
+                                      <p:cBhvr>
+                                        <p:cTn id="12" dur="25" autoRev="1" fill="hold"/>
+                                        <p:tgtEl>
+                                          <p:spTgt spid="9"/>
+                                        </p:tgtEl>
+                                      </p:cBhvr>
+                                      <p:by x="105000" y="105000"/>
+                                    </p:animScale>
+                                  </p:childTnLst>
+                                </p:cTn>
+                              </p:par>
+                            </p:childTnLst>
+                          </p:cTn>
+                        </p:par>
+                      </p:childTnLst>
+                    </p:cTn>
+                  </p:par>
+                  <p:par>
+                    <p:cTn id="13" fill="hold">
+                      <p:stCondLst>
+                        <p:cond delay="indefinite"/>
+                      </p:stCondLst>
+                      <p:childTnLst>
+                        <p:par>
+                          <p:cTn id="14" fill="hold">
+                            <p:stCondLst>
+                              <p:cond delay="0"/>
+                            </p:stCondLst>
+                            <p:childTnLst>
+                              <p:par>
+                                <p:cTn id="15" presetID="26" presetClass="emph" presetSubtype="0" fill="hold" grpId="2" nodeType="clickEffect">
+                                  <p:stCondLst>
+                                    <p:cond delay="0"/>
+                                  </p:stCondLst>
+                                  <p:childTnLst>
+                                    <p:animEffect transition="out" filter="fade">
+                                      <p:cBhvr>
+                                        <p:cTn id="16" dur="50" tmFilter="0, 0; .2, .5; .8, .5; 1, 0"/>
+                                        <p:tgtEl>
+                                          <p:spTgt spid="9"/>
+                                        </p:tgtEl>
+                                      </p:cBhvr>
+                                    </p:animEffect>
+                                    <p:animScale>
+                                      <p:cBhvr>
+                                        <p:cTn id="17" dur="25" autoRev="1" fill="hold"/>
+                                        <p:tgtEl>
+                                          <p:spTgt spid="9"/>
+                                        </p:tgtEl>
+                                      </p:cBhvr>
+                                      <p:by x="105000" y="105000"/>
+                                    </p:animScale>
+                                  </p:childTnLst>
+                                </p:cTn>
+                              </p:par>
+                            </p:childTnLst>
+                          </p:cTn>
+                        </p:par>
+                      </p:childTnLst>
+                    </p:cTn>
+                  </p:par>
+                </p:childTnLst>
+              </p:cTn>
+              <p:prevCondLst>
+                <p:cond evt="onPrev" delay="0">
+                  <p:tgtEl>
+                    <p:sldTgt/>
+                  </p:tgtEl>
+                </p:cond>
+              </p:prevCondLst>
+              <p:nextCondLst>
+                <p:cond evt="onNext" delay="0">
+                  <p:tgtEl>
+                    <p:sldTgt/>
+                  </p:tgtEl>
+                </p:cond>
+              </p:nextCondLst>
+            </p:seq>
+          </p:childTnLst>
+        </p:cTn>
+      </p:par>
+    </p:tnLst>
+    <p:bldLst>
+      <p:bldP spid="9" grpId="0" animBg="1"/>
+      <p:bldP spid="9" grpId="1" animBg="1"/>
+      <p:bldP spid="9" grpId="2" animBg="1"/>
+    </p:bldLst>
+  </p:timing>
 </p:sld>
 </file>
 
@@ -10737,6 +14648,335 @@
   <p:tag name="SLIDO_PRESENTATION_ID" val="00000000-0000-0000-0000-000000000000"/>
   <p:tag name="SLIDO_EVENT_UUID" val="02d23b6e-c298-4541-82ca-37b7834d9787"/>
   <p:tag name="SLIDO_EVENT_SECTION_UUID" val="045c6d2b-61d3-44b3-9104-7d16c0fd6cea"/>
+</p:tagLst>
+</file>
+
+<file path=ppt/tags/tag10.xml><?xml version="1.0" encoding="utf-8"?>
+<p:tagLst xmlns:a="http://schemas.openxmlformats.org/drawingml/2006/main" xmlns:r="http://schemas.openxmlformats.org/officeDocument/2006/relationships" xmlns:p="http://schemas.openxmlformats.org/presentationml/2006/main">
+  <p:tag name="SLIDO_ELEMENT" val="reminder"/>
+</p:tagLst>
+</file>
+
+<file path=ppt/tags/tag11.xml><?xml version="1.0" encoding="utf-8"?>
+<p:tagLst xmlns:a="http://schemas.openxmlformats.org/drawingml/2006/main" xmlns:r="http://schemas.openxmlformats.org/officeDocument/2006/relationships" xmlns:p="http://schemas.openxmlformats.org/presentationml/2006/main">
+  <p:tag name="SLIDO_ELEMENT" val="dotty"/>
+</p:tagLst>
+</file>
+
+<file path=ppt/tags/tag12.xml><?xml version="1.0" encoding="utf-8"?>
+<p:tagLst xmlns:a="http://schemas.openxmlformats.org/drawingml/2006/main" xmlns:r="http://schemas.openxmlformats.org/officeDocument/2006/relationships" xmlns:p="http://schemas.openxmlformats.org/presentationml/2006/main">
+  <p:tag name="SLIDO_ELEMENT" val="logo"/>
+</p:tagLst>
+</file>
+
+<file path=ppt/tags/tag13.xml><?xml version="1.0" encoding="utf-8"?>
+<p:tagLst xmlns:a="http://schemas.openxmlformats.org/drawingml/2006/main" xmlns:r="http://schemas.openxmlformats.org/officeDocument/2006/relationships" xmlns:p="http://schemas.openxmlformats.org/presentationml/2006/main">
+  <p:tag name="SLIDO_ELEMENT" val="interaction_image"/>
+  <p:tag name="INTERACTION_TYPE" val="Quiz"/>
+</p:tagLst>
+</file>
+
+<file path=ppt/tags/tag14.xml><?xml version="1.0" encoding="utf-8"?>
+<p:tagLst xmlns:a="http://schemas.openxmlformats.org/drawingml/2006/main" xmlns:r="http://schemas.openxmlformats.org/officeDocument/2006/relationships" xmlns:p="http://schemas.openxmlformats.org/presentationml/2006/main">
+  <p:tag name="SLIDO_ELEMENT" val="title"/>
+</p:tagLst>
+</file>
+
+<file path=ppt/tags/tag15.xml><?xml version="1.0" encoding="utf-8"?>
+<p:tagLst xmlns:a="http://schemas.openxmlformats.org/drawingml/2006/main" xmlns:r="http://schemas.openxmlformats.org/officeDocument/2006/relationships" xmlns:p="http://schemas.openxmlformats.org/presentationml/2006/main">
+  <p:tag name="SLIDO_ELEMENT" val="footer"/>
+</p:tagLst>
+</file>
+
+<file path=ppt/tags/tag16.xml><?xml version="1.0" encoding="utf-8"?>
+<p:tagLst xmlns:a="http://schemas.openxmlformats.org/drawingml/2006/main" xmlns:r="http://schemas.openxmlformats.org/officeDocument/2006/relationships" xmlns:p="http://schemas.openxmlformats.org/presentationml/2006/main">
+  <p:tag name="SLIDO_METADATA" val="eyJUaW1lc3RhbXAiOjE3MjcwNzcwNTh9"/>
+  <p:tag name="SLIDO_TYPE" val="SlidoPoll"/>
+  <p:tag name="SLIDO_POLL_UUID" val="6d55ebd2-f44f-4000-b0c8-613c2ebb5dc6"/>
+  <p:tag name="SLIDO_POLL_QUESTION_UUID" val="e394a3ae-987d-40e8-a048-b38d3ac9ed68"/>
+  <p:tag name="SLIDO_TIMELINE" val="W3sicG9sbFF1ZXN0aW9uVXVpZCI6ImUzOTRhM2FlLTk4N2QtNDBlOC1hMDQ4LWIzOGQzYWM5ZWQ2OCIsInNob3dSZXN1bHRzIjpmYWxzZSwic2hvd0NvcnJlY3RBbnN3ZXJzIjpmYWxzZSwidm90aW5nTG9ja2VkIjpmYWxzZX0seyJwb2xsUXVlc3Rpb25VdWlkIjoiZTM5NGEzYWUtOTg3ZC00MGU4LWEwNDgtYjM4ZDNhYzllZDY4Iiwic2hvd1Jlc3VsdHMiOnRydWUsInNob3dDb3JyZWN0QW5zd2VycyI6ZmFsc2UsInZvdGluZ0xvY2tlZCI6dHJ1ZX0seyJwb2xsUXVlc3Rpb25VdWlkIjoiZTM5NGEzYWUtOTg3ZC00MGU4LWEwNDgtYjM4ZDNhYzllZDY4Iiwic2hvd1Jlc3VsdHMiOnRydWUsInNob3dDb3JyZWN0QW5zd2VycyI6dHJ1ZSwidm90aW5nTG9ja2VkIjp0cnVlfV0="/>
+</p:tagLst>
+</file>
+
+<file path=ppt/tags/tag17.xml><?xml version="1.0" encoding="utf-8"?>
+<p:tagLst xmlns:a="http://schemas.openxmlformats.org/drawingml/2006/main" xmlns:r="http://schemas.openxmlformats.org/officeDocument/2006/relationships" xmlns:p="http://schemas.openxmlformats.org/presentationml/2006/main">
+  <p:tag name="SLIDO_ELEMENT" val="reminder"/>
+</p:tagLst>
+</file>
+
+<file path=ppt/tags/tag18.xml><?xml version="1.0" encoding="utf-8"?>
+<p:tagLst xmlns:a="http://schemas.openxmlformats.org/drawingml/2006/main" xmlns:r="http://schemas.openxmlformats.org/officeDocument/2006/relationships" xmlns:p="http://schemas.openxmlformats.org/presentationml/2006/main">
+  <p:tag name="SLIDO_ELEMENT" val="dotty"/>
+</p:tagLst>
+</file>
+
+<file path=ppt/tags/tag19.xml><?xml version="1.0" encoding="utf-8"?>
+<p:tagLst xmlns:a="http://schemas.openxmlformats.org/drawingml/2006/main" xmlns:r="http://schemas.openxmlformats.org/officeDocument/2006/relationships" xmlns:p="http://schemas.openxmlformats.org/presentationml/2006/main">
+  <p:tag name="SLIDO_ELEMENT" val="logo"/>
+</p:tagLst>
+</file>
+
+<file path=ppt/tags/tag2.xml><?xml version="1.0" encoding="utf-8"?>
+<p:tagLst xmlns:a="http://schemas.openxmlformats.org/drawingml/2006/main" xmlns:r="http://schemas.openxmlformats.org/officeDocument/2006/relationships" xmlns:p="http://schemas.openxmlformats.org/presentationml/2006/main">
+  <p:tag name="SLIDO_METADATA" val="eyJUaW1lc3RhbXAiOjE3MjcwNzcwNTd9"/>
+  <p:tag name="SLIDO_TYPE" val="SlidoPoll"/>
+  <p:tag name="SLIDO_POLL_UUID" val="6d55ebd2-f44f-4000-b0c8-613c2ebb5dc6"/>
+  <p:tag name="SLIDO_POLL_QUESTION_UUID" val="2940a5cb-8288-4ae5-9a5c-28132ab21f66"/>
+  <p:tag name="SLIDO_TIMELINE" val="W3sic2NyZWVuIjoiUXVpekpvaW5pbmciLCJzaG93UmVzdWx0cyI6ZmFsc2UsInNob3dDb3JyZWN0QW5zd2VycyI6ZmFsc2UsInZvdGluZ0xvY2tlZCI6ZmFsc2V9LHsicG9sbFF1ZXN0aW9uVXVpZCI6IjI5NDBhNWNiLTgyODgtNGFlNS05YTVjLTI4MTMyYWIyMWY2NiIsInNob3dSZXN1bHRzIjpmYWxzZSwic2hvd0NvcnJlY3RBbnN3ZXJzIjpmYWxzZSwidm90aW5nTG9ja2VkIjpmYWxzZX0seyJwb2xsUXVlc3Rpb25VdWlkIjoiMjk0MGE1Y2ItODI4OC00YWU1LTlhNWMtMjgxMzJhYjIxZjY2Iiwic2hvd1Jlc3VsdHMiOnRydWUsInNob3dDb3JyZWN0QW5zd2VycyI6ZmFsc2UsInZvdGluZ0xvY2tlZCI6dHJ1ZX0seyJwb2xsUXVlc3Rpb25VdWlkIjoiMjk0MGE1Y2ItODI4OC00YWU1LTlhNWMtMjgxMzJhYjIxZjY2Iiwic2hvd1Jlc3VsdHMiOnRydWUsInNob3dDb3JyZWN0QW5zd2VycyI6dHJ1ZSwidm90aW5nTG9ja2VkIjp0cnVlfV0="/>
+</p:tagLst>
+</file>
+
+<file path=ppt/tags/tag20.xml><?xml version="1.0" encoding="utf-8"?>
+<p:tagLst xmlns:a="http://schemas.openxmlformats.org/drawingml/2006/main" xmlns:r="http://schemas.openxmlformats.org/officeDocument/2006/relationships" xmlns:p="http://schemas.openxmlformats.org/presentationml/2006/main">
+  <p:tag name="SLIDO_ELEMENT" val="interaction_image"/>
+  <p:tag name="INTERACTION_TYPE" val="Quiz"/>
+</p:tagLst>
+</file>
+
+<file path=ppt/tags/tag21.xml><?xml version="1.0" encoding="utf-8"?>
+<p:tagLst xmlns:a="http://schemas.openxmlformats.org/drawingml/2006/main" xmlns:r="http://schemas.openxmlformats.org/officeDocument/2006/relationships" xmlns:p="http://schemas.openxmlformats.org/presentationml/2006/main">
+  <p:tag name="SLIDO_ELEMENT" val="title"/>
+</p:tagLst>
+</file>
+
+<file path=ppt/tags/tag22.xml><?xml version="1.0" encoding="utf-8"?>
+<p:tagLst xmlns:a="http://schemas.openxmlformats.org/drawingml/2006/main" xmlns:r="http://schemas.openxmlformats.org/officeDocument/2006/relationships" xmlns:p="http://schemas.openxmlformats.org/presentationml/2006/main">
+  <p:tag name="SLIDO_ELEMENT" val="footer"/>
+</p:tagLst>
+</file>
+
+<file path=ppt/tags/tag23.xml><?xml version="1.0" encoding="utf-8"?>
+<p:tagLst xmlns:a="http://schemas.openxmlformats.org/drawingml/2006/main" xmlns:r="http://schemas.openxmlformats.org/officeDocument/2006/relationships" xmlns:p="http://schemas.openxmlformats.org/presentationml/2006/main">
+  <p:tag name="SLIDO_METADATA" val="eyJUaW1lc3RhbXAiOjE3MjcwNzcwNTh9"/>
+  <p:tag name="SLIDO_TYPE" val="SlidoPoll"/>
+  <p:tag name="SLIDO_POLL_UUID" val="6d55ebd2-f44f-4000-b0c8-613c2ebb5dc6"/>
+  <p:tag name="SLIDO_POLL_QUESTION_UUID" val="9a1b1ef2-385b-463d-853c-a39769e43262"/>
+  <p:tag name="SLIDO_TIMELINE" val="W3sicG9sbFF1ZXN0aW9uVXVpZCI6IjlhMWIxZWYyLTM4NWItNDYzZC04NTNjLWEzOTc2OWU0MzI2MiIsInNob3dSZXN1bHRzIjpmYWxzZSwic2hvd0NvcnJlY3RBbnN3ZXJzIjpmYWxzZSwidm90aW5nTG9ja2VkIjpmYWxzZX0seyJwb2xsUXVlc3Rpb25VdWlkIjoiOWExYjFlZjItMzg1Yi00NjNkLTg1M2MtYTM5NzY5ZTQzMjYyIiwic2hvd1Jlc3VsdHMiOnRydWUsInNob3dDb3JyZWN0QW5zd2VycyI6ZmFsc2UsInZvdGluZ0xvY2tlZCI6dHJ1ZX0seyJwb2xsUXVlc3Rpb25VdWlkIjoiOWExYjFlZjItMzg1Yi00NjNkLTg1M2MtYTM5NzY5ZTQzMjYyIiwic2hvd1Jlc3VsdHMiOnRydWUsInNob3dDb3JyZWN0QW5zd2VycyI6dHJ1ZSwidm90aW5nTG9ja2VkIjp0cnVlfV0="/>
+</p:tagLst>
+</file>
+
+<file path=ppt/tags/tag24.xml><?xml version="1.0" encoding="utf-8"?>
+<p:tagLst xmlns:a="http://schemas.openxmlformats.org/drawingml/2006/main" xmlns:r="http://schemas.openxmlformats.org/officeDocument/2006/relationships" xmlns:p="http://schemas.openxmlformats.org/presentationml/2006/main">
+  <p:tag name="SLIDO_ELEMENT" val="reminder"/>
+</p:tagLst>
+</file>
+
+<file path=ppt/tags/tag25.xml><?xml version="1.0" encoding="utf-8"?>
+<p:tagLst xmlns:a="http://schemas.openxmlformats.org/drawingml/2006/main" xmlns:r="http://schemas.openxmlformats.org/officeDocument/2006/relationships" xmlns:p="http://schemas.openxmlformats.org/presentationml/2006/main">
+  <p:tag name="SLIDO_ELEMENT" val="dotty"/>
+</p:tagLst>
+</file>
+
+<file path=ppt/tags/tag26.xml><?xml version="1.0" encoding="utf-8"?>
+<p:tagLst xmlns:a="http://schemas.openxmlformats.org/drawingml/2006/main" xmlns:r="http://schemas.openxmlformats.org/officeDocument/2006/relationships" xmlns:p="http://schemas.openxmlformats.org/presentationml/2006/main">
+  <p:tag name="SLIDO_ELEMENT" val="logo"/>
+</p:tagLst>
+</file>
+
+<file path=ppt/tags/tag27.xml><?xml version="1.0" encoding="utf-8"?>
+<p:tagLst xmlns:a="http://schemas.openxmlformats.org/drawingml/2006/main" xmlns:r="http://schemas.openxmlformats.org/officeDocument/2006/relationships" xmlns:p="http://schemas.openxmlformats.org/presentationml/2006/main">
+  <p:tag name="SLIDO_ELEMENT" val="interaction_image"/>
+  <p:tag name="INTERACTION_TYPE" val="Quiz"/>
+</p:tagLst>
+</file>
+
+<file path=ppt/tags/tag28.xml><?xml version="1.0" encoding="utf-8"?>
+<p:tagLst xmlns:a="http://schemas.openxmlformats.org/drawingml/2006/main" xmlns:r="http://schemas.openxmlformats.org/officeDocument/2006/relationships" xmlns:p="http://schemas.openxmlformats.org/presentationml/2006/main">
+  <p:tag name="SLIDO_ELEMENT" val="title"/>
+</p:tagLst>
+</file>
+
+<file path=ppt/tags/tag29.xml><?xml version="1.0" encoding="utf-8"?>
+<p:tagLst xmlns:a="http://schemas.openxmlformats.org/drawingml/2006/main" xmlns:r="http://schemas.openxmlformats.org/officeDocument/2006/relationships" xmlns:p="http://schemas.openxmlformats.org/presentationml/2006/main">
+  <p:tag name="SLIDO_ELEMENT" val="footer"/>
+</p:tagLst>
+</file>
+
+<file path=ppt/tags/tag3.xml><?xml version="1.0" encoding="utf-8"?>
+<p:tagLst xmlns:a="http://schemas.openxmlformats.org/drawingml/2006/main" xmlns:r="http://schemas.openxmlformats.org/officeDocument/2006/relationships" xmlns:p="http://schemas.openxmlformats.org/presentationml/2006/main">
+  <p:tag name="SLIDO_ELEMENT" val="reminder"/>
+</p:tagLst>
+</file>
+
+<file path=ppt/tags/tag30.xml><?xml version="1.0" encoding="utf-8"?>
+<p:tagLst xmlns:a="http://schemas.openxmlformats.org/drawingml/2006/main" xmlns:r="http://schemas.openxmlformats.org/officeDocument/2006/relationships" xmlns:p="http://schemas.openxmlformats.org/presentationml/2006/main">
+  <p:tag name="SLIDO_METADATA" val="eyJUaW1lc3RhbXAiOjE3MjcwNzcwNTh9"/>
+  <p:tag name="SLIDO_TYPE" val="SlidoPoll"/>
+  <p:tag name="SLIDO_POLL_UUID" val="6d55ebd2-f44f-4000-b0c8-613c2ebb5dc6"/>
+  <p:tag name="SLIDO_POLL_QUESTION_UUID" val="ac395746-86dd-4b11-9ef6-35ad854fb7e4"/>
+  <p:tag name="SLIDO_TIMELINE" val="W3sicG9sbFF1ZXN0aW9uVXVpZCI6ImFjMzk1NzQ2LTg2ZGQtNGIxMS05ZWY2LTM1YWQ4NTRmYjdlNCIsInNob3dSZXN1bHRzIjpmYWxzZSwic2hvd0NvcnJlY3RBbnN3ZXJzIjpmYWxzZSwidm90aW5nTG9ja2VkIjpmYWxzZX0seyJwb2xsUXVlc3Rpb25VdWlkIjoiYWMzOTU3NDYtODZkZC00YjExLTllZjYtMzVhZDg1NGZiN2U0Iiwic2hvd1Jlc3VsdHMiOnRydWUsInNob3dDb3JyZWN0QW5zd2VycyI6ZmFsc2UsInZvdGluZ0xvY2tlZCI6dHJ1ZX0seyJwb2xsUXVlc3Rpb25VdWlkIjoiYWMzOTU3NDYtODZkZC00YjExLTllZjYtMzVhZDg1NGZiN2U0Iiwic2hvd1Jlc3VsdHMiOnRydWUsInNob3dDb3JyZWN0QW5zd2VycyI6dHJ1ZSwidm90aW5nTG9ja2VkIjp0cnVlfV0="/>
+</p:tagLst>
+</file>
+
+<file path=ppt/tags/tag31.xml><?xml version="1.0" encoding="utf-8"?>
+<p:tagLst xmlns:a="http://schemas.openxmlformats.org/drawingml/2006/main" xmlns:r="http://schemas.openxmlformats.org/officeDocument/2006/relationships" xmlns:p="http://schemas.openxmlformats.org/presentationml/2006/main">
+  <p:tag name="SLIDO_ELEMENT" val="reminder"/>
+</p:tagLst>
+</file>
+
+<file path=ppt/tags/tag32.xml><?xml version="1.0" encoding="utf-8"?>
+<p:tagLst xmlns:a="http://schemas.openxmlformats.org/drawingml/2006/main" xmlns:r="http://schemas.openxmlformats.org/officeDocument/2006/relationships" xmlns:p="http://schemas.openxmlformats.org/presentationml/2006/main">
+  <p:tag name="SLIDO_ELEMENT" val="dotty"/>
+</p:tagLst>
+</file>
+
+<file path=ppt/tags/tag33.xml><?xml version="1.0" encoding="utf-8"?>
+<p:tagLst xmlns:a="http://schemas.openxmlformats.org/drawingml/2006/main" xmlns:r="http://schemas.openxmlformats.org/officeDocument/2006/relationships" xmlns:p="http://schemas.openxmlformats.org/presentationml/2006/main">
+  <p:tag name="SLIDO_ELEMENT" val="logo"/>
+</p:tagLst>
+</file>
+
+<file path=ppt/tags/tag34.xml><?xml version="1.0" encoding="utf-8"?>
+<p:tagLst xmlns:a="http://schemas.openxmlformats.org/drawingml/2006/main" xmlns:r="http://schemas.openxmlformats.org/officeDocument/2006/relationships" xmlns:p="http://schemas.openxmlformats.org/presentationml/2006/main">
+  <p:tag name="SLIDO_ELEMENT" val="interaction_image"/>
+  <p:tag name="INTERACTION_TYPE" val="Quiz"/>
+</p:tagLst>
+</file>
+
+<file path=ppt/tags/tag35.xml><?xml version="1.0" encoding="utf-8"?>
+<p:tagLst xmlns:a="http://schemas.openxmlformats.org/drawingml/2006/main" xmlns:r="http://schemas.openxmlformats.org/officeDocument/2006/relationships" xmlns:p="http://schemas.openxmlformats.org/presentationml/2006/main">
+  <p:tag name="SLIDO_ELEMENT" val="title"/>
+</p:tagLst>
+</file>
+
+<file path=ppt/tags/tag36.xml><?xml version="1.0" encoding="utf-8"?>
+<p:tagLst xmlns:a="http://schemas.openxmlformats.org/drawingml/2006/main" xmlns:r="http://schemas.openxmlformats.org/officeDocument/2006/relationships" xmlns:p="http://schemas.openxmlformats.org/presentationml/2006/main">
+  <p:tag name="SLIDO_ELEMENT" val="footer"/>
+</p:tagLst>
+</file>
+
+<file path=ppt/tags/tag37.xml><?xml version="1.0" encoding="utf-8"?>
+<p:tagLst xmlns:a="http://schemas.openxmlformats.org/drawingml/2006/main" xmlns:r="http://schemas.openxmlformats.org/officeDocument/2006/relationships" xmlns:p="http://schemas.openxmlformats.org/presentationml/2006/main">
+  <p:tag name="SLIDO_METADATA" val="eyJUaW1lc3RhbXAiOjE3MjcwNzcwNTh9"/>
+  <p:tag name="SLIDO_TYPE" val="SlidoPoll"/>
+  <p:tag name="SLIDO_POLL_UUID" val="6d55ebd2-f44f-4000-b0c8-613c2ebb5dc6"/>
+  <p:tag name="SLIDO_POLL_QUESTION_UUID" val="bcf382ba-60a5-4922-a242-6f4b568a813b"/>
+  <p:tag name="SLIDO_TIMELINE" val="W3sicG9sbFF1ZXN0aW9uVXVpZCI6ImJjZjM4MmJhLTYwYTUtNDkyMi1hMjQyLTZmNGI1NjhhODEzYiIsInNob3dSZXN1bHRzIjpmYWxzZSwic2hvd0NvcnJlY3RBbnN3ZXJzIjpmYWxzZSwidm90aW5nTG9ja2VkIjpmYWxzZX0seyJwb2xsUXVlc3Rpb25VdWlkIjoiYmNmMzgyYmEtNjBhNS00OTIyLWEyNDItNmY0YjU2OGE4MTNiIiwic2hvd1Jlc3VsdHMiOnRydWUsInNob3dDb3JyZWN0QW5zd2VycyI6ZmFsc2UsInZvdGluZ0xvY2tlZCI6dHJ1ZX0seyJwb2xsUXVlc3Rpb25VdWlkIjoiYmNmMzgyYmEtNjBhNS00OTIyLWEyNDItNmY0YjU2OGE4MTNiIiwic2hvd1Jlc3VsdHMiOnRydWUsInNob3dDb3JyZWN0QW5zd2VycyI6dHJ1ZSwidm90aW5nTG9ja2VkIjp0cnVlfV0="/>
+</p:tagLst>
+</file>
+
+<file path=ppt/tags/tag38.xml><?xml version="1.0" encoding="utf-8"?>
+<p:tagLst xmlns:a="http://schemas.openxmlformats.org/drawingml/2006/main" xmlns:r="http://schemas.openxmlformats.org/officeDocument/2006/relationships" xmlns:p="http://schemas.openxmlformats.org/presentationml/2006/main">
+  <p:tag name="SLIDO_ELEMENT" val="reminder"/>
+</p:tagLst>
+</file>
+
+<file path=ppt/tags/tag39.xml><?xml version="1.0" encoding="utf-8"?>
+<p:tagLst xmlns:a="http://schemas.openxmlformats.org/drawingml/2006/main" xmlns:r="http://schemas.openxmlformats.org/officeDocument/2006/relationships" xmlns:p="http://schemas.openxmlformats.org/presentationml/2006/main">
+  <p:tag name="SLIDO_ELEMENT" val="dotty"/>
+</p:tagLst>
+</file>
+
+<file path=ppt/tags/tag4.xml><?xml version="1.0" encoding="utf-8"?>
+<p:tagLst xmlns:a="http://schemas.openxmlformats.org/drawingml/2006/main" xmlns:r="http://schemas.openxmlformats.org/officeDocument/2006/relationships" xmlns:p="http://schemas.openxmlformats.org/presentationml/2006/main">
+  <p:tag name="SLIDO_ELEMENT" val="dotty"/>
+</p:tagLst>
+</file>
+
+<file path=ppt/tags/tag40.xml><?xml version="1.0" encoding="utf-8"?>
+<p:tagLst xmlns:a="http://schemas.openxmlformats.org/drawingml/2006/main" xmlns:r="http://schemas.openxmlformats.org/officeDocument/2006/relationships" xmlns:p="http://schemas.openxmlformats.org/presentationml/2006/main">
+  <p:tag name="SLIDO_ELEMENT" val="logo"/>
+</p:tagLst>
+</file>
+
+<file path=ppt/tags/tag41.xml><?xml version="1.0" encoding="utf-8"?>
+<p:tagLst xmlns:a="http://schemas.openxmlformats.org/drawingml/2006/main" xmlns:r="http://schemas.openxmlformats.org/officeDocument/2006/relationships" xmlns:p="http://schemas.openxmlformats.org/presentationml/2006/main">
+  <p:tag name="SLIDO_ELEMENT" val="interaction_image"/>
+  <p:tag name="INTERACTION_TYPE" val="Quiz"/>
+</p:tagLst>
+</file>
+
+<file path=ppt/tags/tag42.xml><?xml version="1.0" encoding="utf-8"?>
+<p:tagLst xmlns:a="http://schemas.openxmlformats.org/drawingml/2006/main" xmlns:r="http://schemas.openxmlformats.org/officeDocument/2006/relationships" xmlns:p="http://schemas.openxmlformats.org/presentationml/2006/main">
+  <p:tag name="SLIDO_ELEMENT" val="title"/>
+</p:tagLst>
+</file>
+
+<file path=ppt/tags/tag43.xml><?xml version="1.0" encoding="utf-8"?>
+<p:tagLst xmlns:a="http://schemas.openxmlformats.org/drawingml/2006/main" xmlns:r="http://schemas.openxmlformats.org/officeDocument/2006/relationships" xmlns:p="http://schemas.openxmlformats.org/presentationml/2006/main">
+  <p:tag name="SLIDO_ELEMENT" val="footer"/>
+</p:tagLst>
+</file>
+
+<file path=ppt/tags/tag44.xml><?xml version="1.0" encoding="utf-8"?>
+<p:tagLst xmlns:a="http://schemas.openxmlformats.org/drawingml/2006/main" xmlns:r="http://schemas.openxmlformats.org/officeDocument/2006/relationships" xmlns:p="http://schemas.openxmlformats.org/presentationml/2006/main">
+  <p:tag name="SLIDO_METADATA" val="eyJUaW1lc3RhbXAiOjE3MjcwNzcwNTh9"/>
+  <p:tag name="SLIDO_TYPE" val="SlidoPoll"/>
+  <p:tag name="SLIDO_POLL_UUID" val="6d55ebd2-f44f-4000-b0c8-613c2ebb5dc6"/>
+  <p:tag name="SLIDO_POLL_QUESTION_UUID" val="a192c930-db52-4517-a1a2-a0ef71be59d6"/>
+  <p:tag name="SLIDO_TIMELINE" val="W3sicG9sbFF1ZXN0aW9uVXVpZCI6ImExOTJjOTMwLWRiNTItNDUxNy1hMWEyLWEwZWY3MWJlNTlkNiIsInNob3dSZXN1bHRzIjpmYWxzZSwic2hvd0NvcnJlY3RBbnN3ZXJzIjpmYWxzZSwidm90aW5nTG9ja2VkIjpmYWxzZX0seyJwb2xsUXVlc3Rpb25VdWlkIjoiYTE5MmM5MzAtZGI1Mi00NTE3LWExYTItYTBlZjcxYmU1OWQ2Iiwic2hvd1Jlc3VsdHMiOnRydWUsInNob3dDb3JyZWN0QW5zd2VycyI6ZmFsc2UsInZvdGluZ0xvY2tlZCI6dHJ1ZX0seyJwb2xsUXVlc3Rpb25VdWlkIjoiYTE5MmM5MzAtZGI1Mi00NTE3LWExYTItYTBlZjcxYmU1OWQ2Iiwic2hvd1Jlc3VsdHMiOnRydWUsInNob3dDb3JyZWN0QW5zd2VycyI6dHJ1ZSwidm90aW5nTG9ja2VkIjp0cnVlfSx7InNjcmVlbiI6IlF1aXpMZWFkZXJib2FyZCIsInBvbGxRdWVzdGlvblV1aWQiOiJhMTkyYzkzMC1kYjUyLTQ1MTctYTFhMi1hMGVmNzFiZTU5ZDYiLCJzaG93UmVzdWx0cyI6dHJ1ZSwic2hvd0NvcnJlY3RBbnN3ZXJzIjp0cnVlLCJ2b3RpbmdMb2NrZWQiOnRydWV9XQ=="/>
+</p:tagLst>
+</file>
+
+<file path=ppt/tags/tag45.xml><?xml version="1.0" encoding="utf-8"?>
+<p:tagLst xmlns:a="http://schemas.openxmlformats.org/drawingml/2006/main" xmlns:r="http://schemas.openxmlformats.org/officeDocument/2006/relationships" xmlns:p="http://schemas.openxmlformats.org/presentationml/2006/main">
+  <p:tag name="SLIDO_ELEMENT" val="reminder"/>
+</p:tagLst>
+</file>
+
+<file path=ppt/tags/tag46.xml><?xml version="1.0" encoding="utf-8"?>
+<p:tagLst xmlns:a="http://schemas.openxmlformats.org/drawingml/2006/main" xmlns:r="http://schemas.openxmlformats.org/officeDocument/2006/relationships" xmlns:p="http://schemas.openxmlformats.org/presentationml/2006/main">
+  <p:tag name="SLIDO_ELEMENT" val="dotty"/>
+</p:tagLst>
+</file>
+
+<file path=ppt/tags/tag47.xml><?xml version="1.0" encoding="utf-8"?>
+<p:tagLst xmlns:a="http://schemas.openxmlformats.org/drawingml/2006/main" xmlns:r="http://schemas.openxmlformats.org/officeDocument/2006/relationships" xmlns:p="http://schemas.openxmlformats.org/presentationml/2006/main">
+  <p:tag name="SLIDO_ELEMENT" val="logo"/>
+</p:tagLst>
+</file>
+
+<file path=ppt/tags/tag48.xml><?xml version="1.0" encoding="utf-8"?>
+<p:tagLst xmlns:a="http://schemas.openxmlformats.org/drawingml/2006/main" xmlns:r="http://schemas.openxmlformats.org/officeDocument/2006/relationships" xmlns:p="http://schemas.openxmlformats.org/presentationml/2006/main">
+  <p:tag name="SLIDO_ELEMENT" val="interaction_image"/>
+  <p:tag name="INTERACTION_TYPE" val="Quiz"/>
+</p:tagLst>
+</file>
+
+<file path=ppt/tags/tag49.xml><?xml version="1.0" encoding="utf-8"?>
+<p:tagLst xmlns:a="http://schemas.openxmlformats.org/drawingml/2006/main" xmlns:r="http://schemas.openxmlformats.org/officeDocument/2006/relationships" xmlns:p="http://schemas.openxmlformats.org/presentationml/2006/main">
+  <p:tag name="SLIDO_ELEMENT" val="title"/>
+</p:tagLst>
+</file>
+
+<file path=ppt/tags/tag5.xml><?xml version="1.0" encoding="utf-8"?>
+<p:tagLst xmlns:a="http://schemas.openxmlformats.org/drawingml/2006/main" xmlns:r="http://schemas.openxmlformats.org/officeDocument/2006/relationships" xmlns:p="http://schemas.openxmlformats.org/presentationml/2006/main">
+  <p:tag name="SLIDO_ELEMENT" val="logo"/>
+</p:tagLst>
+</file>
+
+<file path=ppt/tags/tag50.xml><?xml version="1.0" encoding="utf-8"?>
+<p:tagLst xmlns:a="http://schemas.openxmlformats.org/drawingml/2006/main" xmlns:r="http://schemas.openxmlformats.org/officeDocument/2006/relationships" xmlns:p="http://schemas.openxmlformats.org/presentationml/2006/main">
+  <p:tag name="SLIDO_ELEMENT" val="footer"/>
+</p:tagLst>
+</file>
+
+<file path=ppt/tags/tag6.xml><?xml version="1.0" encoding="utf-8"?>
+<p:tagLst xmlns:a="http://schemas.openxmlformats.org/drawingml/2006/main" xmlns:r="http://schemas.openxmlformats.org/officeDocument/2006/relationships" xmlns:p="http://schemas.openxmlformats.org/presentationml/2006/main">
+  <p:tag name="SLIDO_ELEMENT" val="interaction_image"/>
+  <p:tag name="INTERACTION_TYPE" val="Quiz"/>
+</p:tagLst>
+</file>
+
+<file path=ppt/tags/tag7.xml><?xml version="1.0" encoding="utf-8"?>
+<p:tagLst xmlns:a="http://schemas.openxmlformats.org/drawingml/2006/main" xmlns:r="http://schemas.openxmlformats.org/officeDocument/2006/relationships" xmlns:p="http://schemas.openxmlformats.org/presentationml/2006/main">
+  <p:tag name="SLIDO_ELEMENT" val="title"/>
+</p:tagLst>
+</file>
+
+<file path=ppt/tags/tag8.xml><?xml version="1.0" encoding="utf-8"?>
+<p:tagLst xmlns:a="http://schemas.openxmlformats.org/drawingml/2006/main" xmlns:r="http://schemas.openxmlformats.org/officeDocument/2006/relationships" xmlns:p="http://schemas.openxmlformats.org/presentationml/2006/main">
+  <p:tag name="SLIDO_ELEMENT" val="footer"/>
+</p:tagLst>
+</file>
+
+<file path=ppt/tags/tag9.xml><?xml version="1.0" encoding="utf-8"?>
+<p:tagLst xmlns:a="http://schemas.openxmlformats.org/drawingml/2006/main" xmlns:r="http://schemas.openxmlformats.org/officeDocument/2006/relationships" xmlns:p="http://schemas.openxmlformats.org/presentationml/2006/main">
+  <p:tag name="SLIDO_METADATA" val="eyJUaW1lc3RhbXAiOjE3MjcwNzcwNTh9"/>
+  <p:tag name="SLIDO_TYPE" val="SlidoPoll"/>
+  <p:tag name="SLIDO_POLL_UUID" val="6d55ebd2-f44f-4000-b0c8-613c2ebb5dc6"/>
+  <p:tag name="SLIDO_POLL_QUESTION_UUID" val="4ba6ec48-f7db-46c7-a812-b3e5e4c46f5a"/>
+  <p:tag name="SLIDO_TIMELINE" val="W3sicG9sbFF1ZXN0aW9uVXVpZCI6IjRiYTZlYzQ4LWY3ZGItNDZjNy1hODEyLWIzZTVlNGM0NmY1YSIsInNob3dSZXN1bHRzIjpmYWxzZSwic2hvd0NvcnJlY3RBbnN3ZXJzIjpmYWxzZSwidm90aW5nTG9ja2VkIjpmYWxzZX0seyJwb2xsUXVlc3Rpb25VdWlkIjoiNGJhNmVjNDgtZjdkYi00NmM3LWE4MTItYjNlNWU0YzQ2ZjVhIiwic2hvd1Jlc3VsdHMiOnRydWUsInNob3dDb3JyZWN0QW5zd2VycyI6ZmFsc2UsInZvdGluZ0xvY2tlZCI6dHJ1ZX0seyJwb2xsUXVlc3Rpb25VdWlkIjoiNGJhNmVjNDgtZjdkYi00NmM3LWE4MTItYjNlNWU0YzQ2ZjVhIiwic2hvd1Jlc3VsdHMiOnRydWUsInNob3dDb3JyZWN0QW5zd2VycyI6dHJ1ZSwidm90aW5nTG9ja2VkIjp0cnVlfV0="/>
 </p:tagLst>
 </file>
 

</xml_diff>

<commit_message>
mod-1&2: fix typos an spelling errors
</commit_message>
<xml_diff>
--- a/Mod-1_introduction-aux-microservices/Mod-1_introduction-to-microservices.pptx
+++ b/Mod-1_introduction-aux-microservices/Mod-1_introduction-to-microservices.pptx
@@ -255,7 +255,7 @@
           <a:p>
             <a:fld id="{8460A10B-ACD9-4A18-B916-B9640DB8AFCF}" type="datetimeFigureOut">
               <a:rPr lang="fr-FR" smtClean="0"/>
-              <a:t>23/09/2024</a:t>
+              <a:t>14/10/2024</a:t>
             </a:fld>
             <a:endParaRPr lang="fr-FR"/>
           </a:p>
@@ -1030,15 +1030,7 @@
           <a:p>
             <a:r>
               <a:rPr lang="fr-FR" dirty="0"/>
-              <a:t>2. </a:t>
-            </a:r>
-            <a:r>
-              <a:rPr lang="fr-FR" dirty="0" err="1"/>
-              <a:t>Microservices</a:t>
-            </a:r>
-            <a:r>
-              <a:rPr lang="fr-FR" dirty="0"/>
-              <a:t>: Définition</a:t>
+              <a:t>2. Microservices: Définition</a:t>
             </a:r>
           </a:p>
           <a:p>
@@ -1065,15 +1057,7 @@
           <a:p>
             <a:r>
               <a:rPr lang="fr-FR" dirty="0"/>
-              <a:t>	- </a:t>
-            </a:r>
-            <a:r>
-              <a:rPr lang="fr-FR" dirty="0" err="1"/>
-              <a:t>Microservice</a:t>
-            </a:r>
-            <a:r>
-              <a:rPr lang="fr-FR" dirty="0"/>
-              <a:t> = Micro + Service</a:t>
+              <a:t>	- Microservice = Micro + Service</a:t>
             </a:r>
           </a:p>
           <a:p>
@@ -1091,15 +1075,7 @@
           <a:p>
             <a:r>
               <a:rPr lang="fr-FR" dirty="0"/>
-              <a:t>		- </a:t>
-            </a:r>
-            <a:r>
-              <a:rPr lang="fr-FR" dirty="0" err="1"/>
-              <a:t>Microservice</a:t>
-            </a:r>
-            <a:r>
-              <a:rPr lang="fr-FR" dirty="0"/>
-              <a:t> = Modularité</a:t>
+              <a:t>		- Microservice = Modularité</a:t>
             </a:r>
           </a:p>
           <a:p>
@@ -1581,7 +1557,7 @@
           <a:p>
             <a:fld id="{DF6C34A5-62C4-4C25-95D7-C54E0C60CFDE}" type="datetimeFigureOut">
               <a:rPr lang="fr-FR" smtClean="0"/>
-              <a:t>23/09/2024</a:t>
+              <a:t>14/10/2024</a:t>
             </a:fld>
             <a:endParaRPr lang="fr-FR"/>
           </a:p>
@@ -1779,7 +1755,7 @@
           <a:p>
             <a:fld id="{DF6C34A5-62C4-4C25-95D7-C54E0C60CFDE}" type="datetimeFigureOut">
               <a:rPr lang="fr-FR" smtClean="0"/>
-              <a:t>23/09/2024</a:t>
+              <a:t>14/10/2024</a:t>
             </a:fld>
             <a:endParaRPr lang="fr-FR"/>
           </a:p>
@@ -1987,7 +1963,7 @@
           <a:p>
             <a:fld id="{DF6C34A5-62C4-4C25-95D7-C54E0C60CFDE}" type="datetimeFigureOut">
               <a:rPr lang="fr-FR" smtClean="0"/>
-              <a:t>23/09/2024</a:t>
+              <a:t>14/10/2024</a:t>
             </a:fld>
             <a:endParaRPr lang="fr-FR"/>
           </a:p>
@@ -2185,7 +2161,7 @@
           <a:p>
             <a:fld id="{DF6C34A5-62C4-4C25-95D7-C54E0C60CFDE}" type="datetimeFigureOut">
               <a:rPr lang="fr-FR" smtClean="0"/>
-              <a:t>23/09/2024</a:t>
+              <a:t>14/10/2024</a:t>
             </a:fld>
             <a:endParaRPr lang="fr-FR"/>
           </a:p>
@@ -2460,7 +2436,7 @@
           <a:p>
             <a:fld id="{DF6C34A5-62C4-4C25-95D7-C54E0C60CFDE}" type="datetimeFigureOut">
               <a:rPr lang="fr-FR" smtClean="0"/>
-              <a:t>23/09/2024</a:t>
+              <a:t>14/10/2024</a:t>
             </a:fld>
             <a:endParaRPr lang="fr-FR"/>
           </a:p>
@@ -2725,7 +2701,7 @@
           <a:p>
             <a:fld id="{DF6C34A5-62C4-4C25-95D7-C54E0C60CFDE}" type="datetimeFigureOut">
               <a:rPr lang="fr-FR" smtClean="0"/>
-              <a:t>23/09/2024</a:t>
+              <a:t>14/10/2024</a:t>
             </a:fld>
             <a:endParaRPr lang="fr-FR"/>
           </a:p>
@@ -3137,7 +3113,7 @@
           <a:p>
             <a:fld id="{DF6C34A5-62C4-4C25-95D7-C54E0C60CFDE}" type="datetimeFigureOut">
               <a:rPr lang="fr-FR" smtClean="0"/>
-              <a:t>23/09/2024</a:t>
+              <a:t>14/10/2024</a:t>
             </a:fld>
             <a:endParaRPr lang="fr-FR"/>
           </a:p>
@@ -3278,7 +3254,7 @@
           <a:p>
             <a:fld id="{DF6C34A5-62C4-4C25-95D7-C54E0C60CFDE}" type="datetimeFigureOut">
               <a:rPr lang="fr-FR" smtClean="0"/>
-              <a:t>23/09/2024</a:t>
+              <a:t>14/10/2024</a:t>
             </a:fld>
             <a:endParaRPr lang="fr-FR"/>
           </a:p>
@@ -3391,7 +3367,7 @@
           <a:p>
             <a:fld id="{DF6C34A5-62C4-4C25-95D7-C54E0C60CFDE}" type="datetimeFigureOut">
               <a:rPr lang="fr-FR" smtClean="0"/>
-              <a:t>23/09/2024</a:t>
+              <a:t>14/10/2024</a:t>
             </a:fld>
             <a:endParaRPr lang="fr-FR"/>
           </a:p>
@@ -3702,7 +3678,7 @@
           <a:p>
             <a:fld id="{DF6C34A5-62C4-4C25-95D7-C54E0C60CFDE}" type="datetimeFigureOut">
               <a:rPr lang="fr-FR" smtClean="0"/>
-              <a:t>23/09/2024</a:t>
+              <a:t>14/10/2024</a:t>
             </a:fld>
             <a:endParaRPr lang="fr-FR"/>
           </a:p>
@@ -3990,7 +3966,7 @@
           <a:p>
             <a:fld id="{DF6C34A5-62C4-4C25-95D7-C54E0C60CFDE}" type="datetimeFigureOut">
               <a:rPr lang="fr-FR" smtClean="0"/>
-              <a:t>23/09/2024</a:t>
+              <a:t>14/10/2024</a:t>
             </a:fld>
             <a:endParaRPr lang="fr-FR"/>
           </a:p>
@@ -4231,7 +4207,7 @@
           <a:p>
             <a:fld id="{DF6C34A5-62C4-4C25-95D7-C54E0C60CFDE}" type="datetimeFigureOut">
               <a:rPr lang="fr-FR" smtClean="0"/>
-              <a:t>23/09/2024</a:t>
+              <a:t>14/10/2024</a:t>
             </a:fld>
             <a:endParaRPr lang="fr-FR"/>
           </a:p>
@@ -4714,7 +4690,7 @@
           <a:p>
             <a:pPr algn="l"/>
             <a:r>
-              <a:rPr lang="fr-FR" sz="4500" b="1" dirty="0" err="1">
+              <a:rPr lang="fr-FR" sz="4500" b="1" dirty="0">
                 <a:solidFill>
                   <a:schemeClr val="tx2"/>
                 </a:solidFill>
@@ -4722,12 +4698,6 @@
               </a:rPr>
               <a:t>Microservices</a:t>
             </a:r>
-            <a:endParaRPr lang="fr-FR" sz="4500" b="1" dirty="0">
-              <a:solidFill>
-                <a:schemeClr val="tx2"/>
-              </a:solidFill>
-              <a:latin typeface="Lora" pitchFamily="2" charset="0"/>
-            </a:endParaRPr>
           </a:p>
         </p:txBody>
       </p:sp>
@@ -4785,7 +4755,7 @@
         <p:spPr>
           <a:xfrm>
             <a:off x="345186" y="3238500"/>
-            <a:ext cx="6197854" cy="461665"/>
+            <a:ext cx="6197854" cy="830997"/>
           </a:xfrm>
           <a:prstGeom prst="rect">
             <a:avLst/>
@@ -4805,7 +4775,7 @@
                 </a:solidFill>
                 <a:latin typeface="Lora" pitchFamily="2" charset="0"/>
               </a:rPr>
-              <a:t>Module 1: Introduction au </a:t>
+              <a:t>Module 1: Introduction aux </a:t>
             </a:r>
             <a:r>
               <a:rPr lang="fr-FR" sz="2400" b="1" dirty="0" err="1">
@@ -4945,7 +4915,7 @@
             </a:pPr>
             <a:r>
               <a:rPr lang="fr-FR" sz="2200" dirty="0"/>
-              <a:t>Chaque service à sa base de données</a:t>
+              <a:t>Chaque service à sa base de données (idéalement)</a:t>
             </a:r>
           </a:p>
         </p:txBody>
@@ -4998,12 +4968,8 @@
           </a:lstStyle>
           <a:p>
             <a:r>
-              <a:rPr lang="fr-FR" sz="2800" b="1" dirty="0" err="1"/>
-              <a:t>Microservices</a:t>
-            </a:r>
-            <a:r>
               <a:rPr lang="fr-FR" sz="2800" b="1" dirty="0"/>
-              <a:t> : Caractéristiques</a:t>
+              <a:t>Microservices : Caractéristiques</a:t>
             </a:r>
           </a:p>
         </p:txBody>
@@ -5383,7 +5349,11 @@
             </a:pPr>
             <a:r>
               <a:rPr lang="fr-FR" sz="2200" dirty="0"/>
-              <a:t> Les services sont scalables indépendamment</a:t>
+              <a:t> Les services sont </a:t>
+            </a:r>
+            <a:r>
+              <a:rPr lang="fr-FR" sz="2200" b="1" dirty="0"/>
+              <a:t>scalables indépendamment</a:t>
             </a:r>
           </a:p>
           <a:p>
@@ -5503,12 +5473,8 @@
           </a:lstStyle>
           <a:p>
             <a:r>
-              <a:rPr lang="fr-FR" sz="2800" b="1" dirty="0" err="1"/>
-              <a:t>Microservices</a:t>
-            </a:r>
-            <a:r>
               <a:rPr lang="fr-FR" sz="2800" b="1" dirty="0"/>
-              <a:t> : Les avantages</a:t>
+              <a:t>Microservices : Les avantages</a:t>
             </a:r>
           </a:p>
         </p:txBody>
@@ -5985,12 +5951,8 @@
           </a:lstStyle>
           <a:p>
             <a:r>
-              <a:rPr lang="fr-FR" sz="2800" b="1" dirty="0" err="1"/>
-              <a:t>Microservices</a:t>
-            </a:r>
-            <a:r>
               <a:rPr lang="fr-FR" sz="2800" b="1" dirty="0"/>
-              <a:t> : Les défis</a:t>
+              <a:t>Microservices : Les défis</a:t>
             </a:r>
           </a:p>
         </p:txBody>
@@ -8036,12 +7998,28 @@
           <a:lstStyle/>
           <a:p>
             <a:r>
-              <a:rPr lang="fr-FR" sz="4000" b="1">
+              <a:rPr lang="fr-FR" sz="4000" b="1" dirty="0">
                 <a:solidFill>
                   <a:srgbClr val="5B5B5B"/>
                 </a:solidFill>
               </a:rPr>
-              <a:t>Dans une architecture de microservices, chaque service :</a:t>
+              <a:t>Dans une architecture de </a:t>
+            </a:r>
+            <a:r>
+              <a:rPr lang="fr-FR" sz="4000" b="1" dirty="0" err="1">
+                <a:solidFill>
+                  <a:srgbClr val="5B5B5B"/>
+                </a:solidFill>
+              </a:rPr>
+              <a:t>microservices</a:t>
+            </a:r>
+            <a:r>
+              <a:rPr lang="fr-FR" sz="4000" b="1" dirty="0">
+                <a:solidFill>
+                  <a:srgbClr val="5B5B5B"/>
+                </a:solidFill>
+              </a:rPr>
+              <a:t>, chaque service :</a:t>
             </a:r>
           </a:p>
         </p:txBody>
@@ -8576,12 +8554,28 @@
           <a:lstStyle/>
           <a:p>
             <a:r>
-              <a:rPr lang="fr-FR" sz="2800" b="1">
+              <a:rPr lang="fr-FR" sz="2800" b="1" dirty="0">
                 <a:solidFill>
                   <a:srgbClr val="5B5B5B"/>
                 </a:solidFill>
               </a:rPr>
-              <a:t>Pourquoi une architecture microservices facilite-t-elle le développement par des équipes indépendantes ?</a:t>
+              <a:t>Pourquoi une architecture </a:t>
+            </a:r>
+            <a:r>
+              <a:rPr lang="fr-FR" sz="2800" b="1" dirty="0" err="1">
+                <a:solidFill>
+                  <a:srgbClr val="5B5B5B"/>
+                </a:solidFill>
+              </a:rPr>
+              <a:t>microservices</a:t>
+            </a:r>
+            <a:r>
+              <a:rPr lang="fr-FR" sz="2800" b="1" dirty="0">
+                <a:solidFill>
+                  <a:srgbClr val="5B5B5B"/>
+                </a:solidFill>
+              </a:rPr>
+              <a:t> facilite-t-elle le développement par des équipes indépendantes ?</a:t>
             </a:r>
           </a:p>
         </p:txBody>
@@ -9116,12 +9110,28 @@
           <a:lstStyle/>
           <a:p>
             <a:r>
-              <a:rPr lang="fr-FR" sz="2800" b="1">
+              <a:rPr lang="fr-FR" sz="2800" b="1" dirty="0">
                 <a:solidFill>
                   <a:srgbClr val="5B5B5B"/>
                 </a:solidFill>
               </a:rPr>
-              <a:t>Quel est un avantage clé d'une architecture microservices par rapport à une architecture monolithique ?</a:t>
+              <a:t>Quel est un avantage clé d'une architecture </a:t>
+            </a:r>
+            <a:r>
+              <a:rPr lang="fr-FR" sz="2800" b="1" dirty="0" err="1">
+                <a:solidFill>
+                  <a:srgbClr val="5B5B5B"/>
+                </a:solidFill>
+              </a:rPr>
+              <a:t>microservices</a:t>
+            </a:r>
+            <a:r>
+              <a:rPr lang="fr-FR" sz="2800" b="1" dirty="0">
+                <a:solidFill>
+                  <a:srgbClr val="5B5B5B"/>
+                </a:solidFill>
+              </a:rPr>
+              <a:t> par rapport à une architecture monolithique ?</a:t>
             </a:r>
           </a:p>
         </p:txBody>
@@ -9435,7 +9445,7 @@
               </a:lnSpc>
             </a:pPr>
             <a:r>
-              <a:rPr lang="fr-FR" sz="2200" b="1" dirty="0" err="1"/>
+              <a:rPr lang="fr-FR" sz="2200" b="1" dirty="0"/>
               <a:t>Microservices</a:t>
             </a:r>
             <a:r>
@@ -9450,15 +9460,15 @@
               </a:lnSpc>
             </a:pPr>
             <a:r>
-              <a:rPr lang="fr-FR" sz="2200" b="1" dirty="0" err="1"/>
+              <a:rPr lang="fr-FR" sz="2200" b="1" dirty="0"/>
               <a:t>Microser</a:t>
             </a:r>
             <a:r>
-              <a:rPr lang="fr-FR" sz="2200" b="1" i="1" dirty="0" err="1"/>
+              <a:rPr lang="fr-FR" sz="2200" b="1" i="1" dirty="0"/>
               <a:t>v</a:t>
             </a:r>
             <a:r>
-              <a:rPr lang="fr-FR" sz="2200" b="1" dirty="0" err="1"/>
+              <a:rPr lang="fr-FR" sz="2200" b="1" dirty="0"/>
               <a:t>ices</a:t>
             </a:r>
             <a:r>
@@ -10108,12 +10118,28 @@
           <a:lstStyle/>
           <a:p>
             <a:r>
-              <a:rPr lang="fr-FR" sz="4000" b="1">
+              <a:rPr lang="fr-FR" sz="4000" b="1" dirty="0">
                 <a:solidFill>
                   <a:srgbClr val="5B5B5B"/>
                 </a:solidFill>
               </a:rPr>
-              <a:t>Quel est un défi courant associé aux microservices ?</a:t>
+              <a:t>Quel est un défi courant associé aux </a:t>
+            </a:r>
+            <a:r>
+              <a:rPr lang="fr-FR" sz="4000" b="1" dirty="0" err="1">
+                <a:solidFill>
+                  <a:srgbClr val="5B5B5B"/>
+                </a:solidFill>
+              </a:rPr>
+              <a:t>microservices</a:t>
+            </a:r>
+            <a:r>
+              <a:rPr lang="fr-FR" sz="4000" b="1" dirty="0">
+                <a:solidFill>
+                  <a:srgbClr val="5B5B5B"/>
+                </a:solidFill>
+              </a:rPr>
+              <a:t> ?</a:t>
             </a:r>
           </a:p>
         </p:txBody>
@@ -10648,12 +10674,28 @@
           <a:lstStyle/>
           <a:p>
             <a:r>
-              <a:rPr lang="fr-FR" sz="2400" b="1">
+              <a:rPr lang="fr-FR" sz="2400" b="1" dirty="0">
                 <a:solidFill>
                   <a:srgbClr val="5B5B5B"/>
                 </a:solidFill>
               </a:rPr>
-              <a:t>Quels avantages principaux offrent les microservices par rapport à une architecture monolithique ? (SELECTIONNER DEUX PROPOSITIONS)</a:t>
+              <a:t>Quels avantages principaux offrent les </a:t>
+            </a:r>
+            <a:r>
+              <a:rPr lang="fr-FR" sz="2400" b="1" dirty="0" err="1">
+                <a:solidFill>
+                  <a:srgbClr val="5B5B5B"/>
+                </a:solidFill>
+              </a:rPr>
+              <a:t>microservices</a:t>
+            </a:r>
+            <a:r>
+              <a:rPr lang="fr-FR" sz="2400" b="1" dirty="0">
+                <a:solidFill>
+                  <a:srgbClr val="5B5B5B"/>
+                </a:solidFill>
+              </a:rPr>
+              <a:t> par rapport à une architecture monolithique ? (SELECTIONNER DEUX PROPOSITIONS)</a:t>
             </a:r>
           </a:p>
         </p:txBody>
@@ -11188,12 +11230,28 @@
           <a:lstStyle/>
           <a:p>
             <a:r>
-              <a:rPr lang="fr-FR" sz="4000" b="1">
+              <a:rPr lang="fr-FR" sz="4000" b="1" dirty="0">
                 <a:solidFill>
                   <a:srgbClr val="5B5B5B"/>
                 </a:solidFill>
               </a:rPr>
-              <a:t>L'architecture microservices est la meilleure au démarrage d'un projet</a:t>
+              <a:t>L'architecture </a:t>
+            </a:r>
+            <a:r>
+              <a:rPr lang="fr-FR" sz="4000" b="1" dirty="0" err="1">
+                <a:solidFill>
+                  <a:srgbClr val="5B5B5B"/>
+                </a:solidFill>
+              </a:rPr>
+              <a:t>microservices</a:t>
+            </a:r>
+            <a:r>
+              <a:rPr lang="fr-FR" sz="4000" b="1" dirty="0">
+                <a:solidFill>
+                  <a:srgbClr val="5B5B5B"/>
+                </a:solidFill>
+              </a:rPr>
+              <a:t> est la meilleure au démarrage d'un projet</a:t>
             </a:r>
           </a:p>
         </p:txBody>
@@ -11890,7 +11948,7 @@
         </p:blipFill>
         <p:spPr>
           <a:xfrm>
-            <a:off x="4434214" y="-28987"/>
+            <a:off x="4434214" y="28163"/>
             <a:ext cx="7774489" cy="6813598"/>
           </a:xfrm>
           <a:prstGeom prst="rect">
@@ -13327,7 +13385,7 @@
             </a:pPr>
             <a:r>
               <a:rPr lang="fr-FR" sz="2200" dirty="0"/>
-              <a:t>Délais deviennent de plus en plus difficiles à respecter</a:t>
+              <a:t>Les délais deviennent de plus en plus difficiles à respecter</a:t>
             </a:r>
           </a:p>
           <a:p>
@@ -13338,26 +13396,18 @@
             </a:pPr>
             <a:r>
               <a:rPr lang="fr-FR" sz="2200" dirty="0"/>
-              <a:t> </a:t>
-            </a:r>
-            <a:r>
-              <a:rPr lang="fr-FR" sz="2200" dirty="0" err="1"/>
-              <a:t>Scaler</a:t>
-            </a:r>
+              <a:t> La scalabilité devient difficile à gérer</a:t>
+            </a:r>
+          </a:p>
+          <a:p>
+            <a:pPr>
+              <a:lnSpc>
+                <a:spcPct val="150000"/>
+              </a:lnSpc>
+            </a:pPr>
             <a:r>
               <a:rPr lang="fr-FR" sz="2200" dirty="0"/>
-              <a:t> devient difficile </a:t>
-            </a:r>
-          </a:p>
-          <a:p>
-            <a:pPr>
-              <a:lnSpc>
-                <a:spcPct val="150000"/>
-              </a:lnSpc>
-            </a:pPr>
-            <a:r>
-              <a:rPr lang="fr-FR" sz="2200" dirty="0"/>
-              <a:t>Blocage dans un </a:t>
+              <a:t>Risque de blocage dans un </a:t>
             </a:r>
             <a:r>
               <a:rPr lang="fr-FR" sz="2200" dirty="0" err="1"/>
@@ -13879,23 +13929,8 @@
                 </a:solidFill>
                 <a:latin typeface="Lora" pitchFamily="2" charset="0"/>
               </a:rPr>
-              <a:t>Les </a:t>
-            </a:r>
-            <a:r>
-              <a:rPr lang="fr-FR" sz="4100" b="1" dirty="0" err="1">
-                <a:solidFill>
-                  <a:schemeClr val="tx2"/>
-                </a:solidFill>
-                <a:latin typeface="Lora" pitchFamily="2" charset="0"/>
-              </a:rPr>
-              <a:t>Microservices</a:t>
-            </a:r>
-            <a:endParaRPr lang="fr-FR" sz="4100" b="1" dirty="0">
-              <a:solidFill>
-                <a:schemeClr val="tx2"/>
-              </a:solidFill>
-              <a:latin typeface="Lora" pitchFamily="2" charset="0"/>
-            </a:endParaRPr>
+              <a:t>Les Microservices</a:t>
+            </a:r>
           </a:p>
         </p:txBody>
       </p:sp>
@@ -14175,15 +14210,7 @@
             </a:r>
             <a:r>
               <a:rPr lang="fr-FR" sz="2200" dirty="0"/>
-              <a:t> Le style architectural </a:t>
-            </a:r>
-            <a:r>
-              <a:rPr lang="fr-FR" sz="2200" dirty="0" err="1"/>
-              <a:t>microservice</a:t>
-            </a:r>
-            <a:r>
-              <a:rPr lang="fr-FR" sz="2200" dirty="0"/>
-              <a:t> est une approche qui consiste à développer une application comme </a:t>
+              <a:t> Le style architectural microservice est une approche qui consiste à développer une application comme </a:t>
             </a:r>
             <a:r>
               <a:rPr lang="fr-FR" sz="2200" b="1" dirty="0"/>
@@ -14215,7 +14242,7 @@
             </a:r>
             <a:r>
               <a:rPr lang="fr-FR" sz="2200" dirty="0"/>
-              <a:t> au travers de mécanismes légers, souvent via des ressources HTTP des appels APIs.</a:t>
+              <a:t> au travers de mécanismes légers, souvent via des ressources HTTP des APIs.</a:t>
             </a:r>
           </a:p>
           <a:p>
@@ -14251,11 +14278,19 @@
             </a:r>
             <a:r>
               <a:rPr lang="fr-FR" sz="2200" dirty="0"/>
-              <a:t> de ces services, qui peuvent être conçus avec des langages de programmation différentes et utiliser un </a:t>
+              <a:t> de ces services, qui peuvent être conçus avec des </a:t>
             </a:r>
             <a:r>
               <a:rPr lang="fr-FR" sz="2200" b="1" dirty="0"/>
-              <a:t>système de stockage de données différent</a:t>
+              <a:t>langages de programmation différents</a:t>
+            </a:r>
+            <a:r>
+              <a:rPr lang="fr-FR" sz="2200" dirty="0"/>
+              <a:t> et utiliser des </a:t>
+            </a:r>
+            <a:r>
+              <a:rPr lang="fr-FR" sz="2200" b="1" dirty="0"/>
+              <a:t>systèmes de stockage de données différents</a:t>
             </a:r>
             <a:r>
               <a:rPr lang="fr-FR" sz="2200" dirty="0"/>
@@ -14316,12 +14351,8 @@
           </a:lstStyle>
           <a:p>
             <a:r>
-              <a:rPr lang="fr-FR" sz="2800" b="1" dirty="0" err="1"/>
-              <a:t>Microservices</a:t>
-            </a:r>
-            <a:r>
               <a:rPr lang="fr-FR" sz="2800" b="1" dirty="0"/>
-              <a:t> : Définition</a:t>
+              <a:t>Microservices : Définition</a:t>
             </a:r>
           </a:p>
         </p:txBody>

</xml_diff>